<commit_message>
Made some changes see descripton
Added screenshots to "how we built the prototype slide"
Editing some sentences on the current slides.
Left alot of room for the daniels to edit/add/remove etc.

Matt,
</commit_message>
<xml_diff>
--- a/Powerpoint for Dragons Den/Dragons Den Presentation.pptx
+++ b/Powerpoint for Dragons Den/Dragons Den Presentation.pptx
@@ -199,7 +199,7 @@
           <a:p>
             <a:fld id="{E60F5323-8565-4D5C-8D97-A0D85F0F25EA}" type="datetimeFigureOut">
               <a:rPr lang="en-GB" smtClean="0"/>
-              <a:t>17/11/2014</a:t>
+              <a:t>20/11/2014</a:t>
             </a:fld>
             <a:endParaRPr lang="en-GB"/>
           </a:p>
@@ -3608,7 +3608,7 @@
           <a:p>
             <a:fld id="{2C0CBD5E-86EE-4A89-9216-CA93929C6338}" type="datetimeFigureOut">
               <a:rPr lang="en-GB" smtClean="0"/>
-              <a:t>17/11/2014</a:t>
+              <a:t>20/11/2014</a:t>
             </a:fld>
             <a:endParaRPr lang="en-GB"/>
           </a:p>
@@ -3893,7 +3893,7 @@
           <a:p>
             <a:fld id="{2C0CBD5E-86EE-4A89-9216-CA93929C6338}" type="datetimeFigureOut">
               <a:rPr lang="en-GB" smtClean="0"/>
-              <a:t>17/11/2014</a:t>
+              <a:t>20/11/2014</a:t>
             </a:fld>
             <a:endParaRPr lang="en-GB"/>
           </a:p>
@@ -4068,7 +4068,7 @@
           <a:p>
             <a:fld id="{2C0CBD5E-86EE-4A89-9216-CA93929C6338}" type="datetimeFigureOut">
               <a:rPr lang="en-GB" smtClean="0"/>
-              <a:t>17/11/2014</a:t>
+              <a:t>20/11/2014</a:t>
             </a:fld>
             <a:endParaRPr lang="en-GB"/>
           </a:p>
@@ -4233,7 +4233,7 @@
           <a:p>
             <a:fld id="{2C0CBD5E-86EE-4A89-9216-CA93929C6338}" type="datetimeFigureOut">
               <a:rPr lang="en-GB" smtClean="0"/>
-              <a:t>17/11/2014</a:t>
+              <a:t>20/11/2014</a:t>
             </a:fld>
             <a:endParaRPr lang="en-GB"/>
           </a:p>
@@ -4474,7 +4474,7 @@
           <a:p>
             <a:fld id="{2C0CBD5E-86EE-4A89-9216-CA93929C6338}" type="datetimeFigureOut">
               <a:rPr lang="en-GB" smtClean="0"/>
-              <a:t>17/11/2014</a:t>
+              <a:t>20/11/2014</a:t>
             </a:fld>
             <a:endParaRPr lang="en-GB"/>
           </a:p>
@@ -4587,7 +4587,7 @@
           <a:p>
             <a:fld id="{2C0CBD5E-86EE-4A89-9216-CA93929C6338}" type="datetimeFigureOut">
               <a:rPr lang="en-GB" smtClean="0"/>
-              <a:t>17/11/2014</a:t>
+              <a:t>20/11/2014</a:t>
             </a:fld>
             <a:endParaRPr lang="en-GB"/>
           </a:p>
@@ -5126,7 +5126,7 @@
           <a:p>
             <a:fld id="{2C0CBD5E-86EE-4A89-9216-CA93929C6338}" type="datetimeFigureOut">
               <a:rPr lang="en-GB" smtClean="0"/>
-              <a:t>17/11/2014</a:t>
+              <a:t>20/11/2014</a:t>
             </a:fld>
             <a:endParaRPr lang="en-GB"/>
           </a:p>
@@ -5239,7 +5239,7 @@
           <a:p>
             <a:fld id="{2C0CBD5E-86EE-4A89-9216-CA93929C6338}" type="datetimeFigureOut">
               <a:rPr lang="en-GB" smtClean="0"/>
-              <a:t>17/11/2014</a:t>
+              <a:t>20/11/2014</a:t>
             </a:fld>
             <a:endParaRPr lang="en-GB"/>
           </a:p>
@@ -5329,7 +5329,7 @@
           <a:p>
             <a:fld id="{2C0CBD5E-86EE-4A89-9216-CA93929C6338}" type="datetimeFigureOut">
               <a:rPr lang="en-GB" smtClean="0"/>
-              <a:t>17/11/2014</a:t>
+              <a:t>20/11/2014</a:t>
             </a:fld>
             <a:endParaRPr lang="en-GB"/>
           </a:p>
@@ -7980,7 +7980,7 @@
           <a:p>
             <a:fld id="{2C0CBD5E-86EE-4A89-9216-CA93929C6338}" type="datetimeFigureOut">
               <a:rPr lang="en-GB" smtClean="0"/>
-              <a:t>17/11/2014</a:t>
+              <a:t>20/11/2014</a:t>
             </a:fld>
             <a:endParaRPr lang="en-GB"/>
           </a:p>
@@ -11192,7 +11192,7 @@
           <a:p>
             <a:fld id="{2C0CBD5E-86EE-4A89-9216-CA93929C6338}" type="datetimeFigureOut">
               <a:rPr lang="en-GB" smtClean="0"/>
-              <a:t>17/11/2014</a:t>
+              <a:t>20/11/2014</a:t>
             </a:fld>
             <a:endParaRPr lang="en-GB"/>
           </a:p>
@@ -14014,7 +14014,7 @@
           <a:p>
             <a:fld id="{2C0CBD5E-86EE-4A89-9216-CA93929C6338}" type="datetimeFigureOut">
               <a:rPr lang="en-GB" smtClean="0"/>
-              <a:t>17/11/2014</a:t>
+              <a:t>20/11/2014</a:t>
             </a:fld>
             <a:endParaRPr lang="en-GB"/>
           </a:p>
@@ -14874,8 +14874,29 @@
             </a:pPr>
             <a:r>
               <a:rPr lang="en-GB" dirty="0" smtClean="0"/>
-              <a:t>If it hasn’t already been clarified you will find a prototype of our future app on in front of you or currently passing around. </a:t>
+              <a:t>If it hasn’t already been clarified you will find a prototype of our future app </a:t>
             </a:r>
+            <a:r>
+              <a:rPr lang="en-GB" dirty="0" smtClean="0"/>
+              <a:t>in </a:t>
+            </a:r>
+            <a:r>
+              <a:rPr lang="en-GB" dirty="0" smtClean="0"/>
+              <a:t>front of you or currently passing </a:t>
+            </a:r>
+            <a:r>
+              <a:rPr lang="en-GB" dirty="0" smtClean="0"/>
+              <a:t>around</a:t>
+            </a:r>
+            <a:r>
+              <a:rPr lang="en-GB" dirty="0"/>
+              <a:t> </a:t>
+            </a:r>
+            <a:r>
+              <a:rPr lang="en-GB" dirty="0" smtClean="0"/>
+              <a:t>the audience. </a:t>
+            </a:r>
+            <a:endParaRPr lang="en-GB" dirty="0" smtClean="0"/>
           </a:p>
           <a:p>
             <a:pPr marL="0" indent="0">
@@ -14889,7 +14910,15 @@
             </a:pPr>
             <a:r>
               <a:rPr lang="en-GB" dirty="0" smtClean="0"/>
-              <a:t>Remember it’s early days, so there’s more great innovations still to come (will touch upon later). </a:t>
+              <a:t>Remember it’s early days, so there’s more great innovations </a:t>
+            </a:r>
+            <a:r>
+              <a:rPr lang="en-GB" dirty="0" smtClean="0"/>
+              <a:t>planned and still </a:t>
+            </a:r>
+            <a:r>
+              <a:rPr lang="en-GB" dirty="0" smtClean="0"/>
+              <a:t>to come (will touch upon later). </a:t>
             </a:r>
             <a:endParaRPr lang="en-GB" dirty="0"/>
           </a:p>
@@ -15001,14 +15030,14 @@
             <a:r>
               <a:rPr lang="en-GB" dirty="0" smtClean="0">
                 <a:solidFill>
-                  <a:srgbClr val="346F2F"/>
+                  <a:srgbClr val="006A4C"/>
                 </a:solidFill>
               </a:rPr>
               <a:t>Why not web or both? </a:t>
             </a:r>
             <a:endParaRPr lang="en-GB" dirty="0">
               <a:solidFill>
-                <a:srgbClr val="346F2F"/>
+                <a:srgbClr val="006A4C"/>
               </a:solidFill>
             </a:endParaRPr>
           </a:p>
@@ -15201,14 +15230,14 @@
             <a:r>
               <a:rPr lang="en-GB" dirty="0" smtClean="0">
                 <a:solidFill>
-                  <a:srgbClr val="346F2F"/>
+                  <a:srgbClr val="006A4C"/>
                 </a:solidFill>
               </a:rPr>
               <a:t>Why not children? </a:t>
             </a:r>
             <a:endParaRPr lang="en-GB" dirty="0">
               <a:solidFill>
-                <a:srgbClr val="346F2F"/>
+                <a:srgbClr val="006A4C"/>
               </a:solidFill>
             </a:endParaRPr>
           </a:p>
@@ -16250,7 +16279,7 @@
         <p:spPr>
           <a:xfrm flipV="1">
             <a:off x="2555776" y="3949414"/>
-            <a:ext cx="528025" cy="271674"/>
+            <a:ext cx="674041" cy="271674"/>
           </a:xfrm>
           <a:prstGeom prst="straightConnector1">
             <a:avLst/>
@@ -16322,7 +16351,7 @@
         <p:spPr>
           <a:xfrm flipH="1" flipV="1">
             <a:off x="5652120" y="3790980"/>
-            <a:ext cx="1402426" cy="408506"/>
+            <a:ext cx="864096" cy="862156"/>
           </a:xfrm>
           <a:prstGeom prst="straightConnector1">
             <a:avLst/>
@@ -16357,8 +16386,8 @@
         </p:nvCxnSpPr>
         <p:spPr>
           <a:xfrm>
-            <a:off x="2742839" y="2324738"/>
-            <a:ext cx="486978" cy="435692"/>
+            <a:off x="2555776" y="2167681"/>
+            <a:ext cx="674041" cy="592749"/>
           </a:xfrm>
           <a:prstGeom prst="straightConnector1">
             <a:avLst/>
@@ -16385,226 +16414,6 @@
           </a:fontRef>
         </p:style>
       </p:cxnSp>
-      <p:sp>
-        <p:nvSpPr>
-          <p:cNvPr id="9" name="Rectangle 8"/>
-          <p:cNvSpPr/>
-          <p:nvPr/>
-        </p:nvSpPr>
-        <p:spPr>
-          <a:xfrm>
-            <a:off x="1033824" y="3949414"/>
-            <a:ext cx="1521952" cy="1298381"/>
-          </a:xfrm>
-          <a:prstGeom prst="rect">
-            <a:avLst/>
-          </a:prstGeom>
-          <a:solidFill>
-            <a:schemeClr val="bg1"/>
-          </a:solidFill>
-        </p:spPr>
-        <p:style>
-          <a:lnRef idx="2">
-            <a:schemeClr val="accent1">
-              <a:shade val="50000"/>
-            </a:schemeClr>
-          </a:lnRef>
-          <a:fillRef idx="1">
-            <a:schemeClr val="accent1"/>
-          </a:fillRef>
-          <a:effectRef idx="0">
-            <a:schemeClr val="accent1"/>
-          </a:effectRef>
-          <a:fontRef idx="minor">
-            <a:schemeClr val="lt1"/>
-          </a:fontRef>
-        </p:style>
-        <p:txBody>
-          <a:bodyPr rtlCol="0" anchor="ctr"/>
-          <a:lstStyle/>
-          <a:p>
-            <a:pPr algn="ctr"/>
-            <a:r>
-              <a:rPr lang="en-GB" dirty="0" smtClean="0">
-                <a:solidFill>
-                  <a:schemeClr val="tx1"/>
-                </a:solidFill>
-              </a:rPr>
-              <a:t>Mikey Main Screenshot</a:t>
-            </a:r>
-            <a:endParaRPr lang="en-GB" dirty="0">
-              <a:solidFill>
-                <a:schemeClr val="tx1"/>
-              </a:solidFill>
-            </a:endParaRPr>
-          </a:p>
-        </p:txBody>
-      </p:sp>
-      <p:sp>
-        <p:nvSpPr>
-          <p:cNvPr id="10" name="Rectangle 9"/>
-          <p:cNvSpPr/>
-          <p:nvPr/>
-        </p:nvSpPr>
-        <p:spPr>
-          <a:xfrm>
-            <a:off x="894700" y="1515236"/>
-            <a:ext cx="1800200" cy="1466242"/>
-          </a:xfrm>
-          <a:prstGeom prst="rect">
-            <a:avLst/>
-          </a:prstGeom>
-          <a:solidFill>
-            <a:schemeClr val="bg1"/>
-          </a:solidFill>
-        </p:spPr>
-        <p:style>
-          <a:lnRef idx="2">
-            <a:schemeClr val="accent1">
-              <a:shade val="50000"/>
-            </a:schemeClr>
-          </a:lnRef>
-          <a:fillRef idx="1">
-            <a:schemeClr val="accent1"/>
-          </a:fillRef>
-          <a:effectRef idx="0">
-            <a:schemeClr val="accent1"/>
-          </a:effectRef>
-          <a:fontRef idx="minor">
-            <a:schemeClr val="lt1"/>
-          </a:fontRef>
-        </p:style>
-        <p:txBody>
-          <a:bodyPr rtlCol="0" anchor="ctr"/>
-          <a:lstStyle/>
-          <a:p>
-            <a:pPr algn="ctr"/>
-            <a:r>
-              <a:rPr lang="en-GB" dirty="0" smtClean="0">
-                <a:solidFill>
-                  <a:schemeClr val="tx1"/>
-                </a:solidFill>
-              </a:rPr>
-              <a:t>Matt Main Screenshot</a:t>
-            </a:r>
-            <a:endParaRPr lang="en-GB" dirty="0">
-              <a:solidFill>
-                <a:schemeClr val="tx1"/>
-              </a:solidFill>
-            </a:endParaRPr>
-          </a:p>
-        </p:txBody>
-      </p:sp>
-      <p:sp>
-        <p:nvSpPr>
-          <p:cNvPr id="11" name="Rectangle 10"/>
-          <p:cNvSpPr/>
-          <p:nvPr/>
-        </p:nvSpPr>
-        <p:spPr>
-          <a:xfrm>
-            <a:off x="6154446" y="1434560"/>
-            <a:ext cx="1800200" cy="1466242"/>
-          </a:xfrm>
-          <a:prstGeom prst="rect">
-            <a:avLst/>
-          </a:prstGeom>
-          <a:solidFill>
-            <a:schemeClr val="bg1"/>
-          </a:solidFill>
-        </p:spPr>
-        <p:style>
-          <a:lnRef idx="2">
-            <a:schemeClr val="accent1">
-              <a:shade val="50000"/>
-            </a:schemeClr>
-          </a:lnRef>
-          <a:fillRef idx="1">
-            <a:schemeClr val="accent1"/>
-          </a:fillRef>
-          <a:effectRef idx="0">
-            <a:schemeClr val="accent1"/>
-          </a:effectRef>
-          <a:fontRef idx="minor">
-            <a:schemeClr val="lt1"/>
-          </a:fontRef>
-        </p:style>
-        <p:txBody>
-          <a:bodyPr rtlCol="0" anchor="ctr"/>
-          <a:lstStyle/>
-          <a:p>
-            <a:pPr algn="ctr"/>
-            <a:r>
-              <a:rPr lang="en-GB" dirty="0" smtClean="0">
-                <a:solidFill>
-                  <a:schemeClr val="tx1"/>
-                </a:solidFill>
-              </a:rPr>
-              <a:t>Jacks Main Screenshot</a:t>
-            </a:r>
-            <a:endParaRPr lang="en-GB" dirty="0">
-              <a:solidFill>
-                <a:schemeClr val="tx1"/>
-              </a:solidFill>
-            </a:endParaRPr>
-          </a:p>
-        </p:txBody>
-      </p:sp>
-      <p:sp>
-        <p:nvSpPr>
-          <p:cNvPr id="12" name="Rectangle 11"/>
-          <p:cNvSpPr/>
-          <p:nvPr/>
-        </p:nvSpPr>
-        <p:spPr>
-          <a:xfrm>
-            <a:off x="6465944" y="4221088"/>
-            <a:ext cx="1521952" cy="1298381"/>
-          </a:xfrm>
-          <a:prstGeom prst="rect">
-            <a:avLst/>
-          </a:prstGeom>
-          <a:solidFill>
-            <a:schemeClr val="bg1"/>
-          </a:solidFill>
-        </p:spPr>
-        <p:style>
-          <a:lnRef idx="2">
-            <a:schemeClr val="accent1">
-              <a:shade val="50000"/>
-            </a:schemeClr>
-          </a:lnRef>
-          <a:fillRef idx="1">
-            <a:schemeClr val="accent1"/>
-          </a:fillRef>
-          <a:effectRef idx="0">
-            <a:schemeClr val="accent1"/>
-          </a:effectRef>
-          <a:fontRef idx="minor">
-            <a:schemeClr val="lt1"/>
-          </a:fontRef>
-        </p:style>
-        <p:txBody>
-          <a:bodyPr rtlCol="0" anchor="ctr"/>
-          <a:lstStyle/>
-          <a:p>
-            <a:pPr algn="ctr"/>
-            <a:r>
-              <a:rPr lang="en-GB" dirty="0" smtClean="0">
-                <a:solidFill>
-                  <a:schemeClr val="tx1"/>
-                </a:solidFill>
-              </a:rPr>
-              <a:t>Josh Main Screenshot</a:t>
-            </a:r>
-            <a:endParaRPr lang="en-GB" dirty="0">
-              <a:solidFill>
-                <a:schemeClr val="tx1"/>
-              </a:solidFill>
-            </a:endParaRPr>
-          </a:p>
-        </p:txBody>
-      </p:sp>
       <p:pic>
         <p:nvPicPr>
           <p:cNvPr id="15" name="Picture 14"/>
@@ -16635,6 +16444,156 @@
           </a:prstGeom>
         </p:spPr>
       </p:pic>
+      <p:pic>
+        <p:nvPicPr>
+          <p:cNvPr id="2" name="Picture 1"/>
+          <p:cNvPicPr>
+            <a:picLocks noChangeAspect="1"/>
+          </p:cNvPicPr>
+          <p:nvPr/>
+        </p:nvPicPr>
+        <p:blipFill>
+          <a:blip r:embed="rId3">
+            <a:extLst>
+              <a:ext uri="{28A0092B-C50C-407E-A947-70E740481C1C}">
+                <a14:useLocalDpi xmlns:a14="http://schemas.microsoft.com/office/drawing/2010/main" val="0"/>
+              </a:ext>
+            </a:extLst>
+          </a:blip>
+          <a:stretch>
+            <a:fillRect/>
+          </a:stretch>
+        </p:blipFill>
+        <p:spPr>
+          <a:xfrm>
+            <a:off x="6516216" y="3432611"/>
+            <a:ext cx="1864931" cy="2981721"/>
+          </a:xfrm>
+          <a:prstGeom prst="rect">
+            <a:avLst/>
+          </a:prstGeom>
+        </p:spPr>
+      </p:pic>
+      <p:pic>
+        <p:nvPicPr>
+          <p:cNvPr id="3" name="Picture 2"/>
+          <p:cNvPicPr>
+            <a:picLocks noChangeAspect="1"/>
+          </p:cNvPicPr>
+          <p:nvPr/>
+        </p:nvPicPr>
+        <p:blipFill>
+          <a:blip r:embed="rId4">
+            <a:extLst>
+              <a:ext uri="{28A0092B-C50C-407E-A947-70E740481C1C}">
+                <a14:useLocalDpi xmlns:a14="http://schemas.microsoft.com/office/drawing/2010/main" val="0"/>
+              </a:ext>
+            </a:extLst>
+          </a:blip>
+          <a:stretch>
+            <a:fillRect/>
+          </a:stretch>
+        </p:blipFill>
+        <p:spPr>
+          <a:xfrm>
+            <a:off x="654658" y="3432611"/>
+            <a:ext cx="1901118" cy="2746579"/>
+          </a:xfrm>
+          <a:prstGeom prst="rect">
+            <a:avLst/>
+          </a:prstGeom>
+        </p:spPr>
+      </p:pic>
+      <p:pic>
+        <p:nvPicPr>
+          <p:cNvPr id="8" name="Picture 7"/>
+          <p:cNvPicPr>
+            <a:picLocks noChangeAspect="1"/>
+          </p:cNvPicPr>
+          <p:nvPr/>
+        </p:nvPicPr>
+        <p:blipFill>
+          <a:blip r:embed="rId5">
+            <a:extLst>
+              <a:ext uri="{28A0092B-C50C-407E-A947-70E740481C1C}">
+                <a14:useLocalDpi xmlns:a14="http://schemas.microsoft.com/office/drawing/2010/main" val="0"/>
+              </a:ext>
+            </a:extLst>
+          </a:blip>
+          <a:stretch>
+            <a:fillRect/>
+          </a:stretch>
+        </p:blipFill>
+        <p:spPr>
+          <a:xfrm>
+            <a:off x="792690" y="405233"/>
+            <a:ext cx="1763086" cy="2840528"/>
+          </a:xfrm>
+          <a:prstGeom prst="rect">
+            <a:avLst/>
+          </a:prstGeom>
+        </p:spPr>
+      </p:pic>
+      <p:pic>
+        <p:nvPicPr>
+          <p:cNvPr id="17" name="Picture 16"/>
+          <p:cNvPicPr>
+            <a:picLocks noChangeAspect="1"/>
+          </p:cNvPicPr>
+          <p:nvPr/>
+        </p:nvPicPr>
+        <p:blipFill>
+          <a:blip r:embed="rId6">
+            <a:extLst>
+              <a:ext uri="{28A0092B-C50C-407E-A947-70E740481C1C}">
+                <a14:useLocalDpi xmlns:a14="http://schemas.microsoft.com/office/drawing/2010/main" val="0"/>
+              </a:ext>
+            </a:extLst>
+          </a:blip>
+          <a:stretch>
+            <a:fillRect/>
+          </a:stretch>
+        </p:blipFill>
+        <p:spPr>
+          <a:xfrm>
+            <a:off x="6168226" y="789959"/>
+            <a:ext cx="1631285" cy="2580483"/>
+          </a:xfrm>
+          <a:prstGeom prst="rect">
+            <a:avLst/>
+          </a:prstGeom>
+        </p:spPr>
+      </p:pic>
+      <p:sp>
+        <p:nvSpPr>
+          <p:cNvPr id="18" name="Title 1"/>
+          <p:cNvSpPr>
+            <a:spLocks noGrp="1"/>
+          </p:cNvSpPr>
+          <p:nvPr>
+            <p:ph type="title"/>
+          </p:nvPr>
+        </p:nvSpPr>
+        <p:spPr>
+          <a:xfrm>
+            <a:off x="2705072" y="789959"/>
+            <a:ext cx="3407396" cy="601136"/>
+          </a:xfrm>
+        </p:spPr>
+        <p:txBody>
+          <a:bodyPr>
+            <a:normAutofit/>
+          </a:bodyPr>
+          <a:lstStyle/>
+          <a:p>
+            <a:r>
+              <a:rPr lang="en-GB" sz="2800" dirty="0" smtClean="0"/>
+              <a:t>Example: Main Menu</a:t>
+            </a:r>
+            <a:endParaRPr lang="en-GB" sz="2800" dirty="0"/>
+          </a:p>
+        </p:txBody>
+      </p:sp>
     </p:spTree>
     <p:extLst>
       <p:ext uri="{BB962C8B-B14F-4D97-AF65-F5344CB8AC3E}">
@@ -16648,7 +16607,399 @@
   <p:timing>
     <p:tnLst>
       <p:par>
-        <p:cTn id="1" dur="indefinite" restart="never" nodeType="tmRoot"/>
+        <p:cTn id="1" dur="indefinite" restart="never" nodeType="tmRoot">
+          <p:childTnLst>
+            <p:seq concurrent="1" nextAc="seek">
+              <p:cTn id="2" dur="indefinite" nodeType="mainSeq">
+                <p:childTnLst>
+                  <p:par>
+                    <p:cTn id="3" fill="hold">
+                      <p:stCondLst>
+                        <p:cond delay="indefinite"/>
+                      </p:stCondLst>
+                      <p:childTnLst>
+                        <p:par>
+                          <p:cTn id="4" fill="hold">
+                            <p:stCondLst>
+                              <p:cond delay="0"/>
+                            </p:stCondLst>
+                            <p:childTnLst>
+                              <p:par>
+                                <p:cTn id="5" presetID="10" presetClass="entr" presetSubtype="0" fill="hold" nodeType="clickEffect">
+                                  <p:stCondLst>
+                                    <p:cond delay="0"/>
+                                  </p:stCondLst>
+                                  <p:childTnLst>
+                                    <p:set>
+                                      <p:cBhvr>
+                                        <p:cTn id="6" dur="1" fill="hold">
+                                          <p:stCondLst>
+                                            <p:cond delay="0"/>
+                                          </p:stCondLst>
+                                        </p:cTn>
+                                        <p:tgtEl>
+                                          <p:spTgt spid="8"/>
+                                        </p:tgtEl>
+                                        <p:attrNameLst>
+                                          <p:attrName>style.visibility</p:attrName>
+                                        </p:attrNameLst>
+                                      </p:cBhvr>
+                                      <p:to>
+                                        <p:strVal val="visible"/>
+                                      </p:to>
+                                    </p:set>
+                                    <p:animEffect transition="in" filter="fade">
+                                      <p:cBhvr>
+                                        <p:cTn id="7" dur="1000"/>
+                                        <p:tgtEl>
+                                          <p:spTgt spid="8"/>
+                                        </p:tgtEl>
+                                      </p:cBhvr>
+                                    </p:animEffect>
+                                  </p:childTnLst>
+                                </p:cTn>
+                              </p:par>
+                              <p:par>
+                                <p:cTn id="8" presetID="10" presetClass="entr" presetSubtype="0" fill="hold" nodeType="withEffect">
+                                  <p:stCondLst>
+                                    <p:cond delay="0"/>
+                                  </p:stCondLst>
+                                  <p:childTnLst>
+                                    <p:set>
+                                      <p:cBhvr>
+                                        <p:cTn id="9" dur="1" fill="hold">
+                                          <p:stCondLst>
+                                            <p:cond delay="0"/>
+                                          </p:stCondLst>
+                                        </p:cTn>
+                                        <p:tgtEl>
+                                          <p:spTgt spid="7"/>
+                                        </p:tgtEl>
+                                        <p:attrNameLst>
+                                          <p:attrName>style.visibility</p:attrName>
+                                        </p:attrNameLst>
+                                      </p:cBhvr>
+                                      <p:to>
+                                        <p:strVal val="visible"/>
+                                      </p:to>
+                                    </p:set>
+                                    <p:animEffect transition="in" filter="fade">
+                                      <p:cBhvr>
+                                        <p:cTn id="10" dur="1000"/>
+                                        <p:tgtEl>
+                                          <p:spTgt spid="7"/>
+                                        </p:tgtEl>
+                                      </p:cBhvr>
+                                    </p:animEffect>
+                                  </p:childTnLst>
+                                </p:cTn>
+                              </p:par>
+                            </p:childTnLst>
+                          </p:cTn>
+                        </p:par>
+                        <p:par>
+                          <p:cTn id="11" fill="hold">
+                            <p:stCondLst>
+                              <p:cond delay="1000"/>
+                            </p:stCondLst>
+                            <p:childTnLst>
+                              <p:par>
+                                <p:cTn id="12" presetID="10" presetClass="entr" presetSubtype="0" fill="hold" nodeType="afterEffect">
+                                  <p:stCondLst>
+                                    <p:cond delay="0"/>
+                                  </p:stCondLst>
+                                  <p:childTnLst>
+                                    <p:set>
+                                      <p:cBhvr>
+                                        <p:cTn id="13" dur="1" fill="hold">
+                                          <p:stCondLst>
+                                            <p:cond delay="0"/>
+                                          </p:stCondLst>
+                                        </p:cTn>
+                                        <p:tgtEl>
+                                          <p:spTgt spid="3"/>
+                                        </p:tgtEl>
+                                        <p:attrNameLst>
+                                          <p:attrName>style.visibility</p:attrName>
+                                        </p:attrNameLst>
+                                      </p:cBhvr>
+                                      <p:to>
+                                        <p:strVal val="visible"/>
+                                      </p:to>
+                                    </p:set>
+                                    <p:animEffect transition="in" filter="fade">
+                                      <p:cBhvr>
+                                        <p:cTn id="14" dur="1000"/>
+                                        <p:tgtEl>
+                                          <p:spTgt spid="3"/>
+                                        </p:tgtEl>
+                                      </p:cBhvr>
+                                    </p:animEffect>
+                                  </p:childTnLst>
+                                </p:cTn>
+                              </p:par>
+                              <p:par>
+                                <p:cTn id="15" presetID="10" presetClass="entr" presetSubtype="0" fill="hold" nodeType="withEffect">
+                                  <p:stCondLst>
+                                    <p:cond delay="0"/>
+                                  </p:stCondLst>
+                                  <p:childTnLst>
+                                    <p:set>
+                                      <p:cBhvr>
+                                        <p:cTn id="16" dur="1" fill="hold">
+                                          <p:stCondLst>
+                                            <p:cond delay="0"/>
+                                          </p:stCondLst>
+                                        </p:cTn>
+                                        <p:tgtEl>
+                                          <p:spTgt spid="4"/>
+                                        </p:tgtEl>
+                                        <p:attrNameLst>
+                                          <p:attrName>style.visibility</p:attrName>
+                                        </p:attrNameLst>
+                                      </p:cBhvr>
+                                      <p:to>
+                                        <p:strVal val="visible"/>
+                                      </p:to>
+                                    </p:set>
+                                    <p:animEffect transition="in" filter="fade">
+                                      <p:cBhvr>
+                                        <p:cTn id="17" dur="1000"/>
+                                        <p:tgtEl>
+                                          <p:spTgt spid="4"/>
+                                        </p:tgtEl>
+                                      </p:cBhvr>
+                                    </p:animEffect>
+                                  </p:childTnLst>
+                                </p:cTn>
+                              </p:par>
+                            </p:childTnLst>
+                          </p:cTn>
+                        </p:par>
+                        <p:par>
+                          <p:cTn id="18" fill="hold">
+                            <p:stCondLst>
+                              <p:cond delay="2000"/>
+                            </p:stCondLst>
+                            <p:childTnLst>
+                              <p:par>
+                                <p:cTn id="19" presetID="10" presetClass="entr" presetSubtype="0" fill="hold" nodeType="afterEffect">
+                                  <p:stCondLst>
+                                    <p:cond delay="0"/>
+                                  </p:stCondLst>
+                                  <p:childTnLst>
+                                    <p:set>
+                                      <p:cBhvr>
+                                        <p:cTn id="20" dur="1" fill="hold">
+                                          <p:stCondLst>
+                                            <p:cond delay="0"/>
+                                          </p:stCondLst>
+                                        </p:cTn>
+                                        <p:tgtEl>
+                                          <p:spTgt spid="2"/>
+                                        </p:tgtEl>
+                                        <p:attrNameLst>
+                                          <p:attrName>style.visibility</p:attrName>
+                                        </p:attrNameLst>
+                                      </p:cBhvr>
+                                      <p:to>
+                                        <p:strVal val="visible"/>
+                                      </p:to>
+                                    </p:set>
+                                    <p:animEffect transition="in" filter="fade">
+                                      <p:cBhvr>
+                                        <p:cTn id="21" dur="1000"/>
+                                        <p:tgtEl>
+                                          <p:spTgt spid="2"/>
+                                        </p:tgtEl>
+                                      </p:cBhvr>
+                                    </p:animEffect>
+                                  </p:childTnLst>
+                                </p:cTn>
+                              </p:par>
+                              <p:par>
+                                <p:cTn id="22" presetID="10" presetClass="entr" presetSubtype="0" fill="hold" nodeType="withEffect">
+                                  <p:stCondLst>
+                                    <p:cond delay="0"/>
+                                  </p:stCondLst>
+                                  <p:childTnLst>
+                                    <p:set>
+                                      <p:cBhvr>
+                                        <p:cTn id="23" dur="1" fill="hold">
+                                          <p:stCondLst>
+                                            <p:cond delay="0"/>
+                                          </p:stCondLst>
+                                        </p:cTn>
+                                        <p:tgtEl>
+                                          <p:spTgt spid="6"/>
+                                        </p:tgtEl>
+                                        <p:attrNameLst>
+                                          <p:attrName>style.visibility</p:attrName>
+                                        </p:attrNameLst>
+                                      </p:cBhvr>
+                                      <p:to>
+                                        <p:strVal val="visible"/>
+                                      </p:to>
+                                    </p:set>
+                                    <p:animEffect transition="in" filter="fade">
+                                      <p:cBhvr>
+                                        <p:cTn id="24" dur="1000"/>
+                                        <p:tgtEl>
+                                          <p:spTgt spid="6"/>
+                                        </p:tgtEl>
+                                      </p:cBhvr>
+                                    </p:animEffect>
+                                  </p:childTnLst>
+                                </p:cTn>
+                              </p:par>
+                            </p:childTnLst>
+                          </p:cTn>
+                        </p:par>
+                        <p:par>
+                          <p:cTn id="25" fill="hold">
+                            <p:stCondLst>
+                              <p:cond delay="3000"/>
+                            </p:stCondLst>
+                            <p:childTnLst>
+                              <p:par>
+                                <p:cTn id="26" presetID="10" presetClass="entr" presetSubtype="0" fill="hold" nodeType="afterEffect">
+                                  <p:stCondLst>
+                                    <p:cond delay="0"/>
+                                  </p:stCondLst>
+                                  <p:childTnLst>
+                                    <p:set>
+                                      <p:cBhvr>
+                                        <p:cTn id="27" dur="1" fill="hold">
+                                          <p:stCondLst>
+                                            <p:cond delay="0"/>
+                                          </p:stCondLst>
+                                        </p:cTn>
+                                        <p:tgtEl>
+                                          <p:spTgt spid="17"/>
+                                        </p:tgtEl>
+                                        <p:attrNameLst>
+                                          <p:attrName>style.visibility</p:attrName>
+                                        </p:attrNameLst>
+                                      </p:cBhvr>
+                                      <p:to>
+                                        <p:strVal val="visible"/>
+                                      </p:to>
+                                    </p:set>
+                                    <p:animEffect transition="in" filter="fade">
+                                      <p:cBhvr>
+                                        <p:cTn id="28" dur="1000"/>
+                                        <p:tgtEl>
+                                          <p:spTgt spid="17"/>
+                                        </p:tgtEl>
+                                      </p:cBhvr>
+                                    </p:animEffect>
+                                  </p:childTnLst>
+                                </p:cTn>
+                              </p:par>
+                              <p:par>
+                                <p:cTn id="29" presetID="10" presetClass="entr" presetSubtype="0" fill="hold" nodeType="withEffect">
+                                  <p:stCondLst>
+                                    <p:cond delay="0"/>
+                                  </p:stCondLst>
+                                  <p:childTnLst>
+                                    <p:set>
+                                      <p:cBhvr>
+                                        <p:cTn id="30" dur="1" fill="hold">
+                                          <p:stCondLst>
+                                            <p:cond delay="0"/>
+                                          </p:stCondLst>
+                                        </p:cTn>
+                                        <p:tgtEl>
+                                          <p:spTgt spid="5"/>
+                                        </p:tgtEl>
+                                        <p:attrNameLst>
+                                          <p:attrName>style.visibility</p:attrName>
+                                        </p:attrNameLst>
+                                      </p:cBhvr>
+                                      <p:to>
+                                        <p:strVal val="visible"/>
+                                      </p:to>
+                                    </p:set>
+                                    <p:animEffect transition="in" filter="fade">
+                                      <p:cBhvr>
+                                        <p:cTn id="31" dur="1000"/>
+                                        <p:tgtEl>
+                                          <p:spTgt spid="5"/>
+                                        </p:tgtEl>
+                                      </p:cBhvr>
+                                    </p:animEffect>
+                                  </p:childTnLst>
+                                </p:cTn>
+                              </p:par>
+                            </p:childTnLst>
+                          </p:cTn>
+                        </p:par>
+                        <p:par>
+                          <p:cTn id="32" fill="hold">
+                            <p:stCondLst>
+                              <p:cond delay="4000"/>
+                            </p:stCondLst>
+                            <p:childTnLst>
+                              <p:par>
+                                <p:cTn id="33" presetID="10" presetClass="entr" presetSubtype="0" fill="hold" nodeType="afterEffect">
+                                  <p:stCondLst>
+                                    <p:cond delay="0"/>
+                                  </p:stCondLst>
+                                  <p:childTnLst>
+                                    <p:set>
+                                      <p:cBhvr>
+                                        <p:cTn id="34" dur="1" fill="hold">
+                                          <p:stCondLst>
+                                            <p:cond delay="0"/>
+                                          </p:stCondLst>
+                                        </p:cTn>
+                                        <p:tgtEl>
+                                          <p:spTgt spid="15"/>
+                                        </p:tgtEl>
+                                        <p:attrNameLst>
+                                          <p:attrName>style.visibility</p:attrName>
+                                        </p:attrNameLst>
+                                      </p:cBhvr>
+                                      <p:to>
+                                        <p:strVal val="visible"/>
+                                      </p:to>
+                                    </p:set>
+                                    <p:animEffect transition="in" filter="fade">
+                                      <p:cBhvr>
+                                        <p:cTn id="35" dur="1500"/>
+                                        <p:tgtEl>
+                                          <p:spTgt spid="15"/>
+                                        </p:tgtEl>
+                                      </p:cBhvr>
+                                    </p:animEffect>
+                                  </p:childTnLst>
+                                </p:cTn>
+                              </p:par>
+                            </p:childTnLst>
+                          </p:cTn>
+                        </p:par>
+                      </p:childTnLst>
+                    </p:cTn>
+                  </p:par>
+                </p:childTnLst>
+              </p:cTn>
+              <p:prevCondLst>
+                <p:cond evt="onPrev" delay="0">
+                  <p:tgtEl>
+                    <p:sldTgt/>
+                  </p:tgtEl>
+                </p:cond>
+              </p:prevCondLst>
+              <p:nextCondLst>
+                <p:cond evt="onNext" delay="0">
+                  <p:tgtEl>
+                    <p:sldTgt/>
+                  </p:tgtEl>
+                </p:cond>
+              </p:nextCondLst>
+            </p:seq>
+          </p:childTnLst>
+        </p:cTn>
       </p:par>
     </p:tnLst>
   </p:timing>
@@ -16658,7 +17009,7 @@
 <file path=ppt/theme/theme1.xml><?xml version="1.0" encoding="utf-8"?>
 <a:theme xmlns:a="http://schemas.openxmlformats.org/drawingml/2006/main" name="Austin">
   <a:themeElements>
-    <a:clrScheme name="Custom 1">
+    <a:clrScheme name="Custom 3">
       <a:dk1>
         <a:sysClr val="windowText" lastClr="000000"/>
       </a:dk1>
@@ -16669,10 +17020,10 @@
         <a:srgbClr val="3E3D2D"/>
       </a:dk2>
       <a:lt2>
-        <a:srgbClr val="35812F"/>
+        <a:srgbClr val="006A4C"/>
       </a:lt2>
       <a:accent1>
-        <a:srgbClr val="35812F"/>
+        <a:srgbClr val="006A4C"/>
       </a:accent1>
       <a:accent2>
         <a:srgbClr val="71685A"/>

</xml_diff>

<commit_message>
Added options slide to powerpoint.
see title.
</commit_message>
<xml_diff>
--- a/Powerpoint for Dragons Den/Dragons Den Presentation.pptx
+++ b/Powerpoint for Dragons Den/Dragons Den Presentation.pptx
@@ -5,17 +5,23 @@
     <p:sldMasterId id="2147483660" r:id="rId1"/>
   </p:sldMasterIdLst>
   <p:notesMasterIdLst>
-    <p:notesMasterId r:id="rId10"/>
+    <p:notesMasterId r:id="rId16"/>
   </p:notesMasterIdLst>
   <p:sldIdLst>
     <p:sldId id="256" r:id="rId2"/>
-    <p:sldId id="260" r:id="rId3"/>
+    <p:sldId id="274" r:id="rId3"/>
     <p:sldId id="259" r:id="rId4"/>
-    <p:sldId id="257" r:id="rId5"/>
-    <p:sldId id="258" r:id="rId6"/>
+    <p:sldId id="265" r:id="rId5"/>
+    <p:sldId id="264" r:id="rId6"/>
     <p:sldId id="261" r:id="rId7"/>
-    <p:sldId id="262" r:id="rId8"/>
-    <p:sldId id="263" r:id="rId9"/>
+    <p:sldId id="268" r:id="rId8"/>
+    <p:sldId id="269" r:id="rId9"/>
+    <p:sldId id="273" r:id="rId10"/>
+    <p:sldId id="272" r:id="rId11"/>
+    <p:sldId id="270" r:id="rId12"/>
+    <p:sldId id="271" r:id="rId13"/>
+    <p:sldId id="267" r:id="rId14"/>
+    <p:sldId id="275" r:id="rId15"/>
   </p:sldIdLst>
   <p:sldSz cx="9144000" cy="6858000" type="screen4x3"/>
   <p:notesSz cx="6858000" cy="9144000"/>
@@ -114,6 +120,22 @@
       </a:defRPr>
     </a:lvl9pPr>
   </p:defaultTextStyle>
+  <p:extLst>
+    <p:ext uri="{EFAFB233-063F-42B5-8137-9DF3F51BA10A}">
+      <p15:sldGuideLst xmlns="" xmlns:p15="http://schemas.microsoft.com/office/powerpoint/2012/main">
+        <p15:guide id="1" orient="horz" pos="2160">
+          <p15:clr>
+            <a:srgbClr val="A4A3A4"/>
+          </p15:clr>
+        </p15:guide>
+        <p15:guide id="2" pos="2880">
+          <p15:clr>
+            <a:srgbClr val="A4A3A4"/>
+          </p15:clr>
+        </p15:guide>
+      </p15:sldGuideLst>
+    </p:ext>
+  </p:extLst>
 </p:presentation>
 </file>
 
@@ -199,7 +221,8 @@
           <a:p>
             <a:fld id="{E60F5323-8565-4D5C-8D97-A0D85F0F25EA}" type="datetimeFigureOut">
               <a:rPr lang="en-GB" smtClean="0"/>
-              <a:t>20/11/2014</a:t>
+              <a:pPr/>
+              <a:t>24/11/2014</a:t>
             </a:fld>
             <a:endParaRPr lang="en-GB"/>
           </a:p>
@@ -358,6 +381,7 @@
           <a:p>
             <a:fld id="{54261E1A-D829-4B13-8E47-3FA50A360041}" type="slidenum">
               <a:rPr lang="en-GB" smtClean="0"/>
+              <a:pPr/>
               <a:t>‹#›</a:t>
             </a:fld>
             <a:endParaRPr lang="en-GB"/>
@@ -508,7 +532,9 @@
         </p:nvSpPr>
         <p:spPr/>
         <p:txBody>
-          <a:bodyPr/>
+          <a:bodyPr>
+            <a:normAutofit/>
+          </a:bodyPr>
           <a:lstStyle/>
           <a:p>
             <a:r>
@@ -525,9 +551,8 @@
             </a:r>
             <a:r>
               <a:rPr lang="en-GB" baseline="0" dirty="0" smtClean="0"/>
-              <a:t> straight away, and possibly say something like “I’m Matt and this is &lt;Other speaker&gt;, and this is the rest of the development team”</a:t>
+              <a:t> straight away, and introduce everyone from the team. This will give Lloyds a better impression of our team as a whole </a:t>
             </a:r>
-            <a:endParaRPr lang="en-GB" dirty="0"/>
           </a:p>
         </p:txBody>
       </p:sp>
@@ -548,7 +573,8 @@
           <a:p>
             <a:fld id="{54261E1A-D829-4B13-8E47-3FA50A360041}" type="slidenum">
               <a:rPr lang="en-GB" smtClean="0"/>
-              <a:t>2</a:t>
+              <a:pPr/>
+              <a:t>1</a:t>
             </a:fld>
             <a:endParaRPr lang="en-GB"/>
           </a:p>
@@ -557,7 +583,492 @@
     </p:spTree>
     <p:extLst>
       <p:ext uri="{BB962C8B-B14F-4D97-AF65-F5344CB8AC3E}">
-        <p14:creationId xmlns:p14="http://schemas.microsoft.com/office/powerpoint/2010/main" val="3559104527"/>
+        <p14:creationId xmlns:p14="http://schemas.microsoft.com/office/powerpoint/2010/main" val="3447559528"/>
+      </p:ext>
+    </p:extLst>
+  </p:cSld>
+  <p:clrMapOvr>
+    <a:masterClrMapping/>
+  </p:clrMapOvr>
+</p:notes>
+</file>
+
+<file path=ppt/notesSlides/notesSlide10.xml><?xml version="1.0" encoding="utf-8"?>
+<p:notes xmlns:a="http://schemas.openxmlformats.org/drawingml/2006/main" xmlns:r="http://schemas.openxmlformats.org/officeDocument/2006/relationships" xmlns:p="http://schemas.openxmlformats.org/presentationml/2006/main">
+  <p:cSld>
+    <p:spTree>
+      <p:nvGrpSpPr>
+        <p:cNvPr id="1" name=""/>
+        <p:cNvGrpSpPr/>
+        <p:nvPr/>
+      </p:nvGrpSpPr>
+      <p:grpSpPr>
+        <a:xfrm>
+          <a:off x="0" y="0"/>
+          <a:ext cx="0" cy="0"/>
+          <a:chOff x="0" y="0"/>
+          <a:chExt cx="0" cy="0"/>
+        </a:xfrm>
+      </p:grpSpPr>
+      <p:sp>
+        <p:nvSpPr>
+          <p:cNvPr id="2" name="Slide Image Placeholder 1"/>
+          <p:cNvSpPr>
+            <a:spLocks noGrp="1" noRot="1" noChangeAspect="1"/>
+          </p:cNvSpPr>
+          <p:nvPr>
+            <p:ph type="sldImg"/>
+          </p:nvPr>
+        </p:nvSpPr>
+        <p:spPr/>
+      </p:sp>
+      <p:sp>
+        <p:nvSpPr>
+          <p:cNvPr id="3" name="Notes Placeholder 2"/>
+          <p:cNvSpPr>
+            <a:spLocks noGrp="1"/>
+          </p:cNvSpPr>
+          <p:nvPr>
+            <p:ph type="body" idx="1"/>
+          </p:nvPr>
+        </p:nvSpPr>
+        <p:spPr/>
+        <p:txBody>
+          <a:bodyPr/>
+          <a:lstStyle/>
+          <a:p>
+            <a:r>
+              <a:rPr lang="en-GB" dirty="0" smtClean="0"/>
+              <a:t>Shows</a:t>
+            </a:r>
+            <a:r>
+              <a:rPr lang="en-GB" baseline="0" dirty="0" smtClean="0"/>
+              <a:t> </a:t>
+            </a:r>
+            <a:r>
+              <a:rPr lang="en-GB" baseline="0" dirty="0" err="1" smtClean="0"/>
+              <a:t>lloyds</a:t>
+            </a:r>
+            <a:r>
+              <a:rPr lang="en-GB" baseline="0" dirty="0" smtClean="0"/>
+              <a:t> </a:t>
+            </a:r>
+            <a:r>
+              <a:rPr lang="en-GB" baseline="0" dirty="0" err="1" smtClean="0"/>
+              <a:t>latests</a:t>
+            </a:r>
+            <a:r>
+              <a:rPr lang="en-GB" baseline="0" dirty="0" smtClean="0"/>
+              <a:t> student accounts and deals. </a:t>
+            </a:r>
+            <a:endParaRPr lang="en-GB" dirty="0"/>
+          </a:p>
+        </p:txBody>
+      </p:sp>
+      <p:sp>
+        <p:nvSpPr>
+          <p:cNvPr id="4" name="Slide Number Placeholder 3"/>
+          <p:cNvSpPr>
+            <a:spLocks noGrp="1"/>
+          </p:cNvSpPr>
+          <p:nvPr>
+            <p:ph type="sldNum" sz="quarter" idx="10"/>
+          </p:nvPr>
+        </p:nvSpPr>
+        <p:spPr/>
+        <p:txBody>
+          <a:bodyPr/>
+          <a:lstStyle/>
+          <a:p>
+            <a:fld id="{54261E1A-D829-4B13-8E47-3FA50A360041}" type="slidenum">
+              <a:rPr lang="en-GB" smtClean="0"/>
+              <a:pPr/>
+              <a:t>10</a:t>
+            </a:fld>
+            <a:endParaRPr lang="en-GB"/>
+          </a:p>
+        </p:txBody>
+      </p:sp>
+    </p:spTree>
+    <p:extLst>
+      <p:ext uri="{BB962C8B-B14F-4D97-AF65-F5344CB8AC3E}">
+        <p14:creationId xmlns:p14="http://schemas.microsoft.com/office/powerpoint/2010/main" val="3573345242"/>
+      </p:ext>
+    </p:extLst>
+  </p:cSld>
+  <p:clrMapOvr>
+    <a:masterClrMapping/>
+  </p:clrMapOvr>
+</p:notes>
+</file>
+
+<file path=ppt/notesSlides/notesSlide11.xml><?xml version="1.0" encoding="utf-8"?>
+<p:notes xmlns:a="http://schemas.openxmlformats.org/drawingml/2006/main" xmlns:r="http://schemas.openxmlformats.org/officeDocument/2006/relationships" xmlns:p="http://schemas.openxmlformats.org/presentationml/2006/main">
+  <p:cSld>
+    <p:spTree>
+      <p:nvGrpSpPr>
+        <p:cNvPr id="1" name=""/>
+        <p:cNvGrpSpPr/>
+        <p:nvPr/>
+      </p:nvGrpSpPr>
+      <p:grpSpPr>
+        <a:xfrm>
+          <a:off x="0" y="0"/>
+          <a:ext cx="0" cy="0"/>
+          <a:chOff x="0" y="0"/>
+          <a:chExt cx="0" cy="0"/>
+        </a:xfrm>
+      </p:grpSpPr>
+      <p:sp>
+        <p:nvSpPr>
+          <p:cNvPr id="2" name="Slide Image Placeholder 1"/>
+          <p:cNvSpPr>
+            <a:spLocks noGrp="1" noRot="1" noChangeAspect="1"/>
+          </p:cNvSpPr>
+          <p:nvPr>
+            <p:ph type="sldImg"/>
+          </p:nvPr>
+        </p:nvSpPr>
+        <p:spPr/>
+      </p:sp>
+      <p:sp>
+        <p:nvSpPr>
+          <p:cNvPr id="3" name="Notes Placeholder 2"/>
+          <p:cNvSpPr>
+            <a:spLocks noGrp="1"/>
+          </p:cNvSpPr>
+          <p:nvPr>
+            <p:ph type="body" idx="1"/>
+          </p:nvPr>
+        </p:nvSpPr>
+        <p:spPr/>
+        <p:txBody>
+          <a:bodyPr/>
+          <a:lstStyle/>
+          <a:p>
+            <a:r>
+              <a:rPr lang="en-GB" dirty="0" smtClean="0"/>
+              <a:t>Allows user to transfer</a:t>
+            </a:r>
+            <a:r>
+              <a:rPr lang="en-GB" baseline="0" dirty="0" smtClean="0"/>
+              <a:t> among personal accounts but also to an external account. </a:t>
+            </a:r>
+            <a:endParaRPr lang="en-GB" dirty="0"/>
+          </a:p>
+        </p:txBody>
+      </p:sp>
+      <p:sp>
+        <p:nvSpPr>
+          <p:cNvPr id="4" name="Slide Number Placeholder 3"/>
+          <p:cNvSpPr>
+            <a:spLocks noGrp="1"/>
+          </p:cNvSpPr>
+          <p:nvPr>
+            <p:ph type="sldNum" sz="quarter" idx="10"/>
+          </p:nvPr>
+        </p:nvSpPr>
+        <p:spPr/>
+        <p:txBody>
+          <a:bodyPr/>
+          <a:lstStyle/>
+          <a:p>
+            <a:fld id="{54261E1A-D829-4B13-8E47-3FA50A360041}" type="slidenum">
+              <a:rPr lang="en-GB" smtClean="0"/>
+              <a:pPr/>
+              <a:t>11</a:t>
+            </a:fld>
+            <a:endParaRPr lang="en-GB"/>
+          </a:p>
+        </p:txBody>
+      </p:sp>
+    </p:spTree>
+    <p:extLst>
+      <p:ext uri="{BB962C8B-B14F-4D97-AF65-F5344CB8AC3E}">
+        <p14:creationId xmlns:p14="http://schemas.microsoft.com/office/powerpoint/2010/main" val="3029729858"/>
+      </p:ext>
+    </p:extLst>
+  </p:cSld>
+  <p:clrMapOvr>
+    <a:masterClrMapping/>
+  </p:clrMapOvr>
+</p:notes>
+</file>
+
+<file path=ppt/notesSlides/notesSlide12.xml><?xml version="1.0" encoding="utf-8"?>
+<p:notes xmlns:a="http://schemas.openxmlformats.org/drawingml/2006/main" xmlns:r="http://schemas.openxmlformats.org/officeDocument/2006/relationships" xmlns:p="http://schemas.openxmlformats.org/presentationml/2006/main">
+  <p:cSld>
+    <p:spTree>
+      <p:nvGrpSpPr>
+        <p:cNvPr id="1" name=""/>
+        <p:cNvGrpSpPr/>
+        <p:nvPr/>
+      </p:nvGrpSpPr>
+      <p:grpSpPr>
+        <a:xfrm>
+          <a:off x="0" y="0"/>
+          <a:ext cx="0" cy="0"/>
+          <a:chOff x="0" y="0"/>
+          <a:chExt cx="0" cy="0"/>
+        </a:xfrm>
+      </p:grpSpPr>
+      <p:sp>
+        <p:nvSpPr>
+          <p:cNvPr id="2" name="Slide Image Placeholder 1"/>
+          <p:cNvSpPr>
+            <a:spLocks noGrp="1" noRot="1" noChangeAspect="1"/>
+          </p:cNvSpPr>
+          <p:nvPr>
+            <p:ph type="sldImg"/>
+          </p:nvPr>
+        </p:nvSpPr>
+        <p:spPr/>
+      </p:sp>
+      <p:sp>
+        <p:nvSpPr>
+          <p:cNvPr id="3" name="Notes Placeholder 2"/>
+          <p:cNvSpPr>
+            <a:spLocks noGrp="1"/>
+          </p:cNvSpPr>
+          <p:nvPr>
+            <p:ph type="body" idx="1"/>
+          </p:nvPr>
+        </p:nvSpPr>
+        <p:spPr/>
+        <p:txBody>
+          <a:bodyPr/>
+          <a:lstStyle/>
+          <a:p>
+            <a:r>
+              <a:rPr lang="en-GB" dirty="0" smtClean="0"/>
+              <a:t>Allows the user to find</a:t>
+            </a:r>
+            <a:r>
+              <a:rPr lang="en-GB" baseline="0" dirty="0" smtClean="0"/>
+              <a:t> a near by branch. </a:t>
+            </a:r>
+            <a:endParaRPr lang="en-GB" dirty="0"/>
+          </a:p>
+        </p:txBody>
+      </p:sp>
+      <p:sp>
+        <p:nvSpPr>
+          <p:cNvPr id="4" name="Slide Number Placeholder 3"/>
+          <p:cNvSpPr>
+            <a:spLocks noGrp="1"/>
+          </p:cNvSpPr>
+          <p:nvPr>
+            <p:ph type="sldNum" sz="quarter" idx="10"/>
+          </p:nvPr>
+        </p:nvSpPr>
+        <p:spPr/>
+        <p:txBody>
+          <a:bodyPr/>
+          <a:lstStyle/>
+          <a:p>
+            <a:fld id="{54261E1A-D829-4B13-8E47-3FA50A360041}" type="slidenum">
+              <a:rPr lang="en-GB" smtClean="0"/>
+              <a:pPr/>
+              <a:t>12</a:t>
+            </a:fld>
+            <a:endParaRPr lang="en-GB"/>
+          </a:p>
+        </p:txBody>
+      </p:sp>
+    </p:spTree>
+    <p:extLst>
+      <p:ext uri="{BB962C8B-B14F-4D97-AF65-F5344CB8AC3E}">
+        <p14:creationId xmlns:p14="http://schemas.microsoft.com/office/powerpoint/2010/main" val="3340555995"/>
+      </p:ext>
+    </p:extLst>
+  </p:cSld>
+  <p:clrMapOvr>
+    <a:masterClrMapping/>
+  </p:clrMapOvr>
+</p:notes>
+</file>
+
+<file path=ppt/notesSlides/notesSlide13.xml><?xml version="1.0" encoding="utf-8"?>
+<p:notes xmlns:a="http://schemas.openxmlformats.org/drawingml/2006/main" xmlns:r="http://schemas.openxmlformats.org/officeDocument/2006/relationships" xmlns:p="http://schemas.openxmlformats.org/presentationml/2006/main">
+  <p:cSld>
+    <p:spTree>
+      <p:nvGrpSpPr>
+        <p:cNvPr id="1" name=""/>
+        <p:cNvGrpSpPr/>
+        <p:nvPr/>
+      </p:nvGrpSpPr>
+      <p:grpSpPr>
+        <a:xfrm>
+          <a:off x="0" y="0"/>
+          <a:ext cx="0" cy="0"/>
+          <a:chOff x="0" y="0"/>
+          <a:chExt cx="0" cy="0"/>
+        </a:xfrm>
+      </p:grpSpPr>
+      <p:sp>
+        <p:nvSpPr>
+          <p:cNvPr id="2" name="Slide Image Placeholder 1"/>
+          <p:cNvSpPr>
+            <a:spLocks noGrp="1" noRot="1" noChangeAspect="1"/>
+          </p:cNvSpPr>
+          <p:nvPr>
+            <p:ph type="sldImg"/>
+          </p:nvPr>
+        </p:nvSpPr>
+        <p:spPr/>
+      </p:sp>
+      <p:sp>
+        <p:nvSpPr>
+          <p:cNvPr id="3" name="Notes Placeholder 2"/>
+          <p:cNvSpPr>
+            <a:spLocks noGrp="1"/>
+          </p:cNvSpPr>
+          <p:nvPr>
+            <p:ph type="body" idx="1"/>
+          </p:nvPr>
+        </p:nvSpPr>
+        <p:spPr/>
+        <p:txBody>
+          <a:bodyPr/>
+          <a:lstStyle/>
+          <a:p>
+            <a:r>
+              <a:rPr lang="en-GB" dirty="0" smtClean="0"/>
+              <a:t>Allows</a:t>
+            </a:r>
+            <a:r>
+              <a:rPr lang="en-GB" baseline="0" dirty="0" smtClean="0"/>
+              <a:t> the user to put in their student loan, then calculates their average spend per day, week and month and uses that to predict future balances and when they with go into their overdraft.</a:t>
+            </a:r>
+            <a:endParaRPr lang="en-GB" dirty="0"/>
+          </a:p>
+        </p:txBody>
+      </p:sp>
+      <p:sp>
+        <p:nvSpPr>
+          <p:cNvPr id="4" name="Slide Number Placeholder 3"/>
+          <p:cNvSpPr>
+            <a:spLocks noGrp="1"/>
+          </p:cNvSpPr>
+          <p:nvPr>
+            <p:ph type="sldNum" sz="quarter" idx="10"/>
+          </p:nvPr>
+        </p:nvSpPr>
+        <p:spPr/>
+        <p:txBody>
+          <a:bodyPr/>
+          <a:lstStyle/>
+          <a:p>
+            <a:fld id="{54261E1A-D829-4B13-8E47-3FA50A360041}" type="slidenum">
+              <a:rPr lang="en-GB" smtClean="0"/>
+              <a:pPr/>
+              <a:t>13</a:t>
+            </a:fld>
+            <a:endParaRPr lang="en-GB"/>
+          </a:p>
+        </p:txBody>
+      </p:sp>
+    </p:spTree>
+    <p:extLst>
+      <p:ext uri="{BB962C8B-B14F-4D97-AF65-F5344CB8AC3E}">
+        <p14:creationId xmlns:p14="http://schemas.microsoft.com/office/powerpoint/2010/main" val="2673764264"/>
+      </p:ext>
+    </p:extLst>
+  </p:cSld>
+  <p:clrMapOvr>
+    <a:masterClrMapping/>
+  </p:clrMapOvr>
+</p:notes>
+</file>
+
+<file path=ppt/notesSlides/notesSlide14.xml><?xml version="1.0" encoding="utf-8"?>
+<p:notes xmlns:a="http://schemas.openxmlformats.org/drawingml/2006/main" xmlns:r="http://schemas.openxmlformats.org/officeDocument/2006/relationships" xmlns:p="http://schemas.openxmlformats.org/presentationml/2006/main">
+  <p:cSld>
+    <p:spTree>
+      <p:nvGrpSpPr>
+        <p:cNvPr id="1" name=""/>
+        <p:cNvGrpSpPr/>
+        <p:nvPr/>
+      </p:nvGrpSpPr>
+      <p:grpSpPr>
+        <a:xfrm>
+          <a:off x="0" y="0"/>
+          <a:ext cx="0" cy="0"/>
+          <a:chOff x="0" y="0"/>
+          <a:chExt cx="0" cy="0"/>
+        </a:xfrm>
+      </p:grpSpPr>
+      <p:sp>
+        <p:nvSpPr>
+          <p:cNvPr id="2" name="Slide Image Placeholder 1"/>
+          <p:cNvSpPr>
+            <a:spLocks noGrp="1" noRot="1" noChangeAspect="1"/>
+          </p:cNvSpPr>
+          <p:nvPr>
+            <p:ph type="sldImg"/>
+          </p:nvPr>
+        </p:nvSpPr>
+        <p:spPr/>
+      </p:sp>
+      <p:sp>
+        <p:nvSpPr>
+          <p:cNvPr id="3" name="Notes Placeholder 2"/>
+          <p:cNvSpPr>
+            <a:spLocks noGrp="1"/>
+          </p:cNvSpPr>
+          <p:nvPr>
+            <p:ph type="body" idx="1"/>
+          </p:nvPr>
+        </p:nvSpPr>
+        <p:spPr/>
+        <p:txBody>
+          <a:bodyPr/>
+          <a:lstStyle/>
+          <a:p>
+            <a:r>
+              <a:rPr lang="en-GB" dirty="0" smtClean="0"/>
+              <a:t>Allows the user to link their phone to social</a:t>
+            </a:r>
+            <a:r>
+              <a:rPr lang="en-GB" baseline="0" dirty="0" smtClean="0"/>
+              <a:t> media and </a:t>
+            </a:r>
+            <a:r>
+              <a:rPr lang="en-GB" baseline="0" smtClean="0"/>
+              <a:t>set notifications on/off.</a:t>
+            </a:r>
+            <a:endParaRPr lang="en-GB"/>
+          </a:p>
+        </p:txBody>
+      </p:sp>
+      <p:sp>
+        <p:nvSpPr>
+          <p:cNvPr id="4" name="Slide Number Placeholder 3"/>
+          <p:cNvSpPr>
+            <a:spLocks noGrp="1"/>
+          </p:cNvSpPr>
+          <p:nvPr>
+            <p:ph type="sldNum" sz="quarter" idx="10"/>
+          </p:nvPr>
+        </p:nvSpPr>
+        <p:spPr/>
+        <p:txBody>
+          <a:bodyPr/>
+          <a:lstStyle/>
+          <a:p>
+            <a:fld id="{54261E1A-D829-4B13-8E47-3FA50A360041}" type="slidenum">
+              <a:rPr lang="en-GB" smtClean="0"/>
+              <a:pPr/>
+              <a:t>14</a:t>
+            </a:fld>
+            <a:endParaRPr lang="en-GB"/>
+          </a:p>
+        </p:txBody>
+      </p:sp>
+    </p:spTree>
+    <p:extLst>
+      <p:ext uri="{BB962C8B-B14F-4D97-AF65-F5344CB8AC3E}">
+        <p14:creationId xmlns:p14="http://schemas.microsoft.com/office/powerpoint/2010/main" val="814208957"/>
       </p:ext>
     </p:extLst>
   </p:cSld>
@@ -613,19 +1124,19 @@
           <a:p>
             <a:r>
               <a:rPr lang="en-GB" dirty="0" smtClean="0"/>
-              <a:t>Say app, &lt;click&gt;, why</a:t>
+              <a:t>Say</a:t>
             </a:r>
             <a:r>
               <a:rPr lang="en-GB" baseline="0" dirty="0" smtClean="0"/>
-              <a:t> not both I hear you cry?,  </a:t>
+              <a:t> hello to relax </a:t>
             </a:r>
             <a:r>
-              <a:rPr lang="en-GB" dirty="0" smtClean="0"/>
-              <a:t>Briefly</a:t>
+              <a:rPr lang="en-GB" baseline="0" dirty="0" err="1" smtClean="0"/>
+              <a:t>lloyds</a:t>
             </a:r>
             <a:r>
               <a:rPr lang="en-GB" baseline="0" dirty="0" smtClean="0"/>
-              <a:t> explain we picked to focus on making one GREAT thing rather than two OKAY things and that we went for app over web because it played to our strengths. </a:t>
+              <a:t> straight away, and possibly say something like “I’m Matt and this is &lt;Other speaker&gt;, and this is the rest of the development team”</a:t>
             </a:r>
             <a:endParaRPr lang="en-GB" dirty="0"/>
           </a:p>
@@ -648,7 +1159,7 @@
           <a:p>
             <a:fld id="{54261E1A-D829-4B13-8E47-3FA50A360041}" type="slidenum">
               <a:rPr lang="en-GB" smtClean="0"/>
-              <a:t>4</a:t>
+              <a:t>2</a:t>
             </a:fld>
             <a:endParaRPr lang="en-GB"/>
           </a:p>
@@ -657,7 +1168,7 @@
     </p:spTree>
     <p:extLst>
       <p:ext uri="{BB962C8B-B14F-4D97-AF65-F5344CB8AC3E}">
-        <p14:creationId xmlns:p14="http://schemas.microsoft.com/office/powerpoint/2010/main" val="1993467398"/>
+        <p14:creationId xmlns:p14="http://schemas.microsoft.com/office/powerpoint/2010/main" val="1039215597"/>
       </p:ext>
     </p:extLst>
   </p:cSld>
@@ -708,24 +1219,27 @@
         </p:nvSpPr>
         <p:spPr/>
         <p:txBody>
-          <a:bodyPr/>
+          <a:bodyPr>
+            <a:normAutofit/>
+          </a:bodyPr>
           <a:lstStyle/>
           <a:p>
+            <a:pPr marL="0" indent="0">
+              <a:buNone/>
+            </a:pPr>
             <a:r>
               <a:rPr lang="en-GB" dirty="0" smtClean="0"/>
-              <a:t>Say students, &lt;click&gt;,</a:t>
+              <a:t>If it hasn’t already been clarified you will find a prototype of our future app in front of you or currently passing around the audience. </a:t>
+            </a:r>
+          </a:p>
+          <a:p>
+            <a:r>
+              <a:rPr lang="en-GB" dirty="0" smtClean="0"/>
+              <a:t>We’ll be glad to hear your feedback</a:t>
             </a:r>
             <a:r>
               <a:rPr lang="en-GB" baseline="0" dirty="0" smtClean="0"/>
-              <a:t> why not children? They need banks, </a:t>
-            </a:r>
-            <a:r>
-              <a:rPr lang="en-GB" dirty="0" smtClean="0"/>
-              <a:t>Briefly</a:t>
-            </a:r>
-            <a:r>
-              <a:rPr lang="en-GB" baseline="0" dirty="0" smtClean="0"/>
-              <a:t> explain we picked students because we match that age range so it is easier to think of aims. </a:t>
+              <a:t> so we can improve the final product </a:t>
             </a:r>
             <a:endParaRPr lang="en-GB" dirty="0"/>
           </a:p>
@@ -748,7 +1262,8 @@
           <a:p>
             <a:fld id="{54261E1A-D829-4B13-8E47-3FA50A360041}" type="slidenum">
               <a:rPr lang="en-GB" smtClean="0"/>
-              <a:t>5</a:t>
+              <a:pPr/>
+              <a:t>3</a:t>
             </a:fld>
             <a:endParaRPr lang="en-GB"/>
           </a:p>
@@ -757,7 +1272,7 @@
     </p:spTree>
     <p:extLst>
       <p:ext uri="{BB962C8B-B14F-4D97-AF65-F5344CB8AC3E}">
-        <p14:creationId xmlns:p14="http://schemas.microsoft.com/office/powerpoint/2010/main" val="1993467398"/>
+        <p14:creationId xmlns:p14="http://schemas.microsoft.com/office/powerpoint/2010/main" val="1007760576"/>
       </p:ext>
     </p:extLst>
   </p:cSld>
@@ -808,9 +1323,45 @@
         </p:nvSpPr>
         <p:spPr/>
         <p:txBody>
-          <a:bodyPr/>
+          <a:bodyPr>
+            <a:normAutofit/>
+          </a:bodyPr>
           <a:lstStyle/>
           <a:p>
+            <a:r>
+              <a:rPr lang="en-GB" dirty="0" smtClean="0"/>
+              <a:t>Why ?</a:t>
+            </a:r>
+            <a:r>
+              <a:rPr lang="en-GB" baseline="0" dirty="0" smtClean="0"/>
+              <a:t> </a:t>
+            </a:r>
+          </a:p>
+          <a:p>
+            <a:r>
+              <a:rPr lang="en-GB" baseline="0" dirty="0" smtClean="0"/>
+              <a:t>-Children don’t decide which bank they will join their parents do. </a:t>
+            </a:r>
+          </a:p>
+          <a:p>
+            <a:pPr>
+              <a:buFontTx/>
+              <a:buChar char="-"/>
+            </a:pPr>
+            <a:r>
+              <a:rPr lang="en-GB" baseline="0" dirty="0" smtClean="0"/>
+              <a:t>Young people at university start caring about their finances and make their first real independent decision which bank to join </a:t>
+            </a:r>
+          </a:p>
+          <a:p>
+            <a:pPr>
+              <a:buFontTx/>
+              <a:buChar char="-"/>
+            </a:pPr>
+            <a:r>
+              <a:rPr lang="en-GB" baseline="0" dirty="0" smtClean="0"/>
+              <a:t>If you convince these people and provide satisfying services they will stay with the bank and when they grow up and start their own families, it is likely that they will create similar accounts for their kids. </a:t>
+            </a:r>
             <a:endParaRPr lang="en-GB" dirty="0"/>
           </a:p>
         </p:txBody>
@@ -832,6 +1383,213 @@
           <a:p>
             <a:fld id="{54261E1A-D829-4B13-8E47-3FA50A360041}" type="slidenum">
               <a:rPr lang="en-GB" smtClean="0"/>
+              <a:pPr/>
+              <a:t>4</a:t>
+            </a:fld>
+            <a:endParaRPr lang="en-GB"/>
+          </a:p>
+        </p:txBody>
+      </p:sp>
+    </p:spTree>
+    <p:extLst>
+      <p:ext uri="{BB962C8B-B14F-4D97-AF65-F5344CB8AC3E}">
+        <p14:creationId xmlns:p14="http://schemas.microsoft.com/office/powerpoint/2010/main" val="444763125"/>
+      </p:ext>
+    </p:extLst>
+  </p:cSld>
+  <p:clrMapOvr>
+    <a:masterClrMapping/>
+  </p:clrMapOvr>
+</p:notes>
+</file>
+
+<file path=ppt/notesSlides/notesSlide5.xml><?xml version="1.0" encoding="utf-8"?>
+<p:notes xmlns:a="http://schemas.openxmlformats.org/drawingml/2006/main" xmlns:r="http://schemas.openxmlformats.org/officeDocument/2006/relationships" xmlns:p="http://schemas.openxmlformats.org/presentationml/2006/main">
+  <p:cSld>
+    <p:spTree>
+      <p:nvGrpSpPr>
+        <p:cNvPr id="1" name=""/>
+        <p:cNvGrpSpPr/>
+        <p:nvPr/>
+      </p:nvGrpSpPr>
+      <p:grpSpPr>
+        <a:xfrm>
+          <a:off x="0" y="0"/>
+          <a:ext cx="0" cy="0"/>
+          <a:chOff x="0" y="0"/>
+          <a:chExt cx="0" cy="0"/>
+        </a:xfrm>
+      </p:grpSpPr>
+      <p:sp>
+        <p:nvSpPr>
+          <p:cNvPr id="2" name="Slide Image Placeholder 1"/>
+          <p:cNvSpPr>
+            <a:spLocks noGrp="1" noRot="1" noChangeAspect="1"/>
+          </p:cNvSpPr>
+          <p:nvPr>
+            <p:ph type="sldImg"/>
+          </p:nvPr>
+        </p:nvSpPr>
+        <p:spPr/>
+      </p:sp>
+      <p:sp>
+        <p:nvSpPr>
+          <p:cNvPr id="3" name="Notes Placeholder 2"/>
+          <p:cNvSpPr>
+            <a:spLocks noGrp="1"/>
+          </p:cNvSpPr>
+          <p:nvPr>
+            <p:ph type="body" idx="1"/>
+          </p:nvPr>
+        </p:nvSpPr>
+        <p:spPr/>
+        <p:txBody>
+          <a:bodyPr>
+            <a:normAutofit/>
+          </a:bodyPr>
+          <a:lstStyle/>
+          <a:p>
+            <a:r>
+              <a:rPr lang="en-GB" dirty="0" smtClean="0"/>
+              <a:t>We</a:t>
+            </a:r>
+            <a:r>
+              <a:rPr lang="en-GB" baseline="0" dirty="0" smtClean="0"/>
+              <a:t> choose to develop an android application because of its rapid growth in sales. Also Android is being ported on multiple devices, like TV’s tablets etc. </a:t>
+            </a:r>
+          </a:p>
+          <a:p>
+            <a:r>
+              <a:rPr lang="en-GB" baseline="0" dirty="0" smtClean="0"/>
+              <a:t>Majority of people in the age range for our product own multiple android devices</a:t>
+            </a:r>
+          </a:p>
+          <a:p>
+            <a:r>
+              <a:rPr lang="en-GB" baseline="0" dirty="0" smtClean="0"/>
+              <a:t>7 out of 8 people n our group own an android device </a:t>
+            </a:r>
+            <a:endParaRPr lang="en-GB" dirty="0"/>
+          </a:p>
+        </p:txBody>
+      </p:sp>
+      <p:sp>
+        <p:nvSpPr>
+          <p:cNvPr id="4" name="Slide Number Placeholder 3"/>
+          <p:cNvSpPr>
+            <a:spLocks noGrp="1"/>
+          </p:cNvSpPr>
+          <p:nvPr>
+            <p:ph type="sldNum" sz="quarter" idx="10"/>
+          </p:nvPr>
+        </p:nvSpPr>
+        <p:spPr/>
+        <p:txBody>
+          <a:bodyPr/>
+          <a:lstStyle/>
+          <a:p>
+            <a:fld id="{54261E1A-D829-4B13-8E47-3FA50A360041}" type="slidenum">
+              <a:rPr lang="en-GB" smtClean="0"/>
+              <a:pPr/>
+              <a:t>5</a:t>
+            </a:fld>
+            <a:endParaRPr lang="en-GB"/>
+          </a:p>
+        </p:txBody>
+      </p:sp>
+    </p:spTree>
+    <p:extLst>
+      <p:ext uri="{BB962C8B-B14F-4D97-AF65-F5344CB8AC3E}">
+        <p14:creationId xmlns:p14="http://schemas.microsoft.com/office/powerpoint/2010/main" val="3469762709"/>
+      </p:ext>
+    </p:extLst>
+  </p:cSld>
+  <p:clrMapOvr>
+    <a:masterClrMapping/>
+  </p:clrMapOvr>
+</p:notes>
+</file>
+
+<file path=ppt/notesSlides/notesSlide6.xml><?xml version="1.0" encoding="utf-8"?>
+<p:notes xmlns:a="http://schemas.openxmlformats.org/drawingml/2006/main" xmlns:r="http://schemas.openxmlformats.org/officeDocument/2006/relationships" xmlns:p="http://schemas.openxmlformats.org/presentationml/2006/main">
+  <p:cSld>
+    <p:spTree>
+      <p:nvGrpSpPr>
+        <p:cNvPr id="1" name=""/>
+        <p:cNvGrpSpPr/>
+        <p:nvPr/>
+      </p:nvGrpSpPr>
+      <p:grpSpPr>
+        <a:xfrm>
+          <a:off x="0" y="0"/>
+          <a:ext cx="0" cy="0"/>
+          <a:chOff x="0" y="0"/>
+          <a:chExt cx="0" cy="0"/>
+        </a:xfrm>
+      </p:grpSpPr>
+      <p:sp>
+        <p:nvSpPr>
+          <p:cNvPr id="2" name="Slide Image Placeholder 1"/>
+          <p:cNvSpPr>
+            <a:spLocks noGrp="1" noRot="1" noChangeAspect="1"/>
+          </p:cNvSpPr>
+          <p:nvPr>
+            <p:ph type="sldImg"/>
+          </p:nvPr>
+        </p:nvSpPr>
+        <p:spPr/>
+      </p:sp>
+      <p:sp>
+        <p:nvSpPr>
+          <p:cNvPr id="3" name="Notes Placeholder 2"/>
+          <p:cNvSpPr>
+            <a:spLocks noGrp="1"/>
+          </p:cNvSpPr>
+          <p:nvPr>
+            <p:ph type="body" idx="1"/>
+          </p:nvPr>
+        </p:nvSpPr>
+        <p:spPr/>
+        <p:txBody>
+          <a:bodyPr/>
+          <a:lstStyle/>
+          <a:p>
+            <a:r>
+              <a:rPr lang="en-GB" dirty="0" smtClean="0"/>
+              <a:t>We</a:t>
+            </a:r>
+            <a:r>
+              <a:rPr lang="en-GB" baseline="0" dirty="0" smtClean="0"/>
+              <a:t> know you don’t want another standard banking app, however we also realise that your users wouldn't want to have multiple banking applications on their devices, </a:t>
+            </a:r>
+          </a:p>
+          <a:p>
+            <a:r>
+              <a:rPr lang="en-GB" baseline="0" dirty="0" smtClean="0"/>
+              <a:t>This is why we developed our app to provide all the basic functionality, plus some additional functionality to attract attention of our target age group</a:t>
+            </a:r>
+            <a:endParaRPr lang="en-GB" dirty="0"/>
+          </a:p>
+        </p:txBody>
+      </p:sp>
+      <p:sp>
+        <p:nvSpPr>
+          <p:cNvPr id="4" name="Slide Number Placeholder 3"/>
+          <p:cNvSpPr>
+            <a:spLocks noGrp="1"/>
+          </p:cNvSpPr>
+          <p:nvPr>
+            <p:ph type="sldNum" sz="quarter" idx="10"/>
+          </p:nvPr>
+        </p:nvSpPr>
+        <p:spPr/>
+        <p:txBody>
+          <a:bodyPr/>
+          <a:lstStyle/>
+          <a:p>
+            <a:fld id="{54261E1A-D829-4B13-8E47-3FA50A360041}" type="slidenum">
+              <a:rPr lang="en-GB" smtClean="0"/>
+              <a:pPr/>
               <a:t>6</a:t>
             </a:fld>
             <a:endParaRPr lang="en-GB"/>
@@ -842,6 +1600,299 @@
     <p:extLst>
       <p:ext uri="{BB962C8B-B14F-4D97-AF65-F5344CB8AC3E}">
         <p14:creationId xmlns:p14="http://schemas.microsoft.com/office/powerpoint/2010/main" val="322626272"/>
+      </p:ext>
+    </p:extLst>
+  </p:cSld>
+  <p:clrMapOvr>
+    <a:masterClrMapping/>
+  </p:clrMapOvr>
+</p:notes>
+</file>
+
+<file path=ppt/notesSlides/notesSlide7.xml><?xml version="1.0" encoding="utf-8"?>
+<p:notes xmlns:a="http://schemas.openxmlformats.org/drawingml/2006/main" xmlns:r="http://schemas.openxmlformats.org/officeDocument/2006/relationships" xmlns:p="http://schemas.openxmlformats.org/presentationml/2006/main">
+  <p:cSld>
+    <p:spTree>
+      <p:nvGrpSpPr>
+        <p:cNvPr id="1" name=""/>
+        <p:cNvGrpSpPr/>
+        <p:nvPr/>
+      </p:nvGrpSpPr>
+      <p:grpSpPr>
+        <a:xfrm>
+          <a:off x="0" y="0"/>
+          <a:ext cx="0" cy="0"/>
+          <a:chOff x="0" y="0"/>
+          <a:chExt cx="0" cy="0"/>
+        </a:xfrm>
+      </p:grpSpPr>
+      <p:sp>
+        <p:nvSpPr>
+          <p:cNvPr id="2" name="Slide Image Placeholder 1"/>
+          <p:cNvSpPr>
+            <a:spLocks noGrp="1" noRot="1" noChangeAspect="1"/>
+          </p:cNvSpPr>
+          <p:nvPr>
+            <p:ph type="sldImg"/>
+          </p:nvPr>
+        </p:nvSpPr>
+        <p:spPr/>
+      </p:sp>
+      <p:sp>
+        <p:nvSpPr>
+          <p:cNvPr id="3" name="Notes Placeholder 2"/>
+          <p:cNvSpPr>
+            <a:spLocks noGrp="1"/>
+          </p:cNvSpPr>
+          <p:nvPr>
+            <p:ph type="body" idx="1"/>
+          </p:nvPr>
+        </p:nvSpPr>
+        <p:spPr/>
+        <p:txBody>
+          <a:bodyPr/>
+          <a:lstStyle/>
+          <a:p>
+            <a:r>
+              <a:rPr lang="en-GB" dirty="0" smtClean="0"/>
+              <a:t>Balances- Available</a:t>
+            </a:r>
+            <a:r>
+              <a:rPr lang="en-GB" baseline="0" dirty="0" smtClean="0"/>
+              <a:t> balance is larger than the balance as this is the more important and used, on the main screen as the majority of users use app to check balance and helps avoid scouring through menu after menu. </a:t>
+            </a:r>
+          </a:p>
+          <a:p>
+            <a:endParaRPr lang="en-GB" baseline="0" dirty="0" smtClean="0"/>
+          </a:p>
+          <a:p>
+            <a:r>
+              <a:rPr lang="en-GB" baseline="0" dirty="0" smtClean="0"/>
+              <a:t>This screen also provides links to the rest of the app’s functionality </a:t>
+            </a:r>
+          </a:p>
+        </p:txBody>
+      </p:sp>
+      <p:sp>
+        <p:nvSpPr>
+          <p:cNvPr id="4" name="Slide Number Placeholder 3"/>
+          <p:cNvSpPr>
+            <a:spLocks noGrp="1"/>
+          </p:cNvSpPr>
+          <p:nvPr>
+            <p:ph type="sldNum" sz="quarter" idx="10"/>
+          </p:nvPr>
+        </p:nvSpPr>
+        <p:spPr/>
+        <p:txBody>
+          <a:bodyPr/>
+          <a:lstStyle/>
+          <a:p>
+            <a:fld id="{54261E1A-D829-4B13-8E47-3FA50A360041}" type="slidenum">
+              <a:rPr lang="en-GB" smtClean="0"/>
+              <a:pPr/>
+              <a:t>7</a:t>
+            </a:fld>
+            <a:endParaRPr lang="en-GB"/>
+          </a:p>
+        </p:txBody>
+      </p:sp>
+    </p:spTree>
+    <p:extLst>
+      <p:ext uri="{BB962C8B-B14F-4D97-AF65-F5344CB8AC3E}">
+        <p14:creationId xmlns:p14="http://schemas.microsoft.com/office/powerpoint/2010/main" val="2973687456"/>
+      </p:ext>
+    </p:extLst>
+  </p:cSld>
+  <p:clrMapOvr>
+    <a:masterClrMapping/>
+  </p:clrMapOvr>
+</p:notes>
+</file>
+
+<file path=ppt/notesSlides/notesSlide8.xml><?xml version="1.0" encoding="utf-8"?>
+<p:notes xmlns:a="http://schemas.openxmlformats.org/drawingml/2006/main" xmlns:r="http://schemas.openxmlformats.org/officeDocument/2006/relationships" xmlns:p="http://schemas.openxmlformats.org/presentationml/2006/main">
+  <p:cSld>
+    <p:spTree>
+      <p:nvGrpSpPr>
+        <p:cNvPr id="1" name=""/>
+        <p:cNvGrpSpPr/>
+        <p:nvPr/>
+      </p:nvGrpSpPr>
+      <p:grpSpPr>
+        <a:xfrm>
+          <a:off x="0" y="0"/>
+          <a:ext cx="0" cy="0"/>
+          <a:chOff x="0" y="0"/>
+          <a:chExt cx="0" cy="0"/>
+        </a:xfrm>
+      </p:grpSpPr>
+      <p:sp>
+        <p:nvSpPr>
+          <p:cNvPr id="2" name="Slide Image Placeholder 1"/>
+          <p:cNvSpPr>
+            <a:spLocks noGrp="1" noRot="1" noChangeAspect="1"/>
+          </p:cNvSpPr>
+          <p:nvPr>
+            <p:ph type="sldImg"/>
+          </p:nvPr>
+        </p:nvSpPr>
+        <p:spPr/>
+      </p:sp>
+      <p:sp>
+        <p:nvSpPr>
+          <p:cNvPr id="3" name="Notes Placeholder 2"/>
+          <p:cNvSpPr>
+            <a:spLocks noGrp="1"/>
+          </p:cNvSpPr>
+          <p:nvPr>
+            <p:ph type="body" idx="1"/>
+          </p:nvPr>
+        </p:nvSpPr>
+        <p:spPr/>
+        <p:txBody>
+          <a:bodyPr/>
+          <a:lstStyle/>
+          <a:p>
+            <a:r>
+              <a:rPr lang="en-GB" dirty="0" smtClean="0"/>
+              <a:t>- Providing</a:t>
+            </a:r>
+            <a:r>
+              <a:rPr lang="en-GB" baseline="0" dirty="0" smtClean="0"/>
+              <a:t> the basic banking functionality </a:t>
+            </a:r>
+          </a:p>
+          <a:p>
+            <a:r>
+              <a:rPr lang="en-GB" baseline="0" dirty="0" smtClean="0"/>
+              <a:t>- We are going to gather information from the statement and use to tailor the rewards towards the users needs </a:t>
+            </a:r>
+            <a:endParaRPr lang="en-GB" dirty="0"/>
+          </a:p>
+        </p:txBody>
+      </p:sp>
+      <p:sp>
+        <p:nvSpPr>
+          <p:cNvPr id="4" name="Slide Number Placeholder 3"/>
+          <p:cNvSpPr>
+            <a:spLocks noGrp="1"/>
+          </p:cNvSpPr>
+          <p:nvPr>
+            <p:ph type="sldNum" sz="quarter" idx="10"/>
+          </p:nvPr>
+        </p:nvSpPr>
+        <p:spPr/>
+        <p:txBody>
+          <a:bodyPr/>
+          <a:lstStyle/>
+          <a:p>
+            <a:fld id="{54261E1A-D829-4B13-8E47-3FA50A360041}" type="slidenum">
+              <a:rPr lang="en-GB" smtClean="0"/>
+              <a:pPr/>
+              <a:t>8</a:t>
+            </a:fld>
+            <a:endParaRPr lang="en-GB"/>
+          </a:p>
+        </p:txBody>
+      </p:sp>
+    </p:spTree>
+    <p:extLst>
+      <p:ext uri="{BB962C8B-B14F-4D97-AF65-F5344CB8AC3E}">
+        <p14:creationId xmlns:p14="http://schemas.microsoft.com/office/powerpoint/2010/main" val="2299803699"/>
+      </p:ext>
+    </p:extLst>
+  </p:cSld>
+  <p:clrMapOvr>
+    <a:masterClrMapping/>
+  </p:clrMapOvr>
+</p:notes>
+</file>
+
+<file path=ppt/notesSlides/notesSlide9.xml><?xml version="1.0" encoding="utf-8"?>
+<p:notes xmlns:a="http://schemas.openxmlformats.org/drawingml/2006/main" xmlns:r="http://schemas.openxmlformats.org/officeDocument/2006/relationships" xmlns:p="http://schemas.openxmlformats.org/presentationml/2006/main">
+  <p:cSld>
+    <p:spTree>
+      <p:nvGrpSpPr>
+        <p:cNvPr id="1" name=""/>
+        <p:cNvGrpSpPr/>
+        <p:nvPr/>
+      </p:nvGrpSpPr>
+      <p:grpSpPr>
+        <a:xfrm>
+          <a:off x="0" y="0"/>
+          <a:ext cx="0" cy="0"/>
+          <a:chOff x="0" y="0"/>
+          <a:chExt cx="0" cy="0"/>
+        </a:xfrm>
+      </p:grpSpPr>
+      <p:sp>
+        <p:nvSpPr>
+          <p:cNvPr id="2" name="Slide Image Placeholder 1"/>
+          <p:cNvSpPr>
+            <a:spLocks noGrp="1" noRot="1" noChangeAspect="1"/>
+          </p:cNvSpPr>
+          <p:nvPr>
+            <p:ph type="sldImg"/>
+          </p:nvPr>
+        </p:nvSpPr>
+        <p:spPr/>
+      </p:sp>
+      <p:sp>
+        <p:nvSpPr>
+          <p:cNvPr id="3" name="Notes Placeholder 2"/>
+          <p:cNvSpPr>
+            <a:spLocks noGrp="1"/>
+          </p:cNvSpPr>
+          <p:nvPr>
+            <p:ph type="body" idx="1"/>
+          </p:nvPr>
+        </p:nvSpPr>
+        <p:spPr/>
+        <p:txBody>
+          <a:bodyPr/>
+          <a:lstStyle/>
+          <a:p>
+            <a:r>
+              <a:rPr lang="en-GB" dirty="0" smtClean="0"/>
+              <a:t>Achievements – Use</a:t>
+            </a:r>
+            <a:r>
+              <a:rPr lang="en-GB" baseline="0" dirty="0" smtClean="0"/>
+              <a:t> gamification ideas to give users points based on what is considered “good banking” behaviour. Once a user gains enough points they can redeem a reward. The challenge of trying to gain points gives the user a sense of satisfaction/achievement. Rewards will be tailored to the users spending habits from the previously shown statement screen.</a:t>
+            </a:r>
+            <a:endParaRPr lang="en-GB" dirty="0"/>
+          </a:p>
+        </p:txBody>
+      </p:sp>
+      <p:sp>
+        <p:nvSpPr>
+          <p:cNvPr id="4" name="Slide Number Placeholder 3"/>
+          <p:cNvSpPr>
+            <a:spLocks noGrp="1"/>
+          </p:cNvSpPr>
+          <p:nvPr>
+            <p:ph type="sldNum" sz="quarter" idx="10"/>
+          </p:nvPr>
+        </p:nvSpPr>
+        <p:spPr/>
+        <p:txBody>
+          <a:bodyPr/>
+          <a:lstStyle/>
+          <a:p>
+            <a:fld id="{54261E1A-D829-4B13-8E47-3FA50A360041}" type="slidenum">
+              <a:rPr lang="en-GB" smtClean="0"/>
+              <a:pPr/>
+              <a:t>9</a:t>
+            </a:fld>
+            <a:endParaRPr lang="en-GB"/>
+          </a:p>
+        </p:txBody>
+      </p:sp>
+    </p:spTree>
+    <p:extLst>
+      <p:ext uri="{BB962C8B-B14F-4D97-AF65-F5344CB8AC3E}">
+        <p14:creationId xmlns:p14="http://schemas.microsoft.com/office/powerpoint/2010/main" val="1778416581"/>
       </p:ext>
     </p:extLst>
   </p:cSld>
@@ -3608,7 +4659,8 @@
           <a:p>
             <a:fld id="{2C0CBD5E-86EE-4A89-9216-CA93929C6338}" type="datetimeFigureOut">
               <a:rPr lang="en-GB" smtClean="0"/>
-              <a:t>20/11/2014</a:t>
+              <a:pPr/>
+              <a:t>24/11/2014</a:t>
             </a:fld>
             <a:endParaRPr lang="en-GB"/>
           </a:p>
@@ -3724,6 +4776,7 @@
           <a:p>
             <a:fld id="{CD649B94-3BBA-4876-99B8-49C67E4767F5}" type="slidenum">
               <a:rPr lang="en-GB" smtClean="0"/>
+              <a:pPr/>
               <a:t>‹#›</a:t>
             </a:fld>
             <a:endParaRPr lang="en-GB"/>
@@ -3893,7 +4946,8 @@
           <a:p>
             <a:fld id="{2C0CBD5E-86EE-4A89-9216-CA93929C6338}" type="datetimeFigureOut">
               <a:rPr lang="en-GB" smtClean="0"/>
-              <a:t>20/11/2014</a:t>
+              <a:pPr/>
+              <a:t>24/11/2014</a:t>
             </a:fld>
             <a:endParaRPr lang="en-GB"/>
           </a:p>
@@ -3935,6 +4989,7 @@
           <a:p>
             <a:fld id="{CD649B94-3BBA-4876-99B8-49C67E4767F5}" type="slidenum">
               <a:rPr lang="en-GB" smtClean="0"/>
+              <a:pPr/>
               <a:t>‹#›</a:t>
             </a:fld>
             <a:endParaRPr lang="en-GB"/>
@@ -4068,7 +5123,8 @@
           <a:p>
             <a:fld id="{2C0CBD5E-86EE-4A89-9216-CA93929C6338}" type="datetimeFigureOut">
               <a:rPr lang="en-GB" smtClean="0"/>
-              <a:t>20/11/2014</a:t>
+              <a:pPr/>
+              <a:t>24/11/2014</a:t>
             </a:fld>
             <a:endParaRPr lang="en-GB"/>
           </a:p>
@@ -4110,6 +5166,7 @@
           <a:p>
             <a:fld id="{CD649B94-3BBA-4876-99B8-49C67E4767F5}" type="slidenum">
               <a:rPr lang="en-GB" smtClean="0"/>
+              <a:pPr/>
               <a:t>‹#›</a:t>
             </a:fld>
             <a:endParaRPr lang="en-GB"/>
@@ -4233,7 +5290,8 @@
           <a:p>
             <a:fld id="{2C0CBD5E-86EE-4A89-9216-CA93929C6338}" type="datetimeFigureOut">
               <a:rPr lang="en-GB" smtClean="0"/>
-              <a:t>20/11/2014</a:t>
+              <a:pPr/>
+              <a:t>24/11/2014</a:t>
             </a:fld>
             <a:endParaRPr lang="en-GB"/>
           </a:p>
@@ -4275,6 +5333,7 @@
           <a:p>
             <a:fld id="{CD649B94-3BBA-4876-99B8-49C67E4767F5}" type="slidenum">
               <a:rPr lang="en-GB" smtClean="0"/>
+              <a:pPr/>
               <a:t>‹#›</a:t>
             </a:fld>
             <a:endParaRPr lang="en-GB"/>
@@ -4474,7 +5533,8 @@
           <a:p>
             <a:fld id="{2C0CBD5E-86EE-4A89-9216-CA93929C6338}" type="datetimeFigureOut">
               <a:rPr lang="en-GB" smtClean="0"/>
-              <a:t>20/11/2014</a:t>
+              <a:pPr/>
+              <a:t>24/11/2014</a:t>
             </a:fld>
             <a:endParaRPr lang="en-GB"/>
           </a:p>
@@ -4516,6 +5576,7 @@
           <a:p>
             <a:fld id="{CD649B94-3BBA-4876-99B8-49C67E4767F5}" type="slidenum">
               <a:rPr lang="en-GB" smtClean="0"/>
+              <a:pPr/>
               <a:t>‹#›</a:t>
             </a:fld>
             <a:endParaRPr lang="en-GB"/>
@@ -4587,7 +5648,8 @@
           <a:p>
             <a:fld id="{2C0CBD5E-86EE-4A89-9216-CA93929C6338}" type="datetimeFigureOut">
               <a:rPr lang="en-GB" smtClean="0"/>
-              <a:t>20/11/2014</a:t>
+              <a:pPr/>
+              <a:t>24/11/2014</a:t>
             </a:fld>
             <a:endParaRPr lang="en-GB"/>
           </a:p>
@@ -4629,6 +5691,7 @@
           <a:p>
             <a:fld id="{CD649B94-3BBA-4876-99B8-49C67E4767F5}" type="slidenum">
               <a:rPr lang="en-GB" smtClean="0"/>
+              <a:pPr/>
               <a:t>‹#›</a:t>
             </a:fld>
             <a:endParaRPr lang="en-GB"/>
@@ -5126,7 +6189,8 @@
           <a:p>
             <a:fld id="{2C0CBD5E-86EE-4A89-9216-CA93929C6338}" type="datetimeFigureOut">
               <a:rPr lang="en-GB" smtClean="0"/>
-              <a:t>20/11/2014</a:t>
+              <a:pPr/>
+              <a:t>24/11/2014</a:t>
             </a:fld>
             <a:endParaRPr lang="en-GB"/>
           </a:p>
@@ -5168,6 +6232,7 @@
           <a:p>
             <a:fld id="{CD649B94-3BBA-4876-99B8-49C67E4767F5}" type="slidenum">
               <a:rPr lang="en-GB" smtClean="0"/>
+              <a:pPr/>
               <a:t>‹#›</a:t>
             </a:fld>
             <a:endParaRPr lang="en-GB"/>
@@ -5239,7 +6304,8 @@
           <a:p>
             <a:fld id="{2C0CBD5E-86EE-4A89-9216-CA93929C6338}" type="datetimeFigureOut">
               <a:rPr lang="en-GB" smtClean="0"/>
-              <a:t>20/11/2014</a:t>
+              <a:pPr/>
+              <a:t>24/11/2014</a:t>
             </a:fld>
             <a:endParaRPr lang="en-GB"/>
           </a:p>
@@ -5281,6 +6347,7 @@
           <a:p>
             <a:fld id="{CD649B94-3BBA-4876-99B8-49C67E4767F5}" type="slidenum">
               <a:rPr lang="en-GB" smtClean="0"/>
+              <a:pPr/>
               <a:t>‹#›</a:t>
             </a:fld>
             <a:endParaRPr lang="en-GB"/>
@@ -5329,7 +6396,8 @@
           <a:p>
             <a:fld id="{2C0CBD5E-86EE-4A89-9216-CA93929C6338}" type="datetimeFigureOut">
               <a:rPr lang="en-GB" smtClean="0"/>
-              <a:t>20/11/2014</a:t>
+              <a:pPr/>
+              <a:t>24/11/2014</a:t>
             </a:fld>
             <a:endParaRPr lang="en-GB"/>
           </a:p>
@@ -5371,6 +6439,7 @@
           <a:p>
             <a:fld id="{CD649B94-3BBA-4876-99B8-49C67E4767F5}" type="slidenum">
               <a:rPr lang="en-GB" smtClean="0"/>
+              <a:pPr/>
               <a:t>‹#›</a:t>
             </a:fld>
             <a:endParaRPr lang="en-GB"/>
@@ -7980,7 +9049,8 @@
           <a:p>
             <a:fld id="{2C0CBD5E-86EE-4A89-9216-CA93929C6338}" type="datetimeFigureOut">
               <a:rPr lang="en-GB" smtClean="0"/>
-              <a:t>20/11/2014</a:t>
+              <a:pPr/>
+              <a:t>24/11/2014</a:t>
             </a:fld>
             <a:endParaRPr lang="en-GB"/>
           </a:p>
@@ -8003,6 +9073,7 @@
           <a:p>
             <a:fld id="{CD649B94-3BBA-4876-99B8-49C67E4767F5}" type="slidenum">
               <a:rPr lang="en-GB" smtClean="0"/>
+              <a:pPr/>
               <a:t>‹#›</a:t>
             </a:fld>
             <a:endParaRPr lang="en-GB"/>
@@ -11192,7 +12263,8 @@
           <a:p>
             <a:fld id="{2C0CBD5E-86EE-4A89-9216-CA93929C6338}" type="datetimeFigureOut">
               <a:rPr lang="en-GB" smtClean="0"/>
-              <a:t>20/11/2014</a:t>
+              <a:pPr/>
+              <a:t>24/11/2014</a:t>
             </a:fld>
             <a:endParaRPr lang="en-GB"/>
           </a:p>
@@ -11241,6 +12313,7 @@
           <a:p>
             <a:fld id="{CD649B94-3BBA-4876-99B8-49C67E4767F5}" type="slidenum">
               <a:rPr lang="en-GB" smtClean="0"/>
+              <a:pPr/>
               <a:t>‹#›</a:t>
             </a:fld>
             <a:endParaRPr lang="en-GB"/>
@@ -14014,7 +15087,8 @@
           <a:p>
             <a:fld id="{2C0CBD5E-86EE-4A89-9216-CA93929C6338}" type="datetimeFigureOut">
               <a:rPr lang="en-GB" smtClean="0"/>
-              <a:t>20/11/2014</a:t>
+              <a:pPr/>
+              <a:t>24/11/2014</a:t>
             </a:fld>
             <a:endParaRPr lang="en-GB"/>
           </a:p>
@@ -14088,6 +15162,7 @@
           <a:p>
             <a:fld id="{CD649B94-3BBA-4876-99B8-49C67E4767F5}" type="slidenum">
               <a:rPr lang="en-GB" smtClean="0"/>
+              <a:pPr/>
               <a:t>‹#›</a:t>
             </a:fld>
             <a:endParaRPr lang="en-GB"/>
@@ -14538,6 +15613,701 @@
 </p:sld>
 </file>
 
+<file path=ppt/slides/slide10.xml><?xml version="1.0" encoding="utf-8"?>
+<p:sld xmlns:a="http://schemas.openxmlformats.org/drawingml/2006/main" xmlns:r="http://schemas.openxmlformats.org/officeDocument/2006/relationships" xmlns:p="http://schemas.openxmlformats.org/presentationml/2006/main">
+  <p:cSld>
+    <p:spTree>
+      <p:nvGrpSpPr>
+        <p:cNvPr id="1" name=""/>
+        <p:cNvGrpSpPr/>
+        <p:nvPr/>
+      </p:nvGrpSpPr>
+      <p:grpSpPr>
+        <a:xfrm>
+          <a:off x="0" y="0"/>
+          <a:ext cx="0" cy="0"/>
+          <a:chOff x="0" y="0"/>
+          <a:chExt cx="0" cy="0"/>
+        </a:xfrm>
+      </p:grpSpPr>
+      <p:pic>
+        <p:nvPicPr>
+          <p:cNvPr id="4" name="Picture 3"/>
+          <p:cNvPicPr>
+            <a:picLocks noChangeAspect="1"/>
+          </p:cNvPicPr>
+          <p:nvPr/>
+        </p:nvPicPr>
+        <p:blipFill rotWithShape="1">
+          <a:blip r:embed="rId3"/>
+          <a:srcRect l="36164" t="20469" r="37271" b="5704"/>
+          <a:stretch/>
+        </p:blipFill>
+        <p:spPr>
+          <a:xfrm>
+            <a:off x="4716016" y="908720"/>
+            <a:ext cx="3456384" cy="5400600"/>
+          </a:xfrm>
+          <a:prstGeom prst="rect">
+            <a:avLst/>
+          </a:prstGeom>
+        </p:spPr>
+      </p:pic>
+      <p:sp>
+        <p:nvSpPr>
+          <p:cNvPr id="5" name="Title 1"/>
+          <p:cNvSpPr txBox="1">
+            <a:spLocks/>
+          </p:cNvSpPr>
+          <p:nvPr/>
+        </p:nvSpPr>
+        <p:spPr>
+          <a:xfrm>
+            <a:off x="899592" y="2323652"/>
+            <a:ext cx="7024744" cy="1143000"/>
+          </a:xfrm>
+          <a:prstGeom prst="rect">
+            <a:avLst/>
+          </a:prstGeom>
+        </p:spPr>
+        <p:txBody>
+          <a:bodyPr vert="horz" lIns="91440" tIns="45720" rIns="91440" bIns="45720" rtlCol="0" anchor="b">
+            <a:normAutofit fontScale="97500"/>
+          </a:bodyPr>
+          <a:lstStyle>
+            <a:lvl1pPr algn="l" defTabSz="914400" rtl="0" eaLnBrk="1" latinLnBrk="0" hangingPunct="1">
+              <a:spcBef>
+                <a:spcPct val="0"/>
+              </a:spcBef>
+              <a:buNone/>
+              <a:defRPr sz="4000" kern="1200">
+                <a:solidFill>
+                  <a:schemeClr val="accent1"/>
+                </a:solidFill>
+                <a:latin typeface="+mj-lt"/>
+                <a:ea typeface="+mj-ea"/>
+                <a:cs typeface="+mj-cs"/>
+              </a:defRPr>
+            </a:lvl1pPr>
+            <a:lvl2pPr eaLnBrk="1" hangingPunct="1">
+              <a:defRPr>
+                <a:solidFill>
+                  <a:schemeClr val="tx2"/>
+                </a:solidFill>
+              </a:defRPr>
+            </a:lvl2pPr>
+            <a:lvl3pPr eaLnBrk="1" hangingPunct="1">
+              <a:defRPr>
+                <a:solidFill>
+                  <a:schemeClr val="tx2"/>
+                </a:solidFill>
+              </a:defRPr>
+            </a:lvl3pPr>
+            <a:lvl4pPr eaLnBrk="1" hangingPunct="1">
+              <a:defRPr>
+                <a:solidFill>
+                  <a:schemeClr val="tx2"/>
+                </a:solidFill>
+              </a:defRPr>
+            </a:lvl4pPr>
+            <a:lvl5pPr eaLnBrk="1" hangingPunct="1">
+              <a:defRPr>
+                <a:solidFill>
+                  <a:schemeClr val="tx2"/>
+                </a:solidFill>
+              </a:defRPr>
+            </a:lvl5pPr>
+            <a:lvl6pPr eaLnBrk="1" hangingPunct="1">
+              <a:defRPr>
+                <a:solidFill>
+                  <a:schemeClr val="tx2"/>
+                </a:solidFill>
+              </a:defRPr>
+            </a:lvl6pPr>
+            <a:lvl7pPr eaLnBrk="1" hangingPunct="1">
+              <a:defRPr>
+                <a:solidFill>
+                  <a:schemeClr val="tx2"/>
+                </a:solidFill>
+              </a:defRPr>
+            </a:lvl7pPr>
+            <a:lvl8pPr eaLnBrk="1" hangingPunct="1">
+              <a:defRPr>
+                <a:solidFill>
+                  <a:schemeClr val="tx2"/>
+                </a:solidFill>
+              </a:defRPr>
+            </a:lvl8pPr>
+            <a:lvl9pPr eaLnBrk="1" hangingPunct="1">
+              <a:defRPr>
+                <a:solidFill>
+                  <a:schemeClr val="tx2"/>
+                </a:solidFill>
+              </a:defRPr>
+            </a:lvl9pPr>
+          </a:lstStyle>
+          <a:p>
+            <a:r>
+              <a:rPr lang="en-GB" dirty="0" smtClean="0"/>
+              <a:t>Offers and Deals</a:t>
+            </a:r>
+            <a:endParaRPr lang="en-GB" dirty="0"/>
+          </a:p>
+        </p:txBody>
+      </p:sp>
+    </p:spTree>
+    <p:extLst>
+      <p:ext uri="{BB962C8B-B14F-4D97-AF65-F5344CB8AC3E}">
+        <p14:creationId xmlns:p14="http://schemas.microsoft.com/office/powerpoint/2010/main" val="1725252336"/>
+      </p:ext>
+    </p:extLst>
+  </p:cSld>
+  <p:clrMapOvr>
+    <a:masterClrMapping/>
+  </p:clrMapOvr>
+  <p:timing>
+    <p:tnLst>
+      <p:par>
+        <p:cTn id="1" dur="indefinite" restart="never" nodeType="tmRoot"/>
+      </p:par>
+    </p:tnLst>
+  </p:timing>
+</p:sld>
+</file>
+
+<file path=ppt/slides/slide11.xml><?xml version="1.0" encoding="utf-8"?>
+<p:sld xmlns:a="http://schemas.openxmlformats.org/drawingml/2006/main" xmlns:r="http://schemas.openxmlformats.org/officeDocument/2006/relationships" xmlns:p="http://schemas.openxmlformats.org/presentationml/2006/main">
+  <p:cSld>
+    <p:spTree>
+      <p:nvGrpSpPr>
+        <p:cNvPr id="1" name=""/>
+        <p:cNvGrpSpPr/>
+        <p:nvPr/>
+      </p:nvGrpSpPr>
+      <p:grpSpPr>
+        <a:xfrm>
+          <a:off x="0" y="0"/>
+          <a:ext cx="0" cy="0"/>
+          <a:chOff x="0" y="0"/>
+          <a:chExt cx="0" cy="0"/>
+        </a:xfrm>
+      </p:grpSpPr>
+      <p:pic>
+        <p:nvPicPr>
+          <p:cNvPr id="4" name="Picture 3"/>
+          <p:cNvPicPr>
+            <a:picLocks noChangeAspect="1"/>
+          </p:cNvPicPr>
+          <p:nvPr/>
+        </p:nvPicPr>
+        <p:blipFill rotWithShape="1">
+          <a:blip r:embed="rId3"/>
+          <a:srcRect l="35611" t="19485" r="37271" b="6688"/>
+          <a:stretch/>
+        </p:blipFill>
+        <p:spPr>
+          <a:xfrm>
+            <a:off x="4716016" y="908720"/>
+            <a:ext cx="3528392" cy="5400600"/>
+          </a:xfrm>
+          <a:prstGeom prst="rect">
+            <a:avLst/>
+          </a:prstGeom>
+        </p:spPr>
+      </p:pic>
+      <p:sp>
+        <p:nvSpPr>
+          <p:cNvPr id="5" name="Title 1"/>
+          <p:cNvSpPr txBox="1">
+            <a:spLocks/>
+          </p:cNvSpPr>
+          <p:nvPr/>
+        </p:nvSpPr>
+        <p:spPr>
+          <a:xfrm>
+            <a:off x="1016487" y="2636912"/>
+            <a:ext cx="7024744" cy="1143000"/>
+          </a:xfrm>
+          <a:prstGeom prst="rect">
+            <a:avLst/>
+          </a:prstGeom>
+        </p:spPr>
+        <p:txBody>
+          <a:bodyPr vert="horz" lIns="91440" tIns="45720" rIns="91440" bIns="45720" rtlCol="0" anchor="b">
+            <a:normAutofit fontScale="97500"/>
+          </a:bodyPr>
+          <a:lstStyle>
+            <a:lvl1pPr algn="l" defTabSz="914400" rtl="0" eaLnBrk="1" latinLnBrk="0" hangingPunct="1">
+              <a:spcBef>
+                <a:spcPct val="0"/>
+              </a:spcBef>
+              <a:buNone/>
+              <a:defRPr sz="4000" kern="1200">
+                <a:solidFill>
+                  <a:schemeClr val="accent1"/>
+                </a:solidFill>
+                <a:latin typeface="+mj-lt"/>
+                <a:ea typeface="+mj-ea"/>
+                <a:cs typeface="+mj-cs"/>
+              </a:defRPr>
+            </a:lvl1pPr>
+            <a:lvl2pPr eaLnBrk="1" hangingPunct="1">
+              <a:defRPr>
+                <a:solidFill>
+                  <a:schemeClr val="tx2"/>
+                </a:solidFill>
+              </a:defRPr>
+            </a:lvl2pPr>
+            <a:lvl3pPr eaLnBrk="1" hangingPunct="1">
+              <a:defRPr>
+                <a:solidFill>
+                  <a:schemeClr val="tx2"/>
+                </a:solidFill>
+              </a:defRPr>
+            </a:lvl3pPr>
+            <a:lvl4pPr eaLnBrk="1" hangingPunct="1">
+              <a:defRPr>
+                <a:solidFill>
+                  <a:schemeClr val="tx2"/>
+                </a:solidFill>
+              </a:defRPr>
+            </a:lvl4pPr>
+            <a:lvl5pPr eaLnBrk="1" hangingPunct="1">
+              <a:defRPr>
+                <a:solidFill>
+                  <a:schemeClr val="tx2"/>
+                </a:solidFill>
+              </a:defRPr>
+            </a:lvl5pPr>
+            <a:lvl6pPr eaLnBrk="1" hangingPunct="1">
+              <a:defRPr>
+                <a:solidFill>
+                  <a:schemeClr val="tx2"/>
+                </a:solidFill>
+              </a:defRPr>
+            </a:lvl6pPr>
+            <a:lvl7pPr eaLnBrk="1" hangingPunct="1">
+              <a:defRPr>
+                <a:solidFill>
+                  <a:schemeClr val="tx2"/>
+                </a:solidFill>
+              </a:defRPr>
+            </a:lvl7pPr>
+            <a:lvl8pPr eaLnBrk="1" hangingPunct="1">
+              <a:defRPr>
+                <a:solidFill>
+                  <a:schemeClr val="tx2"/>
+                </a:solidFill>
+              </a:defRPr>
+            </a:lvl8pPr>
+            <a:lvl9pPr eaLnBrk="1" hangingPunct="1">
+              <a:defRPr>
+                <a:solidFill>
+                  <a:schemeClr val="tx2"/>
+                </a:solidFill>
+              </a:defRPr>
+            </a:lvl9pPr>
+          </a:lstStyle>
+          <a:p>
+            <a:r>
+              <a:rPr lang="en-GB" dirty="0" smtClean="0"/>
+              <a:t>Transfers</a:t>
+            </a:r>
+            <a:endParaRPr lang="en-GB" dirty="0"/>
+          </a:p>
+        </p:txBody>
+      </p:sp>
+    </p:spTree>
+    <p:extLst>
+      <p:ext uri="{BB962C8B-B14F-4D97-AF65-F5344CB8AC3E}">
+        <p14:creationId xmlns:p14="http://schemas.microsoft.com/office/powerpoint/2010/main" val="2602936513"/>
+      </p:ext>
+    </p:extLst>
+  </p:cSld>
+  <p:clrMapOvr>
+    <a:masterClrMapping/>
+  </p:clrMapOvr>
+  <p:timing>
+    <p:tnLst>
+      <p:par>
+        <p:cTn id="1" dur="indefinite" restart="never" nodeType="tmRoot"/>
+      </p:par>
+    </p:tnLst>
+  </p:timing>
+</p:sld>
+</file>
+
+<file path=ppt/slides/slide12.xml><?xml version="1.0" encoding="utf-8"?>
+<p:sld xmlns:a="http://schemas.openxmlformats.org/drawingml/2006/main" xmlns:r="http://schemas.openxmlformats.org/officeDocument/2006/relationships" xmlns:p="http://schemas.openxmlformats.org/presentationml/2006/main">
+  <p:cSld>
+    <p:spTree>
+      <p:nvGrpSpPr>
+        <p:cNvPr id="1" name=""/>
+        <p:cNvGrpSpPr/>
+        <p:nvPr/>
+      </p:nvGrpSpPr>
+      <p:grpSpPr>
+        <a:xfrm>
+          <a:off x="0" y="0"/>
+          <a:ext cx="0" cy="0"/>
+          <a:chOff x="0" y="0"/>
+          <a:chExt cx="0" cy="0"/>
+        </a:xfrm>
+      </p:grpSpPr>
+      <p:pic>
+        <p:nvPicPr>
+          <p:cNvPr id="4" name="Picture 3"/>
+          <p:cNvPicPr>
+            <a:picLocks noChangeAspect="1"/>
+          </p:cNvPicPr>
+          <p:nvPr/>
+        </p:nvPicPr>
+        <p:blipFill rotWithShape="1">
+          <a:blip r:embed="rId3"/>
+          <a:srcRect l="36718" t="18500" r="37824" b="8657"/>
+          <a:stretch/>
+        </p:blipFill>
+        <p:spPr>
+          <a:xfrm>
+            <a:off x="4644008" y="908720"/>
+            <a:ext cx="3312368" cy="5328592"/>
+          </a:xfrm>
+          <a:prstGeom prst="rect">
+            <a:avLst/>
+          </a:prstGeom>
+        </p:spPr>
+      </p:pic>
+      <p:sp>
+        <p:nvSpPr>
+          <p:cNvPr id="5" name="Title 1"/>
+          <p:cNvSpPr txBox="1">
+            <a:spLocks/>
+          </p:cNvSpPr>
+          <p:nvPr/>
+        </p:nvSpPr>
+        <p:spPr>
+          <a:xfrm>
+            <a:off x="1043490" y="2323652"/>
+            <a:ext cx="7024744" cy="1143000"/>
+          </a:xfrm>
+          <a:prstGeom prst="rect">
+            <a:avLst/>
+          </a:prstGeom>
+        </p:spPr>
+        <p:txBody>
+          <a:bodyPr vert="horz" lIns="91440" tIns="45720" rIns="91440" bIns="45720" rtlCol="0" anchor="b">
+            <a:normAutofit fontScale="97500"/>
+          </a:bodyPr>
+          <a:lstStyle>
+            <a:lvl1pPr algn="l" defTabSz="914400" rtl="0" eaLnBrk="1" latinLnBrk="0" hangingPunct="1">
+              <a:spcBef>
+                <a:spcPct val="0"/>
+              </a:spcBef>
+              <a:buNone/>
+              <a:defRPr sz="4000" kern="1200">
+                <a:solidFill>
+                  <a:schemeClr val="accent1"/>
+                </a:solidFill>
+                <a:latin typeface="+mj-lt"/>
+                <a:ea typeface="+mj-ea"/>
+                <a:cs typeface="+mj-cs"/>
+              </a:defRPr>
+            </a:lvl1pPr>
+            <a:lvl2pPr eaLnBrk="1" hangingPunct="1">
+              <a:defRPr>
+                <a:solidFill>
+                  <a:schemeClr val="tx2"/>
+                </a:solidFill>
+              </a:defRPr>
+            </a:lvl2pPr>
+            <a:lvl3pPr eaLnBrk="1" hangingPunct="1">
+              <a:defRPr>
+                <a:solidFill>
+                  <a:schemeClr val="tx2"/>
+                </a:solidFill>
+              </a:defRPr>
+            </a:lvl3pPr>
+            <a:lvl4pPr eaLnBrk="1" hangingPunct="1">
+              <a:defRPr>
+                <a:solidFill>
+                  <a:schemeClr val="tx2"/>
+                </a:solidFill>
+              </a:defRPr>
+            </a:lvl4pPr>
+            <a:lvl5pPr eaLnBrk="1" hangingPunct="1">
+              <a:defRPr>
+                <a:solidFill>
+                  <a:schemeClr val="tx2"/>
+                </a:solidFill>
+              </a:defRPr>
+            </a:lvl5pPr>
+            <a:lvl6pPr eaLnBrk="1" hangingPunct="1">
+              <a:defRPr>
+                <a:solidFill>
+                  <a:schemeClr val="tx2"/>
+                </a:solidFill>
+              </a:defRPr>
+            </a:lvl6pPr>
+            <a:lvl7pPr eaLnBrk="1" hangingPunct="1">
+              <a:defRPr>
+                <a:solidFill>
+                  <a:schemeClr val="tx2"/>
+                </a:solidFill>
+              </a:defRPr>
+            </a:lvl7pPr>
+            <a:lvl8pPr eaLnBrk="1" hangingPunct="1">
+              <a:defRPr>
+                <a:solidFill>
+                  <a:schemeClr val="tx2"/>
+                </a:solidFill>
+              </a:defRPr>
+            </a:lvl8pPr>
+            <a:lvl9pPr eaLnBrk="1" hangingPunct="1">
+              <a:defRPr>
+                <a:solidFill>
+                  <a:schemeClr val="tx2"/>
+                </a:solidFill>
+              </a:defRPr>
+            </a:lvl9pPr>
+          </a:lstStyle>
+          <a:p>
+            <a:r>
+              <a:rPr lang="en-GB" dirty="0" smtClean="0"/>
+              <a:t>Branch Finder</a:t>
+            </a:r>
+            <a:endParaRPr lang="en-GB" dirty="0"/>
+          </a:p>
+        </p:txBody>
+      </p:sp>
+    </p:spTree>
+    <p:extLst>
+      <p:ext uri="{BB962C8B-B14F-4D97-AF65-F5344CB8AC3E}">
+        <p14:creationId xmlns:p14="http://schemas.microsoft.com/office/powerpoint/2010/main" val="3873891691"/>
+      </p:ext>
+    </p:extLst>
+  </p:cSld>
+  <p:clrMapOvr>
+    <a:masterClrMapping/>
+  </p:clrMapOvr>
+  <p:timing>
+    <p:tnLst>
+      <p:par>
+        <p:cTn id="1" dur="indefinite" restart="never" nodeType="tmRoot"/>
+      </p:par>
+    </p:tnLst>
+  </p:timing>
+</p:sld>
+</file>
+
+<file path=ppt/slides/slide13.xml><?xml version="1.0" encoding="utf-8"?>
+<p:sld xmlns:a="http://schemas.openxmlformats.org/drawingml/2006/main" xmlns:r="http://schemas.openxmlformats.org/officeDocument/2006/relationships" xmlns:p="http://schemas.openxmlformats.org/presentationml/2006/main">
+  <p:cSld>
+    <p:spTree>
+      <p:nvGrpSpPr>
+        <p:cNvPr id="1" name=""/>
+        <p:cNvGrpSpPr/>
+        <p:nvPr/>
+      </p:nvGrpSpPr>
+      <p:grpSpPr>
+        <a:xfrm>
+          <a:off x="0" y="0"/>
+          <a:ext cx="0" cy="0"/>
+          <a:chOff x="0" y="0"/>
+          <a:chExt cx="0" cy="0"/>
+        </a:xfrm>
+      </p:grpSpPr>
+      <p:pic>
+        <p:nvPicPr>
+          <p:cNvPr id="4" name="Picture 3"/>
+          <p:cNvPicPr>
+            <a:picLocks noChangeAspect="1"/>
+          </p:cNvPicPr>
+          <p:nvPr/>
+        </p:nvPicPr>
+        <p:blipFill rotWithShape="1">
+          <a:blip r:embed="rId3"/>
+          <a:srcRect l="37825" t="16532" r="37824" b="12594"/>
+          <a:stretch/>
+        </p:blipFill>
+        <p:spPr>
+          <a:xfrm>
+            <a:off x="4899882" y="1027664"/>
+            <a:ext cx="3168352" cy="5184576"/>
+          </a:xfrm>
+          <a:prstGeom prst="rect">
+            <a:avLst/>
+          </a:prstGeom>
+        </p:spPr>
+      </p:pic>
+      <p:sp>
+        <p:nvSpPr>
+          <p:cNvPr id="5" name="Title 1"/>
+          <p:cNvSpPr>
+            <a:spLocks noGrp="1"/>
+          </p:cNvSpPr>
+          <p:nvPr>
+            <p:ph type="title"/>
+          </p:nvPr>
+        </p:nvSpPr>
+        <p:spPr>
+          <a:xfrm>
+            <a:off x="899592" y="2276872"/>
+            <a:ext cx="7024744" cy="1143000"/>
+          </a:xfrm>
+        </p:spPr>
+        <p:txBody>
+          <a:bodyPr>
+            <a:normAutofit/>
+          </a:bodyPr>
+          <a:lstStyle/>
+          <a:p>
+            <a:r>
+              <a:rPr lang="en-GB" dirty="0" smtClean="0"/>
+              <a:t>Student Planner</a:t>
+            </a:r>
+            <a:endParaRPr lang="en-GB" dirty="0"/>
+          </a:p>
+        </p:txBody>
+      </p:sp>
+    </p:spTree>
+    <p:extLst>
+      <p:ext uri="{BB962C8B-B14F-4D97-AF65-F5344CB8AC3E}">
+        <p14:creationId xmlns:p14="http://schemas.microsoft.com/office/powerpoint/2010/main" val="4032462348"/>
+      </p:ext>
+    </p:extLst>
+  </p:cSld>
+  <p:clrMapOvr>
+    <a:masterClrMapping/>
+  </p:clrMapOvr>
+  <p:timing>
+    <p:tnLst>
+      <p:par>
+        <p:cTn id="1" dur="indefinite" restart="never" nodeType="tmRoot"/>
+      </p:par>
+    </p:tnLst>
+  </p:timing>
+</p:sld>
+</file>
+
+<file path=ppt/slides/slide14.xml><?xml version="1.0" encoding="utf-8"?>
+<p:sld xmlns:a="http://schemas.openxmlformats.org/drawingml/2006/main" xmlns:r="http://schemas.openxmlformats.org/officeDocument/2006/relationships" xmlns:p="http://schemas.openxmlformats.org/presentationml/2006/main">
+  <p:cSld>
+    <p:spTree>
+      <p:nvGrpSpPr>
+        <p:cNvPr id="1" name=""/>
+        <p:cNvGrpSpPr/>
+        <p:nvPr/>
+      </p:nvGrpSpPr>
+      <p:grpSpPr>
+        <a:xfrm>
+          <a:off x="0" y="0"/>
+          <a:ext cx="0" cy="0"/>
+          <a:chOff x="0" y="0"/>
+          <a:chExt cx="0" cy="0"/>
+        </a:xfrm>
+      </p:grpSpPr>
+      <p:sp>
+        <p:nvSpPr>
+          <p:cNvPr id="5" name="Title 1"/>
+          <p:cNvSpPr>
+            <a:spLocks noGrp="1"/>
+          </p:cNvSpPr>
+          <p:nvPr>
+            <p:ph type="title"/>
+          </p:nvPr>
+        </p:nvSpPr>
+        <p:spPr>
+          <a:xfrm>
+            <a:off x="899592" y="2276872"/>
+            <a:ext cx="7024744" cy="1143000"/>
+          </a:xfrm>
+        </p:spPr>
+        <p:txBody>
+          <a:bodyPr>
+            <a:normAutofit/>
+          </a:bodyPr>
+          <a:lstStyle/>
+          <a:p>
+            <a:r>
+              <a:rPr lang="en-GB" dirty="0" smtClean="0"/>
+              <a:t>Options</a:t>
+            </a:r>
+            <a:endParaRPr lang="en-GB" dirty="0"/>
+          </a:p>
+        </p:txBody>
+      </p:sp>
+      <p:pic>
+        <p:nvPicPr>
+          <p:cNvPr id="2050" name="Picture 2"/>
+          <p:cNvPicPr>
+            <a:picLocks noChangeAspect="1" noChangeArrowheads="1"/>
+          </p:cNvPicPr>
+          <p:nvPr/>
+        </p:nvPicPr>
+        <p:blipFill rotWithShape="1">
+          <a:blip r:embed="rId3">
+            <a:extLst>
+              <a:ext uri="{28A0092B-C50C-407E-A947-70E740481C1C}">
+                <a14:useLocalDpi xmlns:a14="http://schemas.microsoft.com/office/drawing/2010/main" val="0"/>
+              </a:ext>
+            </a:extLst>
+          </a:blip>
+          <a:srcRect l="25522" t="19298" r="48956" b="8114"/>
+          <a:stretch/>
+        </p:blipFill>
+        <p:spPr bwMode="auto">
+          <a:xfrm>
+            <a:off x="4572000" y="836712"/>
+            <a:ext cx="3320716" cy="5309937"/>
+          </a:xfrm>
+          <a:prstGeom prst="rect">
+            <a:avLst/>
+          </a:prstGeom>
+          <a:noFill/>
+          <a:ln>
+            <a:noFill/>
+          </a:ln>
+          <a:extLst>
+            <a:ext uri="{909E8E84-426E-40DD-AFC4-6F175D3DCCD1}">
+              <a14:hiddenFill xmlns:a14="http://schemas.microsoft.com/office/drawing/2010/main">
+                <a:solidFill>
+                  <a:schemeClr val="accent1"/>
+                </a:solidFill>
+              </a14:hiddenFill>
+            </a:ext>
+            <a:ext uri="{91240B29-F687-4F45-9708-019B960494DF}">
+              <a14:hiddenLine xmlns:a14="http://schemas.microsoft.com/office/drawing/2010/main" w="9525">
+                <a:solidFill>
+                  <a:schemeClr val="tx1"/>
+                </a:solidFill>
+                <a:miter lim="800000"/>
+                <a:headEnd/>
+                <a:tailEnd/>
+              </a14:hiddenLine>
+            </a:ext>
+          </a:extLst>
+        </p:spPr>
+      </p:pic>
+    </p:spTree>
+    <p:extLst>
+      <p:ext uri="{BB962C8B-B14F-4D97-AF65-F5344CB8AC3E}">
+        <p14:creationId xmlns:p14="http://schemas.microsoft.com/office/powerpoint/2010/main" val="1711443757"/>
+      </p:ext>
+    </p:extLst>
+  </p:cSld>
+  <p:clrMapOvr>
+    <a:masterClrMapping/>
+  </p:clrMapOvr>
+  <p:timing>
+    <p:tnLst>
+      <p:par>
+        <p:cTn id="1" dur="indefinite" restart="never" nodeType="tmRoot"/>
+      </p:par>
+    </p:tnLst>
+  </p:timing>
+</p:sld>
+</file>
+
 <file path=ppt/slides/slide2.xml><?xml version="1.0" encoding="utf-8"?>
 <p:sld xmlns:a="http://schemas.openxmlformats.org/drawingml/2006/main" xmlns:r="http://schemas.openxmlformats.org/officeDocument/2006/relationships" xmlns:p="http://schemas.openxmlformats.org/presentationml/2006/main">
   <p:cSld>
@@ -14671,7 +16441,7 @@
     </p:spTree>
     <p:extLst>
       <p:ext uri="{BB962C8B-B14F-4D97-AF65-F5344CB8AC3E}">
-        <p14:creationId xmlns:p14="http://schemas.microsoft.com/office/powerpoint/2010/main" val="2514916662"/>
+        <p14:creationId xmlns:p14="http://schemas.microsoft.com/office/powerpoint/2010/main" val="540261890"/>
       </p:ext>
     </p:extLst>
   </p:cSld>
@@ -14851,79 +16621,198 @@
       </p:sp>
       <p:sp>
         <p:nvSpPr>
-          <p:cNvPr id="3" name="Content Placeholder 2"/>
-          <p:cNvSpPr>
-            <a:spLocks noGrp="1"/>
-          </p:cNvSpPr>
-          <p:nvPr>
-            <p:ph idx="1"/>
-          </p:nvPr>
+          <p:cNvPr id="5" name="Rectangle 4"/>
+          <p:cNvSpPr/>
+          <p:nvPr/>
         </p:nvSpPr>
         <p:spPr>
           <a:xfrm>
-            <a:off x="1043608" y="2204864"/>
-            <a:ext cx="6777317" cy="3508977"/>
+            <a:off x="5000628" y="3286124"/>
+            <a:ext cx="2143140" cy="571504"/>
           </a:xfrm>
+          <a:prstGeom prst="rect">
+            <a:avLst/>
+          </a:prstGeom>
         </p:spPr>
+        <p:style>
+          <a:lnRef idx="2">
+            <a:schemeClr val="accent1">
+              <a:shade val="50000"/>
+            </a:schemeClr>
+          </a:lnRef>
+          <a:fillRef idx="1">
+            <a:schemeClr val="accent1"/>
+          </a:fillRef>
+          <a:effectRef idx="0">
+            <a:schemeClr val="accent1"/>
+          </a:effectRef>
+          <a:fontRef idx="minor">
+            <a:schemeClr val="lt1"/>
+          </a:fontRef>
+        </p:style>
         <p:txBody>
-          <a:bodyPr/>
+          <a:bodyPr rtlCol="0" anchor="ctr"/>
           <a:lstStyle/>
           <a:p>
-            <a:pPr marL="0" indent="0">
-              <a:buNone/>
-            </a:pPr>
+            <a:pPr algn="ctr"/>
             <a:r>
               <a:rPr lang="en-GB" dirty="0" smtClean="0"/>
-              <a:t>If it hasn’t already been clarified you will find a prototype of our future app </a:t>
+              <a:t>Lloyds1</a:t>
             </a:r>
+            <a:endParaRPr lang="en-GB" dirty="0"/>
+          </a:p>
+        </p:txBody>
+      </p:sp>
+      <p:sp>
+        <p:nvSpPr>
+          <p:cNvPr id="7" name="Rectangle 6"/>
+          <p:cNvSpPr/>
+          <p:nvPr/>
+        </p:nvSpPr>
+        <p:spPr>
+          <a:xfrm>
+            <a:off x="5000628" y="4357694"/>
+            <a:ext cx="2143140" cy="571504"/>
+          </a:xfrm>
+          <a:prstGeom prst="rect">
+            <a:avLst/>
+          </a:prstGeom>
+        </p:spPr>
+        <p:style>
+          <a:lnRef idx="2">
+            <a:schemeClr val="accent1">
+              <a:shade val="50000"/>
+            </a:schemeClr>
+          </a:lnRef>
+          <a:fillRef idx="1">
+            <a:schemeClr val="accent1"/>
+          </a:fillRef>
+          <a:effectRef idx="0">
+            <a:schemeClr val="accent1"/>
+          </a:effectRef>
+          <a:fontRef idx="minor">
+            <a:schemeClr val="lt1"/>
+          </a:fontRef>
+        </p:style>
+        <p:txBody>
+          <a:bodyPr rtlCol="0" anchor="ctr"/>
+          <a:lstStyle/>
+          <a:p>
+            <a:pPr algn="ctr"/>
             <a:r>
               <a:rPr lang="en-GB" dirty="0" smtClean="0"/>
-              <a:t>in </a:t>
-            </a:r>
-            <a:r>
-              <a:rPr lang="en-GB" dirty="0" smtClean="0"/>
-              <a:t>front of you or currently passing </a:t>
-            </a:r>
-            <a:r>
-              <a:rPr lang="en-GB" dirty="0" smtClean="0"/>
-              <a:t>around</a:t>
-            </a:r>
-            <a:r>
-              <a:rPr lang="en-GB" dirty="0"/>
-              <a:t> </a:t>
-            </a:r>
-            <a:r>
-              <a:rPr lang="en-GB" dirty="0" smtClean="0"/>
-              <a:t>the audience. </a:t>
-            </a:r>
-            <a:endParaRPr lang="en-GB" dirty="0" smtClean="0"/>
-          </a:p>
-          <a:p>
-            <a:pPr marL="0" indent="0">
-              <a:buNone/>
-            </a:pPr>
-            <a:endParaRPr lang="en-GB" dirty="0" smtClean="0"/>
-          </a:p>
-          <a:p>
-            <a:pPr marL="0" indent="0">
-              <a:buNone/>
-            </a:pPr>
-            <a:r>
-              <a:rPr lang="en-GB" dirty="0" smtClean="0"/>
-              <a:t>Remember it’s early days, so there’s more great innovations </a:t>
-            </a:r>
-            <a:r>
-              <a:rPr lang="en-GB" dirty="0" smtClean="0"/>
-              <a:t>planned and still </a:t>
-            </a:r>
-            <a:r>
-              <a:rPr lang="en-GB" dirty="0" smtClean="0"/>
-              <a:t>to come (will touch upon later). </a:t>
+              <a:t>1234</a:t>
             </a:r>
             <a:endParaRPr lang="en-GB" dirty="0"/>
           </a:p>
         </p:txBody>
       </p:sp>
+      <p:pic>
+        <p:nvPicPr>
+          <p:cNvPr id="1027" name="Picture 3"/>
+          <p:cNvPicPr>
+            <a:picLocks noChangeAspect="1" noChangeArrowheads="1"/>
+          </p:cNvPicPr>
+          <p:nvPr/>
+        </p:nvPicPr>
+        <p:blipFill>
+          <a:blip r:embed="rId3"/>
+          <a:srcRect l="69610" t="16667" r="16327" b="16666"/>
+          <a:stretch>
+            <a:fillRect/>
+          </a:stretch>
+        </p:blipFill>
+        <p:spPr bwMode="auto">
+          <a:xfrm>
+            <a:off x="1357290" y="2214554"/>
+            <a:ext cx="2544981" cy="4071942"/>
+          </a:xfrm>
+          <a:prstGeom prst="rect">
+            <a:avLst/>
+          </a:prstGeom>
+          <a:noFill/>
+          <a:ln w="9525">
+            <a:noFill/>
+            <a:miter lim="800000"/>
+            <a:headEnd/>
+            <a:tailEnd/>
+          </a:ln>
+          <a:effectLst/>
+        </p:spPr>
+      </p:pic>
+      <p:cxnSp>
+        <p:nvCxnSpPr>
+          <p:cNvPr id="9" name="Straight Arrow Connector 8"/>
+          <p:cNvCxnSpPr>
+            <a:stCxn id="5" idx="1"/>
+          </p:cNvCxnSpPr>
+          <p:nvPr/>
+        </p:nvCxnSpPr>
+        <p:spPr>
+          <a:xfrm rot="10800000" flipV="1">
+            <a:off x="3571868" y="3571876"/>
+            <a:ext cx="1428760" cy="857256"/>
+          </a:xfrm>
+          <a:prstGeom prst="straightConnector1">
+            <a:avLst/>
+          </a:prstGeom>
+          <a:ln w="44450">
+            <a:solidFill>
+              <a:schemeClr val="bg2"/>
+            </a:solidFill>
+            <a:tailEnd type="arrow"/>
+          </a:ln>
+        </p:spPr>
+        <p:style>
+          <a:lnRef idx="1">
+            <a:schemeClr val="accent1"/>
+          </a:lnRef>
+          <a:fillRef idx="0">
+            <a:schemeClr val="accent1"/>
+          </a:fillRef>
+          <a:effectRef idx="0">
+            <a:schemeClr val="accent1"/>
+          </a:effectRef>
+          <a:fontRef idx="minor">
+            <a:schemeClr val="tx1"/>
+          </a:fontRef>
+        </p:style>
+      </p:cxnSp>
+      <p:cxnSp>
+        <p:nvCxnSpPr>
+          <p:cNvPr id="11" name="Straight Arrow Connector 10"/>
+          <p:cNvCxnSpPr>
+            <a:stCxn id="7" idx="1"/>
+          </p:cNvCxnSpPr>
+          <p:nvPr/>
+        </p:nvCxnSpPr>
+        <p:spPr>
+          <a:xfrm rot="10800000" flipV="1">
+            <a:off x="3571868" y="4643446"/>
+            <a:ext cx="1428760" cy="142876"/>
+          </a:xfrm>
+          <a:prstGeom prst="straightConnector1">
+            <a:avLst/>
+          </a:prstGeom>
+          <a:ln w="44450">
+            <a:tailEnd type="arrow"/>
+          </a:ln>
+        </p:spPr>
+        <p:style>
+          <a:lnRef idx="1">
+            <a:schemeClr val="accent1"/>
+          </a:lnRef>
+          <a:fillRef idx="0">
+            <a:schemeClr val="accent1"/>
+          </a:fillRef>
+          <a:effectRef idx="0">
+            <a:schemeClr val="accent1"/>
+          </a:effectRef>
+          <a:fontRef idx="minor">
+            <a:schemeClr val="tx1"/>
+          </a:fontRef>
+        </p:style>
+      </p:cxnSp>
     </p:spTree>
     <p:extLst>
       <p:ext uri="{BB962C8B-B14F-4D97-AF65-F5344CB8AC3E}">
@@ -14971,19 +16860,14 @@
             <p:ph type="title"/>
           </p:nvPr>
         </p:nvSpPr>
-        <p:spPr>
-          <a:xfrm>
-            <a:off x="1115616" y="620688"/>
-            <a:ext cx="8229600" cy="1143000"/>
-          </a:xfrm>
-        </p:spPr>
+        <p:spPr/>
         <p:txBody>
           <a:bodyPr/>
           <a:lstStyle/>
           <a:p>
             <a:r>
               <a:rPr lang="en-GB" dirty="0" smtClean="0"/>
-              <a:t>What was our project choice? </a:t>
+              <a:t>Age range</a:t>
             </a:r>
             <a:endParaRPr lang="en-GB" dirty="0"/>
           </a:p>
@@ -14991,64 +16875,56 @@
       </p:sp>
       <p:sp>
         <p:nvSpPr>
-          <p:cNvPr id="4" name="Title 1"/>
-          <p:cNvSpPr txBox="1">
-            <a:spLocks/>
+          <p:cNvPr id="3" name="Content Placeholder 2"/>
+          <p:cNvSpPr>
+            <a:spLocks noGrp="1"/>
           </p:cNvSpPr>
+          <p:nvPr>
+            <p:ph idx="1"/>
+          </p:nvPr>
+        </p:nvSpPr>
+        <p:spPr/>
+        <p:txBody>
+          <a:bodyPr>
+            <a:normAutofit/>
+          </a:bodyPr>
+          <a:lstStyle/>
+          <a:p>
+            <a:r>
+              <a:rPr lang="en-GB" sz="2800" dirty="0" smtClean="0"/>
+              <a:t>18 - 25</a:t>
+            </a:r>
+            <a:endParaRPr lang="en-GB" sz="2800" dirty="0"/>
+          </a:p>
+        </p:txBody>
+      </p:sp>
+      <p:pic>
+        <p:nvPicPr>
+          <p:cNvPr id="30722" name="Picture 2" descr="http://3.bp.blogspot.com/-6eSimv5Rlm8/TqK-MzqUT2I/AAAAAAAACSk/v7hm9udTuXg/s1600/top-imagery_students.jpg"/>
+          <p:cNvPicPr>
+            <a:picLocks noChangeAspect="1" noChangeArrowheads="1"/>
+          </p:cNvPicPr>
           <p:nvPr/>
-        </p:nvSpPr>
-        <p:spPr>
+        </p:nvPicPr>
+        <p:blipFill>
+          <a:blip r:embed="rId3"/>
+          <a:srcRect/>
+          <a:stretch>
+            <a:fillRect/>
+          </a:stretch>
+        </p:blipFill>
+        <p:spPr bwMode="auto">
           <a:xfrm>
-            <a:off x="395536" y="2348880"/>
-            <a:ext cx="8229600" cy="1143000"/>
+            <a:off x="1643042" y="3000372"/>
+            <a:ext cx="5905500" cy="3009901"/>
           </a:xfrm>
           <a:prstGeom prst="rect">
             <a:avLst/>
           </a:prstGeom>
+          <a:noFill/>
         </p:spPr>
-        <p:txBody>
-          <a:bodyPr vert="horz" lIns="91440" tIns="45720" rIns="91440" bIns="45720" rtlCol="0" anchor="ctr">
-            <a:normAutofit/>
-          </a:bodyPr>
-          <a:lstStyle>
-            <a:lvl1pPr algn="ctr" defTabSz="914400" rtl="0" eaLnBrk="1" latinLnBrk="0" hangingPunct="1">
-              <a:spcBef>
-                <a:spcPct val="0"/>
-              </a:spcBef>
-              <a:buNone/>
-              <a:defRPr sz="4400" kern="1200">
-                <a:solidFill>
-                  <a:schemeClr val="tx1"/>
-                </a:solidFill>
-                <a:latin typeface="+mj-lt"/>
-                <a:ea typeface="+mj-ea"/>
-                <a:cs typeface="+mj-cs"/>
-              </a:defRPr>
-            </a:lvl1pPr>
-          </a:lstStyle>
-          <a:p>
-            <a:r>
-              <a:rPr lang="en-GB" dirty="0" smtClean="0">
-                <a:solidFill>
-                  <a:srgbClr val="006A4C"/>
-                </a:solidFill>
-              </a:rPr>
-              <a:t>Why not web or both? </a:t>
-            </a:r>
-            <a:endParaRPr lang="en-GB" dirty="0">
-              <a:solidFill>
-                <a:srgbClr val="006A4C"/>
-              </a:solidFill>
-            </a:endParaRPr>
-          </a:p>
-        </p:txBody>
-      </p:sp>
+      </p:pic>
     </p:spTree>
-    <p:extLst>
-      <p:ext uri="{BB962C8B-B14F-4D97-AF65-F5344CB8AC3E}">
-        <p14:creationId xmlns:p14="http://schemas.microsoft.com/office/powerpoint/2010/main" val="617838036"/>
-      </p:ext>
-    </p:extLst>
   </p:cSld>
   <p:clrMapOvr>
     <a:masterClrMapping/>
@@ -15056,88 +16932,9 @@
   <p:timing>
     <p:tnLst>
       <p:par>
-        <p:cTn id="1" dur="indefinite" restart="never" nodeType="tmRoot">
-          <p:childTnLst>
-            <p:seq concurrent="1" nextAc="seek">
-              <p:cTn id="2" dur="indefinite" nodeType="mainSeq">
-                <p:childTnLst>
-                  <p:par>
-                    <p:cTn id="3" fill="hold">
-                      <p:stCondLst>
-                        <p:cond delay="indefinite"/>
-                      </p:stCondLst>
-                      <p:childTnLst>
-                        <p:par>
-                          <p:cTn id="4" fill="hold">
-                            <p:stCondLst>
-                              <p:cond delay="0"/>
-                            </p:stCondLst>
-                            <p:childTnLst>
-                              <p:par>
-                                <p:cTn id="5" presetID="10" presetClass="entr" presetSubtype="0" fill="hold" grpId="0" nodeType="clickEffect">
-                                  <p:stCondLst>
-                                    <p:cond delay="0"/>
-                                  </p:stCondLst>
-                                  <p:childTnLst>
-                                    <p:set>
-                                      <p:cBhvr>
-                                        <p:cTn id="6" dur="1" fill="hold">
-                                          <p:stCondLst>
-                                            <p:cond delay="0"/>
-                                          </p:stCondLst>
-                                        </p:cTn>
-                                        <p:tgtEl>
-                                          <p:spTgt spid="4"/>
-                                        </p:tgtEl>
-                                        <p:attrNameLst>
-                                          <p:attrName>style.visibility</p:attrName>
-                                        </p:attrNameLst>
-                                      </p:cBhvr>
-                                      <p:to>
-                                        <p:strVal val="visible"/>
-                                      </p:to>
-                                    </p:set>
-                                    <p:animEffect transition="in" filter="fade">
-                                      <p:cBhvr>
-                                        <p:cTn id="7" dur="500"/>
-                                        <p:tgtEl>
-                                          <p:spTgt spid="4"/>
-                                        </p:tgtEl>
-                                      </p:cBhvr>
-                                    </p:animEffect>
-                                  </p:childTnLst>
-                                </p:cTn>
-                              </p:par>
-                            </p:childTnLst>
-                          </p:cTn>
-                        </p:par>
-                      </p:childTnLst>
-                    </p:cTn>
-                  </p:par>
-                </p:childTnLst>
-              </p:cTn>
-              <p:prevCondLst>
-                <p:cond evt="onPrev" delay="0">
-                  <p:tgtEl>
-                    <p:sldTgt/>
-                  </p:tgtEl>
-                </p:cond>
-              </p:prevCondLst>
-              <p:nextCondLst>
-                <p:cond evt="onNext" delay="0">
-                  <p:tgtEl>
-                    <p:sldTgt/>
-                  </p:tgtEl>
-                </p:cond>
-              </p:nextCondLst>
-            </p:seq>
-          </p:childTnLst>
-        </p:cTn>
+        <p:cTn id="1" dur="indefinite" restart="never" nodeType="tmRoot"/>
       </p:par>
     </p:tnLst>
-    <p:bldLst>
-      <p:bldP spid="4" grpId="0"/>
-    </p:bldLst>
   </p:timing>
 </p:sld>
 </file>
@@ -15171,8 +16968,62 @@
         </p:nvSpPr>
         <p:spPr>
           <a:xfrm>
-            <a:off x="1259632" y="620688"/>
-            <a:ext cx="8229600" cy="1143000"/>
+            <a:off x="1131065" y="620688"/>
+            <a:ext cx="7024744" cy="1143000"/>
+          </a:xfrm>
+        </p:spPr>
+        <p:txBody>
+          <a:bodyPr/>
+          <a:lstStyle/>
+          <a:p>
+            <a:r>
+              <a:rPr lang="en-GB" dirty="0" smtClean="0"/>
+              <a:t>Project choice</a:t>
+            </a:r>
+            <a:endParaRPr lang="en-GB" dirty="0"/>
+          </a:p>
+        </p:txBody>
+      </p:sp>
+      <p:pic>
+        <p:nvPicPr>
+          <p:cNvPr id="3078" name="Picture 6" descr="http://i-cdn.phonearena.com/images/articles/132206-thumb/android-billion.png"/>
+          <p:cNvPicPr>
+            <a:picLocks noChangeAspect="1" noChangeArrowheads="1"/>
+          </p:cNvPicPr>
+          <p:nvPr/>
+        </p:nvPicPr>
+        <p:blipFill>
+          <a:blip r:embed="rId3"/>
+          <a:srcRect/>
+          <a:stretch>
+            <a:fillRect/>
+          </a:stretch>
+        </p:blipFill>
+        <p:spPr bwMode="auto">
+          <a:xfrm>
+            <a:off x="785785" y="2276872"/>
+            <a:ext cx="7715305" cy="4009626"/>
+          </a:xfrm>
+          <a:prstGeom prst="rect">
+            <a:avLst/>
+          </a:prstGeom>
+          <a:noFill/>
+        </p:spPr>
+      </p:pic>
+      <p:sp>
+        <p:nvSpPr>
+          <p:cNvPr id="6" name="Content Placeholder 2"/>
+          <p:cNvSpPr>
+            <a:spLocks noGrp="1"/>
+          </p:cNvSpPr>
+          <p:nvPr>
+            <p:ph idx="1"/>
+          </p:nvPr>
+        </p:nvSpPr>
+        <p:spPr>
+          <a:xfrm>
+            <a:off x="1115616" y="1772816"/>
+            <a:ext cx="6777317" cy="3508977"/>
           </a:xfrm>
         </p:spPr>
         <p:txBody>
@@ -15182,73 +17033,14 @@
           <a:lstStyle/>
           <a:p>
             <a:r>
-              <a:rPr lang="en-GB" dirty="0" smtClean="0"/>
-              <a:t>What age range did we decide? </a:t>
+              <a:rPr lang="en-GB" sz="2800" dirty="0" smtClean="0"/>
+              <a:t>Android App</a:t>
             </a:r>
-            <a:endParaRPr lang="en-GB" dirty="0"/>
-          </a:p>
-        </p:txBody>
-      </p:sp>
-      <p:sp>
-        <p:nvSpPr>
-          <p:cNvPr id="4" name="Title 1"/>
-          <p:cNvSpPr txBox="1">
-            <a:spLocks/>
-          </p:cNvSpPr>
-          <p:nvPr/>
-        </p:nvSpPr>
-        <p:spPr>
-          <a:xfrm>
-            <a:off x="395536" y="2373014"/>
-            <a:ext cx="8229600" cy="1143000"/>
-          </a:xfrm>
-          <a:prstGeom prst="rect">
-            <a:avLst/>
-          </a:prstGeom>
-        </p:spPr>
-        <p:txBody>
-          <a:bodyPr vert="horz" lIns="91440" tIns="45720" rIns="91440" bIns="45720" rtlCol="0" anchor="ctr">
-            <a:normAutofit/>
-          </a:bodyPr>
-          <a:lstStyle>
-            <a:lvl1pPr algn="ctr" defTabSz="914400" rtl="0" eaLnBrk="1" latinLnBrk="0" hangingPunct="1">
-              <a:spcBef>
-                <a:spcPct val="0"/>
-              </a:spcBef>
-              <a:buNone/>
-              <a:defRPr sz="4400" kern="1200">
-                <a:solidFill>
-                  <a:schemeClr val="tx1"/>
-                </a:solidFill>
-                <a:latin typeface="+mj-lt"/>
-                <a:ea typeface="+mj-ea"/>
-                <a:cs typeface="+mj-cs"/>
-              </a:defRPr>
-            </a:lvl1pPr>
-          </a:lstStyle>
-          <a:p>
-            <a:r>
-              <a:rPr lang="en-GB" dirty="0" smtClean="0">
-                <a:solidFill>
-                  <a:srgbClr val="006A4C"/>
-                </a:solidFill>
-              </a:rPr>
-              <a:t>Why not children? </a:t>
-            </a:r>
-            <a:endParaRPr lang="en-GB" dirty="0">
-              <a:solidFill>
-                <a:srgbClr val="006A4C"/>
-              </a:solidFill>
-            </a:endParaRPr>
+            <a:endParaRPr lang="en-GB" sz="2800" dirty="0"/>
           </a:p>
         </p:txBody>
       </p:sp>
     </p:spTree>
-    <p:extLst>
-      <p:ext uri="{BB962C8B-B14F-4D97-AF65-F5344CB8AC3E}">
-        <p14:creationId xmlns:p14="http://schemas.microsoft.com/office/powerpoint/2010/main" val="3861855043"/>
-      </p:ext>
-    </p:extLst>
   </p:cSld>
   <p:clrMapOvr>
     <a:masterClrMapping/>
@@ -15256,88 +17048,9 @@
   <p:timing>
     <p:tnLst>
       <p:par>
-        <p:cTn id="1" dur="indefinite" restart="never" nodeType="tmRoot">
-          <p:childTnLst>
-            <p:seq concurrent="1" nextAc="seek">
-              <p:cTn id="2" dur="indefinite" nodeType="mainSeq">
-                <p:childTnLst>
-                  <p:par>
-                    <p:cTn id="3" fill="hold">
-                      <p:stCondLst>
-                        <p:cond delay="indefinite"/>
-                      </p:stCondLst>
-                      <p:childTnLst>
-                        <p:par>
-                          <p:cTn id="4" fill="hold">
-                            <p:stCondLst>
-                              <p:cond delay="0"/>
-                            </p:stCondLst>
-                            <p:childTnLst>
-                              <p:par>
-                                <p:cTn id="5" presetID="10" presetClass="entr" presetSubtype="0" fill="hold" grpId="0" nodeType="clickEffect">
-                                  <p:stCondLst>
-                                    <p:cond delay="0"/>
-                                  </p:stCondLst>
-                                  <p:childTnLst>
-                                    <p:set>
-                                      <p:cBhvr>
-                                        <p:cTn id="6" dur="1" fill="hold">
-                                          <p:stCondLst>
-                                            <p:cond delay="0"/>
-                                          </p:stCondLst>
-                                        </p:cTn>
-                                        <p:tgtEl>
-                                          <p:spTgt spid="4"/>
-                                        </p:tgtEl>
-                                        <p:attrNameLst>
-                                          <p:attrName>style.visibility</p:attrName>
-                                        </p:attrNameLst>
-                                      </p:cBhvr>
-                                      <p:to>
-                                        <p:strVal val="visible"/>
-                                      </p:to>
-                                    </p:set>
-                                    <p:animEffect transition="in" filter="fade">
-                                      <p:cBhvr>
-                                        <p:cTn id="7" dur="500"/>
-                                        <p:tgtEl>
-                                          <p:spTgt spid="4"/>
-                                        </p:tgtEl>
-                                      </p:cBhvr>
-                                    </p:animEffect>
-                                  </p:childTnLst>
-                                </p:cTn>
-                              </p:par>
-                            </p:childTnLst>
-                          </p:cTn>
-                        </p:par>
-                      </p:childTnLst>
-                    </p:cTn>
-                  </p:par>
-                </p:childTnLst>
-              </p:cTn>
-              <p:prevCondLst>
-                <p:cond evt="onPrev" delay="0">
-                  <p:tgtEl>
-                    <p:sldTgt/>
-                  </p:tgtEl>
-                </p:cond>
-              </p:prevCondLst>
-              <p:nextCondLst>
-                <p:cond evt="onNext" delay="0">
-                  <p:tgtEl>
-                    <p:sldTgt/>
-                  </p:tgtEl>
-                </p:cond>
-              </p:nextCondLst>
-            </p:seq>
-          </p:childTnLst>
-        </p:cTn>
+        <p:cTn id="1" dur="indefinite" restart="never" nodeType="tmRoot"/>
       </p:par>
     </p:tnLst>
-    <p:bldLst>
-      <p:bldP spid="4" grpId="0"/>
-    </p:bldLst>
   </p:timing>
 </p:sld>
 </file>
@@ -15461,7 +17174,7 @@
         </p:nvSpPr>
         <p:spPr>
           <a:xfrm>
-            <a:off x="4067944" y="3284984"/>
+            <a:off x="4080720" y="3645024"/>
             <a:ext cx="4402832" cy="2088233"/>
           </a:xfrm>
           <a:prstGeom prst="rect">
@@ -15666,21 +17379,6 @@
             <a:r>
               <a:rPr lang="en-GB" dirty="0"/>
               <a:t>A student focused finance planner (assistant) </a:t>
-            </a:r>
-          </a:p>
-          <a:p>
-            <a:pPr indent="-342900"/>
-            <a:r>
-              <a:rPr lang="en-GB" dirty="0"/>
-              <a:t>&lt;insert future innovations in later version of </a:t>
-            </a:r>
-            <a:r>
-              <a:rPr lang="en-GB" dirty="0" err="1"/>
-              <a:t>powerpoint</a:t>
-            </a:r>
-            <a:r>
-              <a:rPr lang="en-GB" dirty="0"/>
-              <a:t>&gt; </a:t>
             </a:r>
           </a:p>
         </p:txBody>
@@ -16077,49 +17775,6 @@
                                   </p:childTnLst>
                                 </p:cTn>
                               </p:par>
-                              <p:par>
-                                <p:cTn id="31" presetID="10" presetClass="entr" presetSubtype="0" fill="hold" grpId="0" nodeType="withEffect">
-                                  <p:stCondLst>
-                                    <p:cond delay="0"/>
-                                  </p:stCondLst>
-                                  <p:childTnLst>
-                                    <p:set>
-                                      <p:cBhvr>
-                                        <p:cTn id="32" dur="1" fill="hold">
-                                          <p:stCondLst>
-                                            <p:cond delay="0"/>
-                                          </p:stCondLst>
-                                        </p:cTn>
-                                        <p:tgtEl>
-                                          <p:spTgt spid="7">
-                                            <p:txEl>
-                                              <p:pRg st="3" end="3"/>
-                                            </p:txEl>
-                                          </p:spTgt>
-                                        </p:tgtEl>
-                                        <p:attrNameLst>
-                                          <p:attrName>style.visibility</p:attrName>
-                                        </p:attrNameLst>
-                                      </p:cBhvr>
-                                      <p:to>
-                                        <p:strVal val="visible"/>
-                                      </p:to>
-                                    </p:set>
-                                    <p:animEffect transition="in" filter="fade">
-                                      <p:cBhvr>
-                                        <p:cTn id="33" dur="500"/>
-                                        <p:tgtEl>
-                                          <p:spTgt spid="7">
-                                            <p:txEl>
-                                              <p:pRg st="3" end="3"/>
-                                            </p:txEl>
-                                          </p:spTgt>
-                                        </p:tgtEl>
-                                      </p:cBhvr>
-                                    </p:animEffect>
-                                  </p:childTnLst>
-                                </p:cTn>
-                              </p:par>
                             </p:childTnLst>
                           </p:cTn>
                         </p:par>
@@ -16184,59 +17839,78 @@
         </p:nvSpPr>
         <p:spPr>
           <a:xfrm>
-            <a:off x="1043490" y="1027664"/>
-            <a:ext cx="7024744" cy="745152"/>
-          </a:xfrm>
-        </p:spPr>
-        <p:txBody>
-          <a:bodyPr>
-            <a:normAutofit/>
-          </a:bodyPr>
-          <a:lstStyle/>
-          <a:p>
-            <a:r>
-              <a:rPr lang="en-GB" dirty="0" smtClean="0"/>
-              <a:t>How we designed the prototype</a:t>
-            </a:r>
-            <a:endParaRPr lang="en-GB" dirty="0"/>
-          </a:p>
-        </p:txBody>
-      </p:sp>
-      <p:sp>
-        <p:nvSpPr>
-          <p:cNvPr id="3" name="Content Placeholder 2"/>
-          <p:cNvSpPr>
-            <a:spLocks noGrp="1"/>
-          </p:cNvSpPr>
-          <p:nvPr>
-            <p:ph idx="1"/>
-          </p:nvPr>
-        </p:nvSpPr>
-        <p:spPr>
-          <a:xfrm>
-            <a:off x="1043492" y="1916833"/>
-            <a:ext cx="6777317" cy="1728192"/>
+            <a:off x="1043608" y="2276872"/>
+            <a:ext cx="7024744" cy="1143000"/>
           </a:xfrm>
         </p:spPr>
         <p:txBody>
           <a:bodyPr/>
           <a:lstStyle/>
           <a:p>
-            <a:pPr marL="0" indent="0">
-              <a:buNone/>
-            </a:pPr>
             <a:r>
               <a:rPr lang="en-GB" dirty="0" smtClean="0"/>
-              <a:t>We developed multiple prototypes based on what we thought a banking app should be like, we then took the pros from each and combined them into one master prototype. </a:t>
+              <a:t>Main Screen</a:t>
             </a:r>
             <a:endParaRPr lang="en-GB" dirty="0"/>
           </a:p>
         </p:txBody>
       </p:sp>
+      <p:pic>
+        <p:nvPicPr>
+          <p:cNvPr id="1026" name="Picture 2"/>
+          <p:cNvPicPr>
+            <a:picLocks noChangeAspect="1" noChangeArrowheads="1"/>
+          </p:cNvPicPr>
+          <p:nvPr/>
+        </p:nvPicPr>
+        <p:blipFill rotWithShape="1">
+          <a:blip r:embed="rId3">
+            <a:extLst>
+              <a:ext uri="{28A0092B-C50C-407E-A947-70E740481C1C}">
+                <a14:useLocalDpi xmlns:a14="http://schemas.microsoft.com/office/drawing/2010/main" val="0"/>
+              </a:ext>
+            </a:extLst>
+          </a:blip>
+          <a:srcRect l="25645" t="20175" r="48710" b="8335"/>
+          <a:stretch/>
+        </p:blipFill>
+        <p:spPr bwMode="auto">
+          <a:xfrm>
+            <a:off x="4427984" y="908720"/>
+            <a:ext cx="3336758" cy="5229726"/>
+          </a:xfrm>
+          <a:prstGeom prst="rect">
+            <a:avLst/>
+          </a:prstGeom>
+          <a:noFill/>
+          <a:ln>
+            <a:noFill/>
+          </a:ln>
+          <a:extLst>
+            <a:ext uri="{909E8E84-426E-40DD-AFC4-6F175D3DCCD1}">
+              <a14:hiddenFill xmlns:a14="http://schemas.microsoft.com/office/drawing/2010/main">
+                <a:solidFill>
+                  <a:schemeClr val="accent1"/>
+                </a:solidFill>
+              </a14:hiddenFill>
+            </a:ext>
+            <a:ext uri="{91240B29-F687-4F45-9708-019B960494DF}">
+              <a14:hiddenLine xmlns:a14="http://schemas.microsoft.com/office/drawing/2010/main" w="9525">
+                <a:solidFill>
+                  <a:schemeClr val="tx1"/>
+                </a:solidFill>
+                <a:miter lim="800000"/>
+                <a:headEnd/>
+                <a:tailEnd/>
+              </a14:hiddenLine>
+            </a:ext>
+          </a:extLst>
+        </p:spPr>
+      </p:pic>
     </p:spTree>
     <p:extLst>
       <p:ext uri="{BB962C8B-B14F-4D97-AF65-F5344CB8AC3E}">
-        <p14:creationId xmlns:p14="http://schemas.microsoft.com/office/powerpoint/2010/main" val="2394123016"/>
+        <p14:creationId xmlns:p14="http://schemas.microsoft.com/office/powerpoint/2010/main" val="1865593250"/>
       </p:ext>
     </p:extLst>
   </p:cSld>
@@ -16270,303 +17944,9 @@
           <a:chExt cx="0" cy="0"/>
         </a:xfrm>
       </p:grpSpPr>
-      <p:cxnSp>
-        <p:nvCxnSpPr>
-          <p:cNvPr id="4" name="Straight Arrow Connector 3"/>
-          <p:cNvCxnSpPr/>
-          <p:nvPr/>
-        </p:nvCxnSpPr>
-        <p:spPr>
-          <a:xfrm flipV="1">
-            <a:off x="2555776" y="3949414"/>
-            <a:ext cx="674041" cy="271674"/>
-          </a:xfrm>
-          <a:prstGeom prst="straightConnector1">
-            <a:avLst/>
-          </a:prstGeom>
-          <a:ln>
-            <a:solidFill>
-              <a:schemeClr val="tx1"/>
-            </a:solidFill>
-            <a:tailEnd type="arrow"/>
-          </a:ln>
-        </p:spPr>
-        <p:style>
-          <a:lnRef idx="1">
-            <a:schemeClr val="accent1"/>
-          </a:lnRef>
-          <a:fillRef idx="0">
-            <a:schemeClr val="accent1"/>
-          </a:fillRef>
-          <a:effectRef idx="0">
-            <a:schemeClr val="accent1"/>
-          </a:effectRef>
-          <a:fontRef idx="minor">
-            <a:schemeClr val="tx1"/>
-          </a:fontRef>
-        </p:style>
-      </p:cxnSp>
-      <p:cxnSp>
-        <p:nvCxnSpPr>
-          <p:cNvPr id="5" name="Straight Arrow Connector 4"/>
-          <p:cNvCxnSpPr/>
-          <p:nvPr/>
-        </p:nvCxnSpPr>
-        <p:spPr>
-          <a:xfrm flipH="1">
-            <a:off x="5587724" y="2036706"/>
-            <a:ext cx="563099" cy="576064"/>
-          </a:xfrm>
-          <a:prstGeom prst="straightConnector1">
-            <a:avLst/>
-          </a:prstGeom>
-          <a:ln>
-            <a:solidFill>
-              <a:schemeClr val="tx1"/>
-            </a:solidFill>
-            <a:tailEnd type="arrow"/>
-          </a:ln>
-        </p:spPr>
-        <p:style>
-          <a:lnRef idx="1">
-            <a:schemeClr val="accent1"/>
-          </a:lnRef>
-          <a:fillRef idx="0">
-            <a:schemeClr val="accent1"/>
-          </a:fillRef>
-          <a:effectRef idx="0">
-            <a:schemeClr val="accent1"/>
-          </a:effectRef>
-          <a:fontRef idx="minor">
-            <a:schemeClr val="tx1"/>
-          </a:fontRef>
-        </p:style>
-      </p:cxnSp>
-      <p:cxnSp>
-        <p:nvCxnSpPr>
-          <p:cNvPr id="6" name="Straight Arrow Connector 5"/>
-          <p:cNvCxnSpPr/>
-          <p:nvPr/>
-        </p:nvCxnSpPr>
-        <p:spPr>
-          <a:xfrm flipH="1" flipV="1">
-            <a:off x="5652120" y="3790980"/>
-            <a:ext cx="864096" cy="862156"/>
-          </a:xfrm>
-          <a:prstGeom prst="straightConnector1">
-            <a:avLst/>
-          </a:prstGeom>
-          <a:ln>
-            <a:solidFill>
-              <a:schemeClr val="tx1"/>
-            </a:solidFill>
-            <a:tailEnd type="arrow"/>
-          </a:ln>
-        </p:spPr>
-        <p:style>
-          <a:lnRef idx="1">
-            <a:schemeClr val="accent1"/>
-          </a:lnRef>
-          <a:fillRef idx="0">
-            <a:schemeClr val="accent1"/>
-          </a:fillRef>
-          <a:effectRef idx="0">
-            <a:schemeClr val="accent1"/>
-          </a:effectRef>
-          <a:fontRef idx="minor">
-            <a:schemeClr val="tx1"/>
-          </a:fontRef>
-        </p:style>
-      </p:cxnSp>
-      <p:cxnSp>
-        <p:nvCxnSpPr>
-          <p:cNvPr id="7" name="Straight Arrow Connector 6"/>
-          <p:cNvCxnSpPr/>
-          <p:nvPr/>
-        </p:nvCxnSpPr>
-        <p:spPr>
-          <a:xfrm>
-            <a:off x="2555776" y="2167681"/>
-            <a:ext cx="674041" cy="592749"/>
-          </a:xfrm>
-          <a:prstGeom prst="straightConnector1">
-            <a:avLst/>
-          </a:prstGeom>
-          <a:ln>
-            <a:solidFill>
-              <a:schemeClr val="tx1"/>
-            </a:solidFill>
-            <a:tailEnd type="arrow"/>
-          </a:ln>
-        </p:spPr>
-        <p:style>
-          <a:lnRef idx="1">
-            <a:schemeClr val="accent1"/>
-          </a:lnRef>
-          <a:fillRef idx="0">
-            <a:schemeClr val="accent1"/>
-          </a:fillRef>
-          <a:effectRef idx="0">
-            <a:schemeClr val="accent1"/>
-          </a:effectRef>
-          <a:fontRef idx="minor">
-            <a:schemeClr val="tx1"/>
-          </a:fontRef>
-        </p:style>
-      </p:cxnSp>
-      <p:pic>
-        <p:nvPicPr>
-          <p:cNvPr id="15" name="Picture 14"/>
-          <p:cNvPicPr>
-            <a:picLocks noChangeAspect="1"/>
-          </p:cNvPicPr>
-          <p:nvPr/>
-        </p:nvPicPr>
-        <p:blipFill>
-          <a:blip r:embed="rId2">
-            <a:extLst>
-              <a:ext uri="{28A0092B-C50C-407E-A947-70E740481C1C}">
-                <a14:useLocalDpi xmlns:a14="http://schemas.microsoft.com/office/drawing/2010/main" val="0"/>
-              </a:ext>
-            </a:extLst>
-          </a:blip>
-          <a:stretch>
-            <a:fillRect/>
-          </a:stretch>
-        </p:blipFill>
-        <p:spPr>
-          <a:xfrm>
-            <a:off x="3229817" y="1434560"/>
-            <a:ext cx="2357907" cy="3808398"/>
-          </a:xfrm>
-          <a:prstGeom prst="rect">
-            <a:avLst/>
-          </a:prstGeom>
-        </p:spPr>
-      </p:pic>
-      <p:pic>
-        <p:nvPicPr>
-          <p:cNvPr id="2" name="Picture 1"/>
-          <p:cNvPicPr>
-            <a:picLocks noChangeAspect="1"/>
-          </p:cNvPicPr>
-          <p:nvPr/>
-        </p:nvPicPr>
-        <p:blipFill>
-          <a:blip r:embed="rId3">
-            <a:extLst>
-              <a:ext uri="{28A0092B-C50C-407E-A947-70E740481C1C}">
-                <a14:useLocalDpi xmlns:a14="http://schemas.microsoft.com/office/drawing/2010/main" val="0"/>
-              </a:ext>
-            </a:extLst>
-          </a:blip>
-          <a:stretch>
-            <a:fillRect/>
-          </a:stretch>
-        </p:blipFill>
-        <p:spPr>
-          <a:xfrm>
-            <a:off x="6516216" y="3432611"/>
-            <a:ext cx="1864931" cy="2981721"/>
-          </a:xfrm>
-          <a:prstGeom prst="rect">
-            <a:avLst/>
-          </a:prstGeom>
-        </p:spPr>
-      </p:pic>
-      <p:pic>
-        <p:nvPicPr>
-          <p:cNvPr id="3" name="Picture 2"/>
-          <p:cNvPicPr>
-            <a:picLocks noChangeAspect="1"/>
-          </p:cNvPicPr>
-          <p:nvPr/>
-        </p:nvPicPr>
-        <p:blipFill>
-          <a:blip r:embed="rId4">
-            <a:extLst>
-              <a:ext uri="{28A0092B-C50C-407E-A947-70E740481C1C}">
-                <a14:useLocalDpi xmlns:a14="http://schemas.microsoft.com/office/drawing/2010/main" val="0"/>
-              </a:ext>
-            </a:extLst>
-          </a:blip>
-          <a:stretch>
-            <a:fillRect/>
-          </a:stretch>
-        </p:blipFill>
-        <p:spPr>
-          <a:xfrm>
-            <a:off x="654658" y="3432611"/>
-            <a:ext cx="1901118" cy="2746579"/>
-          </a:xfrm>
-          <a:prstGeom prst="rect">
-            <a:avLst/>
-          </a:prstGeom>
-        </p:spPr>
-      </p:pic>
-      <p:pic>
-        <p:nvPicPr>
-          <p:cNvPr id="8" name="Picture 7"/>
-          <p:cNvPicPr>
-            <a:picLocks noChangeAspect="1"/>
-          </p:cNvPicPr>
-          <p:nvPr/>
-        </p:nvPicPr>
-        <p:blipFill>
-          <a:blip r:embed="rId5">
-            <a:extLst>
-              <a:ext uri="{28A0092B-C50C-407E-A947-70E740481C1C}">
-                <a14:useLocalDpi xmlns:a14="http://schemas.microsoft.com/office/drawing/2010/main" val="0"/>
-              </a:ext>
-            </a:extLst>
-          </a:blip>
-          <a:stretch>
-            <a:fillRect/>
-          </a:stretch>
-        </p:blipFill>
-        <p:spPr>
-          <a:xfrm>
-            <a:off x="792690" y="405233"/>
-            <a:ext cx="1763086" cy="2840528"/>
-          </a:xfrm>
-          <a:prstGeom prst="rect">
-            <a:avLst/>
-          </a:prstGeom>
-        </p:spPr>
-      </p:pic>
-      <p:pic>
-        <p:nvPicPr>
-          <p:cNvPr id="17" name="Picture 16"/>
-          <p:cNvPicPr>
-            <a:picLocks noChangeAspect="1"/>
-          </p:cNvPicPr>
-          <p:nvPr/>
-        </p:nvPicPr>
-        <p:blipFill>
-          <a:blip r:embed="rId6">
-            <a:extLst>
-              <a:ext uri="{28A0092B-C50C-407E-A947-70E740481C1C}">
-                <a14:useLocalDpi xmlns:a14="http://schemas.microsoft.com/office/drawing/2010/main" val="0"/>
-              </a:ext>
-            </a:extLst>
-          </a:blip>
-          <a:stretch>
-            <a:fillRect/>
-          </a:stretch>
-        </p:blipFill>
-        <p:spPr>
-          <a:xfrm>
-            <a:off x="6168226" y="789959"/>
-            <a:ext cx="1631285" cy="2580483"/>
-          </a:xfrm>
-          <a:prstGeom prst="rect">
-            <a:avLst/>
-          </a:prstGeom>
-        </p:spPr>
-      </p:pic>
       <p:sp>
         <p:nvSpPr>
-          <p:cNvPr id="18" name="Title 1"/>
+          <p:cNvPr id="2" name="Title 1"/>
           <p:cNvSpPr>
             <a:spLocks noGrp="1"/>
           </p:cNvSpPr>
@@ -16576,28 +17956,68 @@
         </p:nvSpPr>
         <p:spPr>
           <a:xfrm>
-            <a:off x="2705072" y="789959"/>
-            <a:ext cx="3407396" cy="601136"/>
+            <a:off x="1043608" y="2666144"/>
+            <a:ext cx="7024744" cy="1143000"/>
           </a:xfrm>
         </p:spPr>
         <p:txBody>
-          <a:bodyPr>
-            <a:normAutofit/>
-          </a:bodyPr>
+          <a:bodyPr/>
           <a:lstStyle/>
           <a:p>
             <a:r>
-              <a:rPr lang="en-GB" sz="2800" dirty="0" smtClean="0"/>
-              <a:t>Example: Main Menu</a:t>
+              <a:rPr lang="en-GB" dirty="0" smtClean="0"/>
+              <a:t>Statement</a:t>
             </a:r>
-            <a:endParaRPr lang="en-GB" sz="2800" dirty="0"/>
+            <a:endParaRPr lang="en-GB" dirty="0"/>
           </a:p>
         </p:txBody>
       </p:sp>
+      <p:sp>
+        <p:nvSpPr>
+          <p:cNvPr id="3" name="Content Placeholder 2"/>
+          <p:cNvSpPr>
+            <a:spLocks noGrp="1"/>
+          </p:cNvSpPr>
+          <p:nvPr>
+            <p:ph idx="1"/>
+          </p:nvPr>
+        </p:nvSpPr>
+        <p:spPr/>
+        <p:txBody>
+          <a:bodyPr/>
+          <a:lstStyle/>
+          <a:p>
+            <a:endParaRPr lang="en-GB" dirty="0"/>
+          </a:p>
+        </p:txBody>
+      </p:sp>
+      <p:pic>
+        <p:nvPicPr>
+          <p:cNvPr id="5" name="Picture 4"/>
+          <p:cNvPicPr>
+            <a:picLocks noChangeAspect="1"/>
+          </p:cNvPicPr>
+          <p:nvPr/>
+        </p:nvPicPr>
+        <p:blipFill rotWithShape="1">
+          <a:blip r:embed="rId3"/>
+          <a:srcRect l="36164" t="19485" r="37271" b="6688"/>
+          <a:stretch/>
+        </p:blipFill>
+        <p:spPr>
+          <a:xfrm>
+            <a:off x="4432150" y="1027664"/>
+            <a:ext cx="3456384" cy="5400600"/>
+          </a:xfrm>
+          <a:prstGeom prst="rect">
+            <a:avLst/>
+          </a:prstGeom>
+        </p:spPr>
+      </p:pic>
     </p:spTree>
     <p:extLst>
       <p:ext uri="{BB962C8B-B14F-4D97-AF65-F5344CB8AC3E}">
-        <p14:creationId xmlns:p14="http://schemas.microsoft.com/office/powerpoint/2010/main" val="3890832401"/>
+        <p14:creationId xmlns:p14="http://schemas.microsoft.com/office/powerpoint/2010/main" val="3682407370"/>
       </p:ext>
     </p:extLst>
   </p:cSld>
@@ -16607,399 +18027,133 @@
   <p:timing>
     <p:tnLst>
       <p:par>
-        <p:cTn id="1" dur="indefinite" restart="never" nodeType="tmRoot">
-          <p:childTnLst>
-            <p:seq concurrent="1" nextAc="seek">
-              <p:cTn id="2" dur="indefinite" nodeType="mainSeq">
-                <p:childTnLst>
-                  <p:par>
-                    <p:cTn id="3" fill="hold">
-                      <p:stCondLst>
-                        <p:cond delay="indefinite"/>
-                      </p:stCondLst>
-                      <p:childTnLst>
-                        <p:par>
-                          <p:cTn id="4" fill="hold">
-                            <p:stCondLst>
-                              <p:cond delay="0"/>
-                            </p:stCondLst>
-                            <p:childTnLst>
-                              <p:par>
-                                <p:cTn id="5" presetID="10" presetClass="entr" presetSubtype="0" fill="hold" nodeType="clickEffect">
-                                  <p:stCondLst>
-                                    <p:cond delay="0"/>
-                                  </p:stCondLst>
-                                  <p:childTnLst>
-                                    <p:set>
-                                      <p:cBhvr>
-                                        <p:cTn id="6" dur="1" fill="hold">
-                                          <p:stCondLst>
-                                            <p:cond delay="0"/>
-                                          </p:stCondLst>
-                                        </p:cTn>
-                                        <p:tgtEl>
-                                          <p:spTgt spid="8"/>
-                                        </p:tgtEl>
-                                        <p:attrNameLst>
-                                          <p:attrName>style.visibility</p:attrName>
-                                        </p:attrNameLst>
-                                      </p:cBhvr>
-                                      <p:to>
-                                        <p:strVal val="visible"/>
-                                      </p:to>
-                                    </p:set>
-                                    <p:animEffect transition="in" filter="fade">
-                                      <p:cBhvr>
-                                        <p:cTn id="7" dur="1000"/>
-                                        <p:tgtEl>
-                                          <p:spTgt spid="8"/>
-                                        </p:tgtEl>
-                                      </p:cBhvr>
-                                    </p:animEffect>
-                                  </p:childTnLst>
-                                </p:cTn>
-                              </p:par>
-                              <p:par>
-                                <p:cTn id="8" presetID="10" presetClass="entr" presetSubtype="0" fill="hold" nodeType="withEffect">
-                                  <p:stCondLst>
-                                    <p:cond delay="0"/>
-                                  </p:stCondLst>
-                                  <p:childTnLst>
-                                    <p:set>
-                                      <p:cBhvr>
-                                        <p:cTn id="9" dur="1" fill="hold">
-                                          <p:stCondLst>
-                                            <p:cond delay="0"/>
-                                          </p:stCondLst>
-                                        </p:cTn>
-                                        <p:tgtEl>
-                                          <p:spTgt spid="7"/>
-                                        </p:tgtEl>
-                                        <p:attrNameLst>
-                                          <p:attrName>style.visibility</p:attrName>
-                                        </p:attrNameLst>
-                                      </p:cBhvr>
-                                      <p:to>
-                                        <p:strVal val="visible"/>
-                                      </p:to>
-                                    </p:set>
-                                    <p:animEffect transition="in" filter="fade">
-                                      <p:cBhvr>
-                                        <p:cTn id="10" dur="1000"/>
-                                        <p:tgtEl>
-                                          <p:spTgt spid="7"/>
-                                        </p:tgtEl>
-                                      </p:cBhvr>
-                                    </p:animEffect>
-                                  </p:childTnLst>
-                                </p:cTn>
-                              </p:par>
-                            </p:childTnLst>
-                          </p:cTn>
-                        </p:par>
-                        <p:par>
-                          <p:cTn id="11" fill="hold">
-                            <p:stCondLst>
-                              <p:cond delay="1000"/>
-                            </p:stCondLst>
-                            <p:childTnLst>
-                              <p:par>
-                                <p:cTn id="12" presetID="10" presetClass="entr" presetSubtype="0" fill="hold" nodeType="afterEffect">
-                                  <p:stCondLst>
-                                    <p:cond delay="0"/>
-                                  </p:stCondLst>
-                                  <p:childTnLst>
-                                    <p:set>
-                                      <p:cBhvr>
-                                        <p:cTn id="13" dur="1" fill="hold">
-                                          <p:stCondLst>
-                                            <p:cond delay="0"/>
-                                          </p:stCondLst>
-                                        </p:cTn>
-                                        <p:tgtEl>
-                                          <p:spTgt spid="3"/>
-                                        </p:tgtEl>
-                                        <p:attrNameLst>
-                                          <p:attrName>style.visibility</p:attrName>
-                                        </p:attrNameLst>
-                                      </p:cBhvr>
-                                      <p:to>
-                                        <p:strVal val="visible"/>
-                                      </p:to>
-                                    </p:set>
-                                    <p:animEffect transition="in" filter="fade">
-                                      <p:cBhvr>
-                                        <p:cTn id="14" dur="1000"/>
-                                        <p:tgtEl>
-                                          <p:spTgt spid="3"/>
-                                        </p:tgtEl>
-                                      </p:cBhvr>
-                                    </p:animEffect>
-                                  </p:childTnLst>
-                                </p:cTn>
-                              </p:par>
-                              <p:par>
-                                <p:cTn id="15" presetID="10" presetClass="entr" presetSubtype="0" fill="hold" nodeType="withEffect">
-                                  <p:stCondLst>
-                                    <p:cond delay="0"/>
-                                  </p:stCondLst>
-                                  <p:childTnLst>
-                                    <p:set>
-                                      <p:cBhvr>
-                                        <p:cTn id="16" dur="1" fill="hold">
-                                          <p:stCondLst>
-                                            <p:cond delay="0"/>
-                                          </p:stCondLst>
-                                        </p:cTn>
-                                        <p:tgtEl>
-                                          <p:spTgt spid="4"/>
-                                        </p:tgtEl>
-                                        <p:attrNameLst>
-                                          <p:attrName>style.visibility</p:attrName>
-                                        </p:attrNameLst>
-                                      </p:cBhvr>
-                                      <p:to>
-                                        <p:strVal val="visible"/>
-                                      </p:to>
-                                    </p:set>
-                                    <p:animEffect transition="in" filter="fade">
-                                      <p:cBhvr>
-                                        <p:cTn id="17" dur="1000"/>
-                                        <p:tgtEl>
-                                          <p:spTgt spid="4"/>
-                                        </p:tgtEl>
-                                      </p:cBhvr>
-                                    </p:animEffect>
-                                  </p:childTnLst>
-                                </p:cTn>
-                              </p:par>
-                            </p:childTnLst>
-                          </p:cTn>
-                        </p:par>
-                        <p:par>
-                          <p:cTn id="18" fill="hold">
-                            <p:stCondLst>
-                              <p:cond delay="2000"/>
-                            </p:stCondLst>
-                            <p:childTnLst>
-                              <p:par>
-                                <p:cTn id="19" presetID="10" presetClass="entr" presetSubtype="0" fill="hold" nodeType="afterEffect">
-                                  <p:stCondLst>
-                                    <p:cond delay="0"/>
-                                  </p:stCondLst>
-                                  <p:childTnLst>
-                                    <p:set>
-                                      <p:cBhvr>
-                                        <p:cTn id="20" dur="1" fill="hold">
-                                          <p:stCondLst>
-                                            <p:cond delay="0"/>
-                                          </p:stCondLst>
-                                        </p:cTn>
-                                        <p:tgtEl>
-                                          <p:spTgt spid="2"/>
-                                        </p:tgtEl>
-                                        <p:attrNameLst>
-                                          <p:attrName>style.visibility</p:attrName>
-                                        </p:attrNameLst>
-                                      </p:cBhvr>
-                                      <p:to>
-                                        <p:strVal val="visible"/>
-                                      </p:to>
-                                    </p:set>
-                                    <p:animEffect transition="in" filter="fade">
-                                      <p:cBhvr>
-                                        <p:cTn id="21" dur="1000"/>
-                                        <p:tgtEl>
-                                          <p:spTgt spid="2"/>
-                                        </p:tgtEl>
-                                      </p:cBhvr>
-                                    </p:animEffect>
-                                  </p:childTnLst>
-                                </p:cTn>
-                              </p:par>
-                              <p:par>
-                                <p:cTn id="22" presetID="10" presetClass="entr" presetSubtype="0" fill="hold" nodeType="withEffect">
-                                  <p:stCondLst>
-                                    <p:cond delay="0"/>
-                                  </p:stCondLst>
-                                  <p:childTnLst>
-                                    <p:set>
-                                      <p:cBhvr>
-                                        <p:cTn id="23" dur="1" fill="hold">
-                                          <p:stCondLst>
-                                            <p:cond delay="0"/>
-                                          </p:stCondLst>
-                                        </p:cTn>
-                                        <p:tgtEl>
-                                          <p:spTgt spid="6"/>
-                                        </p:tgtEl>
-                                        <p:attrNameLst>
-                                          <p:attrName>style.visibility</p:attrName>
-                                        </p:attrNameLst>
-                                      </p:cBhvr>
-                                      <p:to>
-                                        <p:strVal val="visible"/>
-                                      </p:to>
-                                    </p:set>
-                                    <p:animEffect transition="in" filter="fade">
-                                      <p:cBhvr>
-                                        <p:cTn id="24" dur="1000"/>
-                                        <p:tgtEl>
-                                          <p:spTgt spid="6"/>
-                                        </p:tgtEl>
-                                      </p:cBhvr>
-                                    </p:animEffect>
-                                  </p:childTnLst>
-                                </p:cTn>
-                              </p:par>
-                            </p:childTnLst>
-                          </p:cTn>
-                        </p:par>
-                        <p:par>
-                          <p:cTn id="25" fill="hold">
-                            <p:stCondLst>
-                              <p:cond delay="3000"/>
-                            </p:stCondLst>
-                            <p:childTnLst>
-                              <p:par>
-                                <p:cTn id="26" presetID="10" presetClass="entr" presetSubtype="0" fill="hold" nodeType="afterEffect">
-                                  <p:stCondLst>
-                                    <p:cond delay="0"/>
-                                  </p:stCondLst>
-                                  <p:childTnLst>
-                                    <p:set>
-                                      <p:cBhvr>
-                                        <p:cTn id="27" dur="1" fill="hold">
-                                          <p:stCondLst>
-                                            <p:cond delay="0"/>
-                                          </p:stCondLst>
-                                        </p:cTn>
-                                        <p:tgtEl>
-                                          <p:spTgt spid="17"/>
-                                        </p:tgtEl>
-                                        <p:attrNameLst>
-                                          <p:attrName>style.visibility</p:attrName>
-                                        </p:attrNameLst>
-                                      </p:cBhvr>
-                                      <p:to>
-                                        <p:strVal val="visible"/>
-                                      </p:to>
-                                    </p:set>
-                                    <p:animEffect transition="in" filter="fade">
-                                      <p:cBhvr>
-                                        <p:cTn id="28" dur="1000"/>
-                                        <p:tgtEl>
-                                          <p:spTgt spid="17"/>
-                                        </p:tgtEl>
-                                      </p:cBhvr>
-                                    </p:animEffect>
-                                  </p:childTnLst>
-                                </p:cTn>
-                              </p:par>
-                              <p:par>
-                                <p:cTn id="29" presetID="10" presetClass="entr" presetSubtype="0" fill="hold" nodeType="withEffect">
-                                  <p:stCondLst>
-                                    <p:cond delay="0"/>
-                                  </p:stCondLst>
-                                  <p:childTnLst>
-                                    <p:set>
-                                      <p:cBhvr>
-                                        <p:cTn id="30" dur="1" fill="hold">
-                                          <p:stCondLst>
-                                            <p:cond delay="0"/>
-                                          </p:stCondLst>
-                                        </p:cTn>
-                                        <p:tgtEl>
-                                          <p:spTgt spid="5"/>
-                                        </p:tgtEl>
-                                        <p:attrNameLst>
-                                          <p:attrName>style.visibility</p:attrName>
-                                        </p:attrNameLst>
-                                      </p:cBhvr>
-                                      <p:to>
-                                        <p:strVal val="visible"/>
-                                      </p:to>
-                                    </p:set>
-                                    <p:animEffect transition="in" filter="fade">
-                                      <p:cBhvr>
-                                        <p:cTn id="31" dur="1000"/>
-                                        <p:tgtEl>
-                                          <p:spTgt spid="5"/>
-                                        </p:tgtEl>
-                                      </p:cBhvr>
-                                    </p:animEffect>
-                                  </p:childTnLst>
-                                </p:cTn>
-                              </p:par>
-                            </p:childTnLst>
-                          </p:cTn>
-                        </p:par>
-                        <p:par>
-                          <p:cTn id="32" fill="hold">
-                            <p:stCondLst>
-                              <p:cond delay="4000"/>
-                            </p:stCondLst>
-                            <p:childTnLst>
-                              <p:par>
-                                <p:cTn id="33" presetID="10" presetClass="entr" presetSubtype="0" fill="hold" nodeType="afterEffect">
-                                  <p:stCondLst>
-                                    <p:cond delay="0"/>
-                                  </p:stCondLst>
-                                  <p:childTnLst>
-                                    <p:set>
-                                      <p:cBhvr>
-                                        <p:cTn id="34" dur="1" fill="hold">
-                                          <p:stCondLst>
-                                            <p:cond delay="0"/>
-                                          </p:stCondLst>
-                                        </p:cTn>
-                                        <p:tgtEl>
-                                          <p:spTgt spid="15"/>
-                                        </p:tgtEl>
-                                        <p:attrNameLst>
-                                          <p:attrName>style.visibility</p:attrName>
-                                        </p:attrNameLst>
-                                      </p:cBhvr>
-                                      <p:to>
-                                        <p:strVal val="visible"/>
-                                      </p:to>
-                                    </p:set>
-                                    <p:animEffect transition="in" filter="fade">
-                                      <p:cBhvr>
-                                        <p:cTn id="35" dur="1500"/>
-                                        <p:tgtEl>
-                                          <p:spTgt spid="15"/>
-                                        </p:tgtEl>
-                                      </p:cBhvr>
-                                    </p:animEffect>
-                                  </p:childTnLst>
-                                </p:cTn>
-                              </p:par>
-                            </p:childTnLst>
-                          </p:cTn>
-                        </p:par>
-                      </p:childTnLst>
-                    </p:cTn>
-                  </p:par>
-                </p:childTnLst>
-              </p:cTn>
-              <p:prevCondLst>
-                <p:cond evt="onPrev" delay="0">
-                  <p:tgtEl>
-                    <p:sldTgt/>
-                  </p:tgtEl>
-                </p:cond>
-              </p:prevCondLst>
-              <p:nextCondLst>
-                <p:cond evt="onNext" delay="0">
-                  <p:tgtEl>
-                    <p:sldTgt/>
-                  </p:tgtEl>
-                </p:cond>
-              </p:nextCondLst>
-            </p:seq>
-          </p:childTnLst>
-        </p:cTn>
+        <p:cTn id="1" dur="indefinite" restart="never" nodeType="tmRoot"/>
+      </p:par>
+    </p:tnLst>
+  </p:timing>
+</p:sld>
+</file>
+
+<file path=ppt/slides/slide9.xml><?xml version="1.0" encoding="utf-8"?>
+<p:sld xmlns:a="http://schemas.openxmlformats.org/drawingml/2006/main" xmlns:r="http://schemas.openxmlformats.org/officeDocument/2006/relationships" xmlns:p="http://schemas.openxmlformats.org/presentationml/2006/main">
+  <p:cSld>
+    <p:spTree>
+      <p:nvGrpSpPr>
+        <p:cNvPr id="1" name=""/>
+        <p:cNvGrpSpPr/>
+        <p:nvPr/>
+      </p:nvGrpSpPr>
+      <p:grpSpPr>
+        <a:xfrm>
+          <a:off x="0" y="0"/>
+          <a:ext cx="0" cy="0"/>
+          <a:chOff x="0" y="0"/>
+          <a:chExt cx="0" cy="0"/>
+        </a:xfrm>
+      </p:grpSpPr>
+      <p:sp>
+        <p:nvSpPr>
+          <p:cNvPr id="2" name="Title 1"/>
+          <p:cNvSpPr>
+            <a:spLocks noGrp="1"/>
+          </p:cNvSpPr>
+          <p:nvPr>
+            <p:ph type="title"/>
+          </p:nvPr>
+        </p:nvSpPr>
+        <p:spPr>
+          <a:xfrm>
+            <a:off x="1043490" y="2323652"/>
+            <a:ext cx="7024744" cy="1143000"/>
+          </a:xfrm>
+        </p:spPr>
+        <p:txBody>
+          <a:bodyPr>
+            <a:normAutofit fontScale="90000"/>
+          </a:bodyPr>
+          <a:lstStyle/>
+          <a:p>
+            <a:r>
+              <a:rPr lang="en-GB" dirty="0" smtClean="0"/>
+              <a:t>Achievements</a:t>
+            </a:r>
+            <a:br>
+              <a:rPr lang="en-GB" dirty="0" smtClean="0"/>
+            </a:br>
+            <a:r>
+              <a:rPr lang="en-GB" dirty="0" smtClean="0"/>
+              <a:t>&amp; Rewards</a:t>
+            </a:r>
+            <a:endParaRPr lang="en-GB" dirty="0"/>
+          </a:p>
+        </p:txBody>
+      </p:sp>
+      <p:pic>
+        <p:nvPicPr>
+          <p:cNvPr id="1026" name="Picture 2"/>
+          <p:cNvPicPr>
+            <a:picLocks noChangeAspect="1" noChangeArrowheads="1"/>
+          </p:cNvPicPr>
+          <p:nvPr/>
+        </p:nvPicPr>
+        <p:blipFill rotWithShape="1">
+          <a:blip r:embed="rId3">
+            <a:extLst>
+              <a:ext uri="{28A0092B-C50C-407E-A947-70E740481C1C}">
+                <a14:useLocalDpi xmlns:a14="http://schemas.microsoft.com/office/drawing/2010/main" val="0"/>
+              </a:ext>
+            </a:extLst>
+          </a:blip>
+          <a:srcRect l="25432" t="19925" r="49136" b="8584"/>
+          <a:stretch/>
+        </p:blipFill>
+        <p:spPr bwMode="auto">
+          <a:xfrm>
+            <a:off x="4644008" y="908720"/>
+            <a:ext cx="3308993" cy="5229726"/>
+          </a:xfrm>
+          <a:prstGeom prst="rect">
+            <a:avLst/>
+          </a:prstGeom>
+          <a:noFill/>
+          <a:ln>
+            <a:noFill/>
+          </a:ln>
+          <a:extLst>
+            <a:ext uri="{909E8E84-426E-40DD-AFC4-6F175D3DCCD1}">
+              <a14:hiddenFill xmlns:a14="http://schemas.microsoft.com/office/drawing/2010/main">
+                <a:solidFill>
+                  <a:schemeClr val="accent1"/>
+                </a:solidFill>
+              </a14:hiddenFill>
+            </a:ext>
+            <a:ext uri="{91240B29-F687-4F45-9708-019B960494DF}">
+              <a14:hiddenLine xmlns:a14="http://schemas.microsoft.com/office/drawing/2010/main" w="9525">
+                <a:solidFill>
+                  <a:schemeClr val="tx1"/>
+                </a:solidFill>
+                <a:miter lim="800000"/>
+                <a:headEnd/>
+                <a:tailEnd/>
+              </a14:hiddenLine>
+            </a:ext>
+          </a:extLst>
+        </p:spPr>
+      </p:pic>
+    </p:spTree>
+    <p:extLst>
+      <p:ext uri="{BB962C8B-B14F-4D97-AF65-F5344CB8AC3E}">
+        <p14:creationId xmlns:p14="http://schemas.microsoft.com/office/powerpoint/2010/main" val="451344986"/>
+      </p:ext>
+    </p:extLst>
+  </p:cSld>
+  <p:clrMapOvr>
+    <a:masterClrMapping/>
+  </p:clrMapOvr>
+  <p:timing>
+    <p:tnLst>
+      <p:par>
+        <p:cTn id="1" dur="indefinite" restart="never" nodeType="tmRoot"/>
       </p:par>
     </p:tnLst>
   </p:timing>

</xml_diff>

<commit_message>
Presentation with changes after the team meeting
</commit_message>
<xml_diff>
--- a/Powerpoint for Dragons Den/Dragons Den Presentation.pptx
+++ b/Powerpoint for Dragons Den/Dragons Den Presentation.pptx
@@ -5,17 +5,24 @@
     <p:sldMasterId id="2147483660" r:id="rId1"/>
   </p:sldMasterIdLst>
   <p:notesMasterIdLst>
-    <p:notesMasterId r:id="rId10"/>
+    <p:notesMasterId r:id="rId17"/>
   </p:notesMasterIdLst>
   <p:sldIdLst>
     <p:sldId id="256" r:id="rId2"/>
-    <p:sldId id="260" r:id="rId3"/>
+    <p:sldId id="274" r:id="rId3"/>
     <p:sldId id="259" r:id="rId4"/>
-    <p:sldId id="257" r:id="rId5"/>
-    <p:sldId id="258" r:id="rId6"/>
+    <p:sldId id="265" r:id="rId5"/>
+    <p:sldId id="264" r:id="rId6"/>
     <p:sldId id="261" r:id="rId7"/>
-    <p:sldId id="262" r:id="rId8"/>
-    <p:sldId id="263" r:id="rId9"/>
+    <p:sldId id="276" r:id="rId8"/>
+    <p:sldId id="268" r:id="rId9"/>
+    <p:sldId id="269" r:id="rId10"/>
+    <p:sldId id="273" r:id="rId11"/>
+    <p:sldId id="272" r:id="rId12"/>
+    <p:sldId id="270" r:id="rId13"/>
+    <p:sldId id="271" r:id="rId14"/>
+    <p:sldId id="267" r:id="rId15"/>
+    <p:sldId id="275" r:id="rId16"/>
   </p:sldIdLst>
   <p:sldSz cx="9144000" cy="6858000" type="screen4x3"/>
   <p:notesSz cx="6858000" cy="9144000"/>
@@ -114,6 +121,22 @@
       </a:defRPr>
     </a:lvl9pPr>
   </p:defaultTextStyle>
+  <p:extLst>
+    <p:ext uri="{EFAFB233-063F-42B5-8137-9DF3F51BA10A}">
+      <p15:sldGuideLst xmlns:p15="http://schemas.microsoft.com/office/powerpoint/2012/main">
+        <p15:guide id="1" orient="horz" pos="2160">
+          <p15:clr>
+            <a:srgbClr val="A4A3A4"/>
+          </p15:clr>
+        </p15:guide>
+        <p15:guide id="2" pos="2880">
+          <p15:clr>
+            <a:srgbClr val="A4A3A4"/>
+          </p15:clr>
+        </p15:guide>
+      </p15:sldGuideLst>
+    </p:ext>
+  </p:extLst>
 </p:presentation>
 </file>
 
@@ -199,7 +222,8 @@
           <a:p>
             <a:fld id="{E60F5323-8565-4D5C-8D97-A0D85F0F25EA}" type="datetimeFigureOut">
               <a:rPr lang="en-GB" smtClean="0"/>
-              <a:t>20/11/2014</a:t>
+              <a:pPr/>
+              <a:t>24/11/2014</a:t>
             </a:fld>
             <a:endParaRPr lang="en-GB"/>
           </a:p>
@@ -358,6 +382,7 @@
           <a:p>
             <a:fld id="{54261E1A-D829-4B13-8E47-3FA50A360041}" type="slidenum">
               <a:rPr lang="en-GB" smtClean="0"/>
+              <a:pPr/>
               <a:t>‹#›</a:t>
             </a:fld>
             <a:endParaRPr lang="en-GB"/>
@@ -508,7 +533,9 @@
         </p:nvSpPr>
         <p:spPr/>
         <p:txBody>
-          <a:bodyPr/>
+          <a:bodyPr>
+            <a:normAutofit/>
+          </a:bodyPr>
           <a:lstStyle/>
           <a:p>
             <a:r>
@@ -525,9 +552,8 @@
             </a:r>
             <a:r>
               <a:rPr lang="en-GB" baseline="0" dirty="0" smtClean="0"/>
-              <a:t> straight away, and possibly say something like “I’m Matt and this is &lt;Other speaker&gt;, and this is the rest of the development team”</a:t>
+              <a:t> straight away, and introduce everyone from the team. This will give Lloyds a better impression of our team as a whole </a:t>
             </a:r>
-            <a:endParaRPr lang="en-GB" dirty="0"/>
           </a:p>
         </p:txBody>
       </p:sp>
@@ -548,7 +574,8 @@
           <a:p>
             <a:fld id="{54261E1A-D829-4B13-8E47-3FA50A360041}" type="slidenum">
               <a:rPr lang="en-GB" smtClean="0"/>
-              <a:t>2</a:t>
+              <a:pPr/>
+              <a:t>1</a:t>
             </a:fld>
             <a:endParaRPr lang="en-GB"/>
           </a:p>
@@ -557,7 +584,585 @@
     </p:spTree>
     <p:extLst>
       <p:ext uri="{BB962C8B-B14F-4D97-AF65-F5344CB8AC3E}">
-        <p14:creationId xmlns:p14="http://schemas.microsoft.com/office/powerpoint/2010/main" val="3559104527"/>
+        <p14:creationId xmlns:p14="http://schemas.microsoft.com/office/powerpoint/2010/main" val="3447559528"/>
+      </p:ext>
+    </p:extLst>
+  </p:cSld>
+  <p:clrMapOvr>
+    <a:masterClrMapping/>
+  </p:clrMapOvr>
+</p:notes>
+</file>
+
+<file path=ppt/notesSlides/notesSlide10.xml><?xml version="1.0" encoding="utf-8"?>
+<p:notes xmlns:a="http://schemas.openxmlformats.org/drawingml/2006/main" xmlns:r="http://schemas.openxmlformats.org/officeDocument/2006/relationships" xmlns:p="http://schemas.openxmlformats.org/presentationml/2006/main">
+  <p:cSld>
+    <p:spTree>
+      <p:nvGrpSpPr>
+        <p:cNvPr id="1" name=""/>
+        <p:cNvGrpSpPr/>
+        <p:nvPr/>
+      </p:nvGrpSpPr>
+      <p:grpSpPr>
+        <a:xfrm>
+          <a:off x="0" y="0"/>
+          <a:ext cx="0" cy="0"/>
+          <a:chOff x="0" y="0"/>
+          <a:chExt cx="0" cy="0"/>
+        </a:xfrm>
+      </p:grpSpPr>
+      <p:sp>
+        <p:nvSpPr>
+          <p:cNvPr id="2" name="Slide Image Placeholder 1"/>
+          <p:cNvSpPr>
+            <a:spLocks noGrp="1" noRot="1" noChangeAspect="1"/>
+          </p:cNvSpPr>
+          <p:nvPr>
+            <p:ph type="sldImg"/>
+          </p:nvPr>
+        </p:nvSpPr>
+        <p:spPr/>
+      </p:sp>
+      <p:sp>
+        <p:nvSpPr>
+          <p:cNvPr id="3" name="Notes Placeholder 2"/>
+          <p:cNvSpPr>
+            <a:spLocks noGrp="1"/>
+          </p:cNvSpPr>
+          <p:nvPr>
+            <p:ph type="body" idx="1"/>
+          </p:nvPr>
+        </p:nvSpPr>
+        <p:spPr/>
+        <p:txBody>
+          <a:bodyPr/>
+          <a:lstStyle/>
+          <a:p>
+            <a:r>
+              <a:rPr lang="en-GB" dirty="0" smtClean="0"/>
+              <a:t>Achievements – Use</a:t>
+            </a:r>
+            <a:r>
+              <a:rPr lang="en-GB" baseline="0" dirty="0" smtClean="0"/>
+              <a:t> gamification ideas to give users points based on what is considered “good banking” behaviour. Once a user gains enough points they can redeem a reward. The challenge of trying to gain points gives the user a sense of satisfaction/achievement. Rewards will be tailored to the users spending habits from the previously shown statement screen.</a:t>
+            </a:r>
+            <a:endParaRPr lang="en-GB" dirty="0"/>
+          </a:p>
+        </p:txBody>
+      </p:sp>
+      <p:sp>
+        <p:nvSpPr>
+          <p:cNvPr id="4" name="Slide Number Placeholder 3"/>
+          <p:cNvSpPr>
+            <a:spLocks noGrp="1"/>
+          </p:cNvSpPr>
+          <p:nvPr>
+            <p:ph type="sldNum" sz="quarter" idx="10"/>
+          </p:nvPr>
+        </p:nvSpPr>
+        <p:spPr/>
+        <p:txBody>
+          <a:bodyPr/>
+          <a:lstStyle/>
+          <a:p>
+            <a:fld id="{54261E1A-D829-4B13-8E47-3FA50A360041}" type="slidenum">
+              <a:rPr lang="en-GB" smtClean="0"/>
+              <a:pPr/>
+              <a:t>10</a:t>
+            </a:fld>
+            <a:endParaRPr lang="en-GB"/>
+          </a:p>
+        </p:txBody>
+      </p:sp>
+    </p:spTree>
+    <p:extLst>
+      <p:ext uri="{BB962C8B-B14F-4D97-AF65-F5344CB8AC3E}">
+        <p14:creationId xmlns:p14="http://schemas.microsoft.com/office/powerpoint/2010/main" val="1778416581"/>
+      </p:ext>
+    </p:extLst>
+  </p:cSld>
+  <p:clrMapOvr>
+    <a:masterClrMapping/>
+  </p:clrMapOvr>
+</p:notes>
+</file>
+
+<file path=ppt/notesSlides/notesSlide11.xml><?xml version="1.0" encoding="utf-8"?>
+<p:notes xmlns:a="http://schemas.openxmlformats.org/drawingml/2006/main" xmlns:r="http://schemas.openxmlformats.org/officeDocument/2006/relationships" xmlns:p="http://schemas.openxmlformats.org/presentationml/2006/main">
+  <p:cSld>
+    <p:spTree>
+      <p:nvGrpSpPr>
+        <p:cNvPr id="1" name=""/>
+        <p:cNvGrpSpPr/>
+        <p:nvPr/>
+      </p:nvGrpSpPr>
+      <p:grpSpPr>
+        <a:xfrm>
+          <a:off x="0" y="0"/>
+          <a:ext cx="0" cy="0"/>
+          <a:chOff x="0" y="0"/>
+          <a:chExt cx="0" cy="0"/>
+        </a:xfrm>
+      </p:grpSpPr>
+      <p:sp>
+        <p:nvSpPr>
+          <p:cNvPr id="2" name="Slide Image Placeholder 1"/>
+          <p:cNvSpPr>
+            <a:spLocks noGrp="1" noRot="1" noChangeAspect="1"/>
+          </p:cNvSpPr>
+          <p:nvPr>
+            <p:ph type="sldImg"/>
+          </p:nvPr>
+        </p:nvSpPr>
+        <p:spPr/>
+      </p:sp>
+      <p:sp>
+        <p:nvSpPr>
+          <p:cNvPr id="3" name="Notes Placeholder 2"/>
+          <p:cNvSpPr>
+            <a:spLocks noGrp="1"/>
+          </p:cNvSpPr>
+          <p:nvPr>
+            <p:ph type="body" idx="1"/>
+          </p:nvPr>
+        </p:nvSpPr>
+        <p:spPr/>
+        <p:txBody>
+          <a:bodyPr/>
+          <a:lstStyle/>
+          <a:p>
+            <a:r>
+              <a:rPr lang="en-GB" dirty="0" smtClean="0"/>
+              <a:t>Shows</a:t>
+            </a:r>
+            <a:r>
+              <a:rPr lang="en-GB" baseline="0" dirty="0" smtClean="0"/>
+              <a:t> </a:t>
+            </a:r>
+            <a:r>
+              <a:rPr lang="en-GB" baseline="0" dirty="0" err="1" smtClean="0"/>
+              <a:t>lloyds</a:t>
+            </a:r>
+            <a:r>
+              <a:rPr lang="en-GB" baseline="0" dirty="0" smtClean="0"/>
+              <a:t> </a:t>
+            </a:r>
+            <a:r>
+              <a:rPr lang="en-GB" baseline="0" dirty="0" err="1" smtClean="0"/>
+              <a:t>latests</a:t>
+            </a:r>
+            <a:r>
+              <a:rPr lang="en-GB" baseline="0" dirty="0" smtClean="0"/>
+              <a:t> student accounts and deals. </a:t>
+            </a:r>
+            <a:endParaRPr lang="en-GB" dirty="0"/>
+          </a:p>
+        </p:txBody>
+      </p:sp>
+      <p:sp>
+        <p:nvSpPr>
+          <p:cNvPr id="4" name="Slide Number Placeholder 3"/>
+          <p:cNvSpPr>
+            <a:spLocks noGrp="1"/>
+          </p:cNvSpPr>
+          <p:nvPr>
+            <p:ph type="sldNum" sz="quarter" idx="10"/>
+          </p:nvPr>
+        </p:nvSpPr>
+        <p:spPr/>
+        <p:txBody>
+          <a:bodyPr/>
+          <a:lstStyle/>
+          <a:p>
+            <a:fld id="{54261E1A-D829-4B13-8E47-3FA50A360041}" type="slidenum">
+              <a:rPr lang="en-GB" smtClean="0"/>
+              <a:pPr/>
+              <a:t>11</a:t>
+            </a:fld>
+            <a:endParaRPr lang="en-GB"/>
+          </a:p>
+        </p:txBody>
+      </p:sp>
+    </p:spTree>
+    <p:extLst>
+      <p:ext uri="{BB962C8B-B14F-4D97-AF65-F5344CB8AC3E}">
+        <p14:creationId xmlns:p14="http://schemas.microsoft.com/office/powerpoint/2010/main" val="3573345242"/>
+      </p:ext>
+    </p:extLst>
+  </p:cSld>
+  <p:clrMapOvr>
+    <a:masterClrMapping/>
+  </p:clrMapOvr>
+</p:notes>
+</file>
+
+<file path=ppt/notesSlides/notesSlide12.xml><?xml version="1.0" encoding="utf-8"?>
+<p:notes xmlns:a="http://schemas.openxmlformats.org/drawingml/2006/main" xmlns:r="http://schemas.openxmlformats.org/officeDocument/2006/relationships" xmlns:p="http://schemas.openxmlformats.org/presentationml/2006/main">
+  <p:cSld>
+    <p:spTree>
+      <p:nvGrpSpPr>
+        <p:cNvPr id="1" name=""/>
+        <p:cNvGrpSpPr/>
+        <p:nvPr/>
+      </p:nvGrpSpPr>
+      <p:grpSpPr>
+        <a:xfrm>
+          <a:off x="0" y="0"/>
+          <a:ext cx="0" cy="0"/>
+          <a:chOff x="0" y="0"/>
+          <a:chExt cx="0" cy="0"/>
+        </a:xfrm>
+      </p:grpSpPr>
+      <p:sp>
+        <p:nvSpPr>
+          <p:cNvPr id="2" name="Slide Image Placeholder 1"/>
+          <p:cNvSpPr>
+            <a:spLocks noGrp="1" noRot="1" noChangeAspect="1"/>
+          </p:cNvSpPr>
+          <p:nvPr>
+            <p:ph type="sldImg"/>
+          </p:nvPr>
+        </p:nvSpPr>
+        <p:spPr/>
+      </p:sp>
+      <p:sp>
+        <p:nvSpPr>
+          <p:cNvPr id="3" name="Notes Placeholder 2"/>
+          <p:cNvSpPr>
+            <a:spLocks noGrp="1"/>
+          </p:cNvSpPr>
+          <p:nvPr>
+            <p:ph type="body" idx="1"/>
+          </p:nvPr>
+        </p:nvSpPr>
+        <p:spPr/>
+        <p:txBody>
+          <a:bodyPr/>
+          <a:lstStyle/>
+          <a:p>
+            <a:r>
+              <a:rPr lang="en-GB" dirty="0" smtClean="0"/>
+              <a:t>Allows user to transfer</a:t>
+            </a:r>
+            <a:r>
+              <a:rPr lang="en-GB" baseline="0" dirty="0" smtClean="0"/>
+              <a:t> among personal accounts but also to an external account. </a:t>
+            </a:r>
+            <a:endParaRPr lang="en-GB" dirty="0"/>
+          </a:p>
+        </p:txBody>
+      </p:sp>
+      <p:sp>
+        <p:nvSpPr>
+          <p:cNvPr id="4" name="Slide Number Placeholder 3"/>
+          <p:cNvSpPr>
+            <a:spLocks noGrp="1"/>
+          </p:cNvSpPr>
+          <p:nvPr>
+            <p:ph type="sldNum" sz="quarter" idx="10"/>
+          </p:nvPr>
+        </p:nvSpPr>
+        <p:spPr/>
+        <p:txBody>
+          <a:bodyPr/>
+          <a:lstStyle/>
+          <a:p>
+            <a:fld id="{54261E1A-D829-4B13-8E47-3FA50A360041}" type="slidenum">
+              <a:rPr lang="en-GB" smtClean="0"/>
+              <a:pPr/>
+              <a:t>12</a:t>
+            </a:fld>
+            <a:endParaRPr lang="en-GB"/>
+          </a:p>
+        </p:txBody>
+      </p:sp>
+    </p:spTree>
+    <p:extLst>
+      <p:ext uri="{BB962C8B-B14F-4D97-AF65-F5344CB8AC3E}">
+        <p14:creationId xmlns:p14="http://schemas.microsoft.com/office/powerpoint/2010/main" val="3029729858"/>
+      </p:ext>
+    </p:extLst>
+  </p:cSld>
+  <p:clrMapOvr>
+    <a:masterClrMapping/>
+  </p:clrMapOvr>
+</p:notes>
+</file>
+
+<file path=ppt/notesSlides/notesSlide13.xml><?xml version="1.0" encoding="utf-8"?>
+<p:notes xmlns:a="http://schemas.openxmlformats.org/drawingml/2006/main" xmlns:r="http://schemas.openxmlformats.org/officeDocument/2006/relationships" xmlns:p="http://schemas.openxmlformats.org/presentationml/2006/main">
+  <p:cSld>
+    <p:spTree>
+      <p:nvGrpSpPr>
+        <p:cNvPr id="1" name=""/>
+        <p:cNvGrpSpPr/>
+        <p:nvPr/>
+      </p:nvGrpSpPr>
+      <p:grpSpPr>
+        <a:xfrm>
+          <a:off x="0" y="0"/>
+          <a:ext cx="0" cy="0"/>
+          <a:chOff x="0" y="0"/>
+          <a:chExt cx="0" cy="0"/>
+        </a:xfrm>
+      </p:grpSpPr>
+      <p:sp>
+        <p:nvSpPr>
+          <p:cNvPr id="2" name="Slide Image Placeholder 1"/>
+          <p:cNvSpPr>
+            <a:spLocks noGrp="1" noRot="1" noChangeAspect="1"/>
+          </p:cNvSpPr>
+          <p:nvPr>
+            <p:ph type="sldImg"/>
+          </p:nvPr>
+        </p:nvSpPr>
+        <p:spPr/>
+      </p:sp>
+      <p:sp>
+        <p:nvSpPr>
+          <p:cNvPr id="3" name="Notes Placeholder 2"/>
+          <p:cNvSpPr>
+            <a:spLocks noGrp="1"/>
+          </p:cNvSpPr>
+          <p:nvPr>
+            <p:ph type="body" idx="1"/>
+          </p:nvPr>
+        </p:nvSpPr>
+        <p:spPr/>
+        <p:txBody>
+          <a:bodyPr/>
+          <a:lstStyle/>
+          <a:p>
+            <a:r>
+              <a:rPr lang="en-GB" dirty="0" smtClean="0"/>
+              <a:t>Allows the user to find</a:t>
+            </a:r>
+            <a:r>
+              <a:rPr lang="en-GB" baseline="0" dirty="0" smtClean="0"/>
+              <a:t> a near by branch. </a:t>
+            </a:r>
+            <a:endParaRPr lang="en-GB" dirty="0"/>
+          </a:p>
+        </p:txBody>
+      </p:sp>
+      <p:sp>
+        <p:nvSpPr>
+          <p:cNvPr id="4" name="Slide Number Placeholder 3"/>
+          <p:cNvSpPr>
+            <a:spLocks noGrp="1"/>
+          </p:cNvSpPr>
+          <p:nvPr>
+            <p:ph type="sldNum" sz="quarter" idx="10"/>
+          </p:nvPr>
+        </p:nvSpPr>
+        <p:spPr/>
+        <p:txBody>
+          <a:bodyPr/>
+          <a:lstStyle/>
+          <a:p>
+            <a:fld id="{54261E1A-D829-4B13-8E47-3FA50A360041}" type="slidenum">
+              <a:rPr lang="en-GB" smtClean="0"/>
+              <a:pPr/>
+              <a:t>13</a:t>
+            </a:fld>
+            <a:endParaRPr lang="en-GB"/>
+          </a:p>
+        </p:txBody>
+      </p:sp>
+    </p:spTree>
+    <p:extLst>
+      <p:ext uri="{BB962C8B-B14F-4D97-AF65-F5344CB8AC3E}">
+        <p14:creationId xmlns:p14="http://schemas.microsoft.com/office/powerpoint/2010/main" val="3340555995"/>
+      </p:ext>
+    </p:extLst>
+  </p:cSld>
+  <p:clrMapOvr>
+    <a:masterClrMapping/>
+  </p:clrMapOvr>
+</p:notes>
+</file>
+
+<file path=ppt/notesSlides/notesSlide14.xml><?xml version="1.0" encoding="utf-8"?>
+<p:notes xmlns:a="http://schemas.openxmlformats.org/drawingml/2006/main" xmlns:r="http://schemas.openxmlformats.org/officeDocument/2006/relationships" xmlns:p="http://schemas.openxmlformats.org/presentationml/2006/main">
+  <p:cSld>
+    <p:spTree>
+      <p:nvGrpSpPr>
+        <p:cNvPr id="1" name=""/>
+        <p:cNvGrpSpPr/>
+        <p:nvPr/>
+      </p:nvGrpSpPr>
+      <p:grpSpPr>
+        <a:xfrm>
+          <a:off x="0" y="0"/>
+          <a:ext cx="0" cy="0"/>
+          <a:chOff x="0" y="0"/>
+          <a:chExt cx="0" cy="0"/>
+        </a:xfrm>
+      </p:grpSpPr>
+      <p:sp>
+        <p:nvSpPr>
+          <p:cNvPr id="2" name="Slide Image Placeholder 1"/>
+          <p:cNvSpPr>
+            <a:spLocks noGrp="1" noRot="1" noChangeAspect="1"/>
+          </p:cNvSpPr>
+          <p:nvPr>
+            <p:ph type="sldImg"/>
+          </p:nvPr>
+        </p:nvSpPr>
+        <p:spPr/>
+      </p:sp>
+      <p:sp>
+        <p:nvSpPr>
+          <p:cNvPr id="3" name="Notes Placeholder 2"/>
+          <p:cNvSpPr>
+            <a:spLocks noGrp="1"/>
+          </p:cNvSpPr>
+          <p:nvPr>
+            <p:ph type="body" idx="1"/>
+          </p:nvPr>
+        </p:nvSpPr>
+        <p:spPr/>
+        <p:txBody>
+          <a:bodyPr/>
+          <a:lstStyle/>
+          <a:p>
+            <a:r>
+              <a:rPr lang="en-GB" dirty="0" smtClean="0"/>
+              <a:t>Allows</a:t>
+            </a:r>
+            <a:r>
+              <a:rPr lang="en-GB" baseline="0" dirty="0" smtClean="0"/>
+              <a:t> the user to put in their student loan, then calculates their average spend per day, week and month and uses that to predict future balances and when they with go into their overdraft.</a:t>
+            </a:r>
+            <a:endParaRPr lang="en-GB" dirty="0"/>
+          </a:p>
+        </p:txBody>
+      </p:sp>
+      <p:sp>
+        <p:nvSpPr>
+          <p:cNvPr id="4" name="Slide Number Placeholder 3"/>
+          <p:cNvSpPr>
+            <a:spLocks noGrp="1"/>
+          </p:cNvSpPr>
+          <p:nvPr>
+            <p:ph type="sldNum" sz="quarter" idx="10"/>
+          </p:nvPr>
+        </p:nvSpPr>
+        <p:spPr/>
+        <p:txBody>
+          <a:bodyPr/>
+          <a:lstStyle/>
+          <a:p>
+            <a:fld id="{54261E1A-D829-4B13-8E47-3FA50A360041}" type="slidenum">
+              <a:rPr lang="en-GB" smtClean="0"/>
+              <a:pPr/>
+              <a:t>14</a:t>
+            </a:fld>
+            <a:endParaRPr lang="en-GB"/>
+          </a:p>
+        </p:txBody>
+      </p:sp>
+    </p:spTree>
+    <p:extLst>
+      <p:ext uri="{BB962C8B-B14F-4D97-AF65-F5344CB8AC3E}">
+        <p14:creationId xmlns:p14="http://schemas.microsoft.com/office/powerpoint/2010/main" val="2673764264"/>
+      </p:ext>
+    </p:extLst>
+  </p:cSld>
+  <p:clrMapOvr>
+    <a:masterClrMapping/>
+  </p:clrMapOvr>
+</p:notes>
+</file>
+
+<file path=ppt/notesSlides/notesSlide15.xml><?xml version="1.0" encoding="utf-8"?>
+<p:notes xmlns:a="http://schemas.openxmlformats.org/drawingml/2006/main" xmlns:r="http://schemas.openxmlformats.org/officeDocument/2006/relationships" xmlns:p="http://schemas.openxmlformats.org/presentationml/2006/main">
+  <p:cSld>
+    <p:spTree>
+      <p:nvGrpSpPr>
+        <p:cNvPr id="1" name=""/>
+        <p:cNvGrpSpPr/>
+        <p:nvPr/>
+      </p:nvGrpSpPr>
+      <p:grpSpPr>
+        <a:xfrm>
+          <a:off x="0" y="0"/>
+          <a:ext cx="0" cy="0"/>
+          <a:chOff x="0" y="0"/>
+          <a:chExt cx="0" cy="0"/>
+        </a:xfrm>
+      </p:grpSpPr>
+      <p:sp>
+        <p:nvSpPr>
+          <p:cNvPr id="2" name="Slide Image Placeholder 1"/>
+          <p:cNvSpPr>
+            <a:spLocks noGrp="1" noRot="1" noChangeAspect="1"/>
+          </p:cNvSpPr>
+          <p:nvPr>
+            <p:ph type="sldImg"/>
+          </p:nvPr>
+        </p:nvSpPr>
+        <p:spPr/>
+      </p:sp>
+      <p:sp>
+        <p:nvSpPr>
+          <p:cNvPr id="3" name="Notes Placeholder 2"/>
+          <p:cNvSpPr>
+            <a:spLocks noGrp="1"/>
+          </p:cNvSpPr>
+          <p:nvPr>
+            <p:ph type="body" idx="1"/>
+          </p:nvPr>
+        </p:nvSpPr>
+        <p:spPr/>
+        <p:txBody>
+          <a:bodyPr/>
+          <a:lstStyle/>
+          <a:p>
+            <a:r>
+              <a:rPr lang="en-GB" dirty="0" smtClean="0"/>
+              <a:t>Allows the user to link their phone to social</a:t>
+            </a:r>
+            <a:r>
+              <a:rPr lang="en-GB" baseline="0" dirty="0" smtClean="0"/>
+              <a:t> media and </a:t>
+            </a:r>
+            <a:r>
+              <a:rPr lang="en-GB" baseline="0" smtClean="0"/>
+              <a:t>set notifications on/off.</a:t>
+            </a:r>
+            <a:endParaRPr lang="en-GB"/>
+          </a:p>
+        </p:txBody>
+      </p:sp>
+      <p:sp>
+        <p:nvSpPr>
+          <p:cNvPr id="4" name="Slide Number Placeholder 3"/>
+          <p:cNvSpPr>
+            <a:spLocks noGrp="1"/>
+          </p:cNvSpPr>
+          <p:nvPr>
+            <p:ph type="sldNum" sz="quarter" idx="10"/>
+          </p:nvPr>
+        </p:nvSpPr>
+        <p:spPr/>
+        <p:txBody>
+          <a:bodyPr/>
+          <a:lstStyle/>
+          <a:p>
+            <a:fld id="{54261E1A-D829-4B13-8E47-3FA50A360041}" type="slidenum">
+              <a:rPr lang="en-GB" smtClean="0"/>
+              <a:pPr/>
+              <a:t>15</a:t>
+            </a:fld>
+            <a:endParaRPr lang="en-GB"/>
+          </a:p>
+        </p:txBody>
+      </p:sp>
+    </p:spTree>
+    <p:extLst>
+      <p:ext uri="{BB962C8B-B14F-4D97-AF65-F5344CB8AC3E}">
+        <p14:creationId xmlns:p14="http://schemas.microsoft.com/office/powerpoint/2010/main" val="814208957"/>
       </p:ext>
     </p:extLst>
   </p:cSld>
@@ -613,19 +1218,19 @@
           <a:p>
             <a:r>
               <a:rPr lang="en-GB" dirty="0" smtClean="0"/>
-              <a:t>Say app, &lt;click&gt;, why</a:t>
+              <a:t>Say</a:t>
             </a:r>
             <a:r>
               <a:rPr lang="en-GB" baseline="0" dirty="0" smtClean="0"/>
-              <a:t> not both I hear you cry?,  </a:t>
+              <a:t> hello to relax </a:t>
             </a:r>
             <a:r>
-              <a:rPr lang="en-GB" dirty="0" smtClean="0"/>
-              <a:t>Briefly</a:t>
+              <a:rPr lang="en-GB" baseline="0" dirty="0" err="1" smtClean="0"/>
+              <a:t>lloyds</a:t>
             </a:r>
             <a:r>
               <a:rPr lang="en-GB" baseline="0" dirty="0" smtClean="0"/>
-              <a:t> explain we picked to focus on making one GREAT thing rather than two OKAY things and that we went for app over web because it played to our strengths. </a:t>
+              <a:t> straight away, and possibly say something like “I’m Matt and this is &lt;Other speaker&gt;, and this is the rest of the development team”</a:t>
             </a:r>
             <a:endParaRPr lang="en-GB" dirty="0"/>
           </a:p>
@@ -648,7 +1253,7 @@
           <a:p>
             <a:fld id="{54261E1A-D829-4B13-8E47-3FA50A360041}" type="slidenum">
               <a:rPr lang="en-GB" smtClean="0"/>
-              <a:t>4</a:t>
+              <a:t>2</a:t>
             </a:fld>
             <a:endParaRPr lang="en-GB"/>
           </a:p>
@@ -657,7 +1262,7 @@
     </p:spTree>
     <p:extLst>
       <p:ext uri="{BB962C8B-B14F-4D97-AF65-F5344CB8AC3E}">
-        <p14:creationId xmlns:p14="http://schemas.microsoft.com/office/powerpoint/2010/main" val="1993467398"/>
+        <p14:creationId xmlns:p14="http://schemas.microsoft.com/office/powerpoint/2010/main" val="1039215597"/>
       </p:ext>
     </p:extLst>
   </p:cSld>
@@ -708,24 +1313,34 @@
         </p:nvSpPr>
         <p:spPr/>
         <p:txBody>
-          <a:bodyPr/>
+          <a:bodyPr>
+            <a:normAutofit/>
+          </a:bodyPr>
           <a:lstStyle/>
           <a:p>
+            <a:pPr marL="0" indent="0">
+              <a:buNone/>
+            </a:pPr>
             <a:r>
               <a:rPr lang="en-GB" dirty="0" smtClean="0"/>
-              <a:t>Say students, &lt;click&gt;,</a:t>
+              <a:t>If it hasn’t already been clarified you will find a prototype of our future app in front of you or currently passing around the audience. </a:t>
+            </a:r>
+          </a:p>
+          <a:p>
+            <a:r>
+              <a:rPr lang="en-GB" dirty="0" smtClean="0"/>
+              <a:t>We’ll be glad to hear your feedback</a:t>
             </a:r>
             <a:r>
               <a:rPr lang="en-GB" baseline="0" dirty="0" smtClean="0"/>
-              <a:t> why not children? They need banks, </a:t>
+              <a:t> so we can improve the final product </a:t>
             </a:r>
-            <a:r>
-              <a:rPr lang="en-GB" dirty="0" smtClean="0"/>
-              <a:t>Briefly</a:t>
-            </a:r>
+            <a:endParaRPr lang="en-GB" baseline="0" dirty="0" smtClean="0"/>
+          </a:p>
+          <a:p>
             <a:r>
               <a:rPr lang="en-GB" baseline="0" dirty="0" smtClean="0"/>
-              <a:t> explain we picked students because we match that age range so it is easier to think of aims. </a:t>
+              <a:t>There will be a tablet version, it will be awesome. </a:t>
             </a:r>
             <a:endParaRPr lang="en-GB" dirty="0"/>
           </a:p>
@@ -748,7 +1363,8 @@
           <a:p>
             <a:fld id="{54261E1A-D829-4B13-8E47-3FA50A360041}" type="slidenum">
               <a:rPr lang="en-GB" smtClean="0"/>
-              <a:t>5</a:t>
+              <a:pPr/>
+              <a:t>3</a:t>
             </a:fld>
             <a:endParaRPr lang="en-GB"/>
           </a:p>
@@ -757,7 +1373,7 @@
     </p:spTree>
     <p:extLst>
       <p:ext uri="{BB962C8B-B14F-4D97-AF65-F5344CB8AC3E}">
-        <p14:creationId xmlns:p14="http://schemas.microsoft.com/office/powerpoint/2010/main" val="1993467398"/>
+        <p14:creationId xmlns:p14="http://schemas.microsoft.com/office/powerpoint/2010/main" val="1007760576"/>
       </p:ext>
     </p:extLst>
   </p:cSld>
@@ -808,9 +1424,45 @@
         </p:nvSpPr>
         <p:spPr/>
         <p:txBody>
-          <a:bodyPr/>
+          <a:bodyPr>
+            <a:normAutofit/>
+          </a:bodyPr>
           <a:lstStyle/>
           <a:p>
+            <a:r>
+              <a:rPr lang="en-GB" dirty="0" smtClean="0"/>
+              <a:t>Why ?</a:t>
+            </a:r>
+            <a:r>
+              <a:rPr lang="en-GB" baseline="0" dirty="0" smtClean="0"/>
+              <a:t> </a:t>
+            </a:r>
+          </a:p>
+          <a:p>
+            <a:r>
+              <a:rPr lang="en-GB" baseline="0" dirty="0" smtClean="0"/>
+              <a:t>-Children don’t decide which bank they will join their parents do. </a:t>
+            </a:r>
+          </a:p>
+          <a:p>
+            <a:pPr>
+              <a:buFontTx/>
+              <a:buChar char="-"/>
+            </a:pPr>
+            <a:r>
+              <a:rPr lang="en-GB" baseline="0" dirty="0" smtClean="0"/>
+              <a:t>Young people at university start caring about their finances and make their first real independent decision which bank to join </a:t>
+            </a:r>
+          </a:p>
+          <a:p>
+            <a:pPr>
+              <a:buFontTx/>
+              <a:buChar char="-"/>
+            </a:pPr>
+            <a:r>
+              <a:rPr lang="en-GB" baseline="0" dirty="0" smtClean="0"/>
+              <a:t>If you convince these people and provide satisfying services they will stay with the bank and when they grow up and start their own families, it is likely that they will create similar accounts for their kids. </a:t>
+            </a:r>
             <a:endParaRPr lang="en-GB" dirty="0"/>
           </a:p>
         </p:txBody>
@@ -832,6 +1484,213 @@
           <a:p>
             <a:fld id="{54261E1A-D829-4B13-8E47-3FA50A360041}" type="slidenum">
               <a:rPr lang="en-GB" smtClean="0"/>
+              <a:pPr/>
+              <a:t>4</a:t>
+            </a:fld>
+            <a:endParaRPr lang="en-GB"/>
+          </a:p>
+        </p:txBody>
+      </p:sp>
+    </p:spTree>
+    <p:extLst>
+      <p:ext uri="{BB962C8B-B14F-4D97-AF65-F5344CB8AC3E}">
+        <p14:creationId xmlns:p14="http://schemas.microsoft.com/office/powerpoint/2010/main" val="444763125"/>
+      </p:ext>
+    </p:extLst>
+  </p:cSld>
+  <p:clrMapOvr>
+    <a:masterClrMapping/>
+  </p:clrMapOvr>
+</p:notes>
+</file>
+
+<file path=ppt/notesSlides/notesSlide5.xml><?xml version="1.0" encoding="utf-8"?>
+<p:notes xmlns:a="http://schemas.openxmlformats.org/drawingml/2006/main" xmlns:r="http://schemas.openxmlformats.org/officeDocument/2006/relationships" xmlns:p="http://schemas.openxmlformats.org/presentationml/2006/main">
+  <p:cSld>
+    <p:spTree>
+      <p:nvGrpSpPr>
+        <p:cNvPr id="1" name=""/>
+        <p:cNvGrpSpPr/>
+        <p:nvPr/>
+      </p:nvGrpSpPr>
+      <p:grpSpPr>
+        <a:xfrm>
+          <a:off x="0" y="0"/>
+          <a:ext cx="0" cy="0"/>
+          <a:chOff x="0" y="0"/>
+          <a:chExt cx="0" cy="0"/>
+        </a:xfrm>
+      </p:grpSpPr>
+      <p:sp>
+        <p:nvSpPr>
+          <p:cNvPr id="2" name="Slide Image Placeholder 1"/>
+          <p:cNvSpPr>
+            <a:spLocks noGrp="1" noRot="1" noChangeAspect="1"/>
+          </p:cNvSpPr>
+          <p:nvPr>
+            <p:ph type="sldImg"/>
+          </p:nvPr>
+        </p:nvSpPr>
+        <p:spPr/>
+      </p:sp>
+      <p:sp>
+        <p:nvSpPr>
+          <p:cNvPr id="3" name="Notes Placeholder 2"/>
+          <p:cNvSpPr>
+            <a:spLocks noGrp="1"/>
+          </p:cNvSpPr>
+          <p:nvPr>
+            <p:ph type="body" idx="1"/>
+          </p:nvPr>
+        </p:nvSpPr>
+        <p:spPr/>
+        <p:txBody>
+          <a:bodyPr>
+            <a:normAutofit/>
+          </a:bodyPr>
+          <a:lstStyle/>
+          <a:p>
+            <a:r>
+              <a:rPr lang="en-GB" dirty="0" smtClean="0"/>
+              <a:t>We</a:t>
+            </a:r>
+            <a:r>
+              <a:rPr lang="en-GB" baseline="0" dirty="0" smtClean="0"/>
+              <a:t> choose to develop an android application because of its rapid growth in sales. Also Android is being ported on multiple devices, like TV’s tablets etc. </a:t>
+            </a:r>
+          </a:p>
+          <a:p>
+            <a:r>
+              <a:rPr lang="en-GB" baseline="0" dirty="0" smtClean="0"/>
+              <a:t>Majority of people in the age range for our product own multiple android devices</a:t>
+            </a:r>
+          </a:p>
+          <a:p>
+            <a:r>
+              <a:rPr lang="en-GB" baseline="0" dirty="0" smtClean="0"/>
+              <a:t>7 out of 8 people n our group own an android device </a:t>
+            </a:r>
+            <a:endParaRPr lang="en-GB" dirty="0"/>
+          </a:p>
+        </p:txBody>
+      </p:sp>
+      <p:sp>
+        <p:nvSpPr>
+          <p:cNvPr id="4" name="Slide Number Placeholder 3"/>
+          <p:cNvSpPr>
+            <a:spLocks noGrp="1"/>
+          </p:cNvSpPr>
+          <p:nvPr>
+            <p:ph type="sldNum" sz="quarter" idx="10"/>
+          </p:nvPr>
+        </p:nvSpPr>
+        <p:spPr/>
+        <p:txBody>
+          <a:bodyPr/>
+          <a:lstStyle/>
+          <a:p>
+            <a:fld id="{54261E1A-D829-4B13-8E47-3FA50A360041}" type="slidenum">
+              <a:rPr lang="en-GB" smtClean="0"/>
+              <a:pPr/>
+              <a:t>5</a:t>
+            </a:fld>
+            <a:endParaRPr lang="en-GB"/>
+          </a:p>
+        </p:txBody>
+      </p:sp>
+    </p:spTree>
+    <p:extLst>
+      <p:ext uri="{BB962C8B-B14F-4D97-AF65-F5344CB8AC3E}">
+        <p14:creationId xmlns:p14="http://schemas.microsoft.com/office/powerpoint/2010/main" val="3469762709"/>
+      </p:ext>
+    </p:extLst>
+  </p:cSld>
+  <p:clrMapOvr>
+    <a:masterClrMapping/>
+  </p:clrMapOvr>
+</p:notes>
+</file>
+
+<file path=ppt/notesSlides/notesSlide6.xml><?xml version="1.0" encoding="utf-8"?>
+<p:notes xmlns:a="http://schemas.openxmlformats.org/drawingml/2006/main" xmlns:r="http://schemas.openxmlformats.org/officeDocument/2006/relationships" xmlns:p="http://schemas.openxmlformats.org/presentationml/2006/main">
+  <p:cSld>
+    <p:spTree>
+      <p:nvGrpSpPr>
+        <p:cNvPr id="1" name=""/>
+        <p:cNvGrpSpPr/>
+        <p:nvPr/>
+      </p:nvGrpSpPr>
+      <p:grpSpPr>
+        <a:xfrm>
+          <a:off x="0" y="0"/>
+          <a:ext cx="0" cy="0"/>
+          <a:chOff x="0" y="0"/>
+          <a:chExt cx="0" cy="0"/>
+        </a:xfrm>
+      </p:grpSpPr>
+      <p:sp>
+        <p:nvSpPr>
+          <p:cNvPr id="2" name="Slide Image Placeholder 1"/>
+          <p:cNvSpPr>
+            <a:spLocks noGrp="1" noRot="1" noChangeAspect="1"/>
+          </p:cNvSpPr>
+          <p:nvPr>
+            <p:ph type="sldImg"/>
+          </p:nvPr>
+        </p:nvSpPr>
+        <p:spPr/>
+      </p:sp>
+      <p:sp>
+        <p:nvSpPr>
+          <p:cNvPr id="3" name="Notes Placeholder 2"/>
+          <p:cNvSpPr>
+            <a:spLocks noGrp="1"/>
+          </p:cNvSpPr>
+          <p:nvPr>
+            <p:ph type="body" idx="1"/>
+          </p:nvPr>
+        </p:nvSpPr>
+        <p:spPr/>
+        <p:txBody>
+          <a:bodyPr/>
+          <a:lstStyle/>
+          <a:p>
+            <a:r>
+              <a:rPr lang="en-GB" dirty="0" smtClean="0"/>
+              <a:t>We</a:t>
+            </a:r>
+            <a:r>
+              <a:rPr lang="en-GB" baseline="0" dirty="0" smtClean="0"/>
+              <a:t> know you don’t want another standard banking app, however we also realise that your users wouldn't want to have multiple banking applications on their devices, </a:t>
+            </a:r>
+          </a:p>
+          <a:p>
+            <a:r>
+              <a:rPr lang="en-GB" baseline="0" dirty="0" smtClean="0"/>
+              <a:t>This is why we developed our app to provide all the basic functionality, plus some additional functionality to attract attention of our target age group</a:t>
+            </a:r>
+            <a:endParaRPr lang="en-GB" dirty="0"/>
+          </a:p>
+        </p:txBody>
+      </p:sp>
+      <p:sp>
+        <p:nvSpPr>
+          <p:cNvPr id="4" name="Slide Number Placeholder 3"/>
+          <p:cNvSpPr>
+            <a:spLocks noGrp="1"/>
+          </p:cNvSpPr>
+          <p:nvPr>
+            <p:ph type="sldNum" sz="quarter" idx="10"/>
+          </p:nvPr>
+        </p:nvSpPr>
+        <p:spPr/>
+        <p:txBody>
+          <a:bodyPr/>
+          <a:lstStyle/>
+          <a:p>
+            <a:fld id="{54261E1A-D829-4B13-8E47-3FA50A360041}" type="slidenum">
+              <a:rPr lang="en-GB" smtClean="0"/>
+              <a:pPr/>
               <a:t>6</a:t>
             </a:fld>
             <a:endParaRPr lang="en-GB"/>
@@ -842,6 +1701,291 @@
     <p:extLst>
       <p:ext uri="{BB962C8B-B14F-4D97-AF65-F5344CB8AC3E}">
         <p14:creationId xmlns:p14="http://schemas.microsoft.com/office/powerpoint/2010/main" val="322626272"/>
+      </p:ext>
+    </p:extLst>
+  </p:cSld>
+  <p:clrMapOvr>
+    <a:masterClrMapping/>
+  </p:clrMapOvr>
+</p:notes>
+</file>
+
+<file path=ppt/notesSlides/notesSlide7.xml><?xml version="1.0" encoding="utf-8"?>
+<p:notes xmlns:a="http://schemas.openxmlformats.org/drawingml/2006/main" xmlns:r="http://schemas.openxmlformats.org/officeDocument/2006/relationships" xmlns:p="http://schemas.openxmlformats.org/presentationml/2006/main">
+  <p:cSld>
+    <p:spTree>
+      <p:nvGrpSpPr>
+        <p:cNvPr id="1" name=""/>
+        <p:cNvGrpSpPr/>
+        <p:nvPr/>
+      </p:nvGrpSpPr>
+      <p:grpSpPr>
+        <a:xfrm>
+          <a:off x="0" y="0"/>
+          <a:ext cx="0" cy="0"/>
+          <a:chOff x="0" y="0"/>
+          <a:chExt cx="0" cy="0"/>
+        </a:xfrm>
+      </p:grpSpPr>
+      <p:sp>
+        <p:nvSpPr>
+          <p:cNvPr id="2" name="Slide Image Placeholder 1"/>
+          <p:cNvSpPr>
+            <a:spLocks noGrp="1" noRot="1" noChangeAspect="1"/>
+          </p:cNvSpPr>
+          <p:nvPr>
+            <p:ph type="sldImg"/>
+          </p:nvPr>
+        </p:nvSpPr>
+        <p:spPr/>
+      </p:sp>
+      <p:sp>
+        <p:nvSpPr>
+          <p:cNvPr id="3" name="Notes Placeholder 2"/>
+          <p:cNvSpPr>
+            <a:spLocks noGrp="1"/>
+          </p:cNvSpPr>
+          <p:nvPr>
+            <p:ph type="body" idx="1"/>
+          </p:nvPr>
+        </p:nvSpPr>
+        <p:spPr/>
+        <p:txBody>
+          <a:bodyPr/>
+          <a:lstStyle/>
+          <a:p>
+            <a:endParaRPr lang="en-GB" dirty="0"/>
+          </a:p>
+        </p:txBody>
+      </p:sp>
+      <p:sp>
+        <p:nvSpPr>
+          <p:cNvPr id="4" name="Slide Number Placeholder 3"/>
+          <p:cNvSpPr>
+            <a:spLocks noGrp="1"/>
+          </p:cNvSpPr>
+          <p:nvPr>
+            <p:ph type="sldNum" sz="quarter" idx="10"/>
+          </p:nvPr>
+        </p:nvSpPr>
+        <p:spPr/>
+        <p:txBody>
+          <a:bodyPr/>
+          <a:lstStyle/>
+          <a:p>
+            <a:fld id="{54261E1A-D829-4B13-8E47-3FA50A360041}" type="slidenum">
+              <a:rPr lang="en-GB" smtClean="0"/>
+              <a:pPr/>
+              <a:t>7</a:t>
+            </a:fld>
+            <a:endParaRPr lang="en-GB"/>
+          </a:p>
+        </p:txBody>
+      </p:sp>
+    </p:spTree>
+    <p:extLst>
+      <p:ext uri="{BB962C8B-B14F-4D97-AF65-F5344CB8AC3E}">
+        <p14:creationId xmlns:p14="http://schemas.microsoft.com/office/powerpoint/2010/main" val="227946091"/>
+      </p:ext>
+    </p:extLst>
+  </p:cSld>
+  <p:clrMapOvr>
+    <a:masterClrMapping/>
+  </p:clrMapOvr>
+</p:notes>
+</file>
+
+<file path=ppt/notesSlides/notesSlide8.xml><?xml version="1.0" encoding="utf-8"?>
+<p:notes xmlns:a="http://schemas.openxmlformats.org/drawingml/2006/main" xmlns:r="http://schemas.openxmlformats.org/officeDocument/2006/relationships" xmlns:p="http://schemas.openxmlformats.org/presentationml/2006/main">
+  <p:cSld>
+    <p:spTree>
+      <p:nvGrpSpPr>
+        <p:cNvPr id="1" name=""/>
+        <p:cNvGrpSpPr/>
+        <p:nvPr/>
+      </p:nvGrpSpPr>
+      <p:grpSpPr>
+        <a:xfrm>
+          <a:off x="0" y="0"/>
+          <a:ext cx="0" cy="0"/>
+          <a:chOff x="0" y="0"/>
+          <a:chExt cx="0" cy="0"/>
+        </a:xfrm>
+      </p:grpSpPr>
+      <p:sp>
+        <p:nvSpPr>
+          <p:cNvPr id="2" name="Slide Image Placeholder 1"/>
+          <p:cNvSpPr>
+            <a:spLocks noGrp="1" noRot="1" noChangeAspect="1"/>
+          </p:cNvSpPr>
+          <p:nvPr>
+            <p:ph type="sldImg"/>
+          </p:nvPr>
+        </p:nvSpPr>
+        <p:spPr/>
+      </p:sp>
+      <p:sp>
+        <p:nvSpPr>
+          <p:cNvPr id="3" name="Notes Placeholder 2"/>
+          <p:cNvSpPr>
+            <a:spLocks noGrp="1"/>
+          </p:cNvSpPr>
+          <p:nvPr>
+            <p:ph type="body" idx="1"/>
+          </p:nvPr>
+        </p:nvSpPr>
+        <p:spPr/>
+        <p:txBody>
+          <a:bodyPr/>
+          <a:lstStyle/>
+          <a:p>
+            <a:r>
+              <a:rPr lang="en-GB" dirty="0" smtClean="0"/>
+              <a:t>Balances- Available</a:t>
+            </a:r>
+            <a:r>
+              <a:rPr lang="en-GB" baseline="0" dirty="0" smtClean="0"/>
+              <a:t> balance is larger than the balance as this is the more important and used, on the main screen as the majority of users use app to check balance and helps avoid scouring through menu after menu. </a:t>
+            </a:r>
+          </a:p>
+          <a:p>
+            <a:endParaRPr lang="en-GB" baseline="0" dirty="0" smtClean="0"/>
+          </a:p>
+          <a:p>
+            <a:r>
+              <a:rPr lang="en-GB" baseline="0" dirty="0" smtClean="0"/>
+              <a:t>This screen also provides links to the rest of the app’s functionality </a:t>
+            </a:r>
+          </a:p>
+        </p:txBody>
+      </p:sp>
+      <p:sp>
+        <p:nvSpPr>
+          <p:cNvPr id="4" name="Slide Number Placeholder 3"/>
+          <p:cNvSpPr>
+            <a:spLocks noGrp="1"/>
+          </p:cNvSpPr>
+          <p:nvPr>
+            <p:ph type="sldNum" sz="quarter" idx="10"/>
+          </p:nvPr>
+        </p:nvSpPr>
+        <p:spPr/>
+        <p:txBody>
+          <a:bodyPr/>
+          <a:lstStyle/>
+          <a:p>
+            <a:fld id="{54261E1A-D829-4B13-8E47-3FA50A360041}" type="slidenum">
+              <a:rPr lang="en-GB" smtClean="0"/>
+              <a:pPr/>
+              <a:t>8</a:t>
+            </a:fld>
+            <a:endParaRPr lang="en-GB"/>
+          </a:p>
+        </p:txBody>
+      </p:sp>
+    </p:spTree>
+    <p:extLst>
+      <p:ext uri="{BB962C8B-B14F-4D97-AF65-F5344CB8AC3E}">
+        <p14:creationId xmlns:p14="http://schemas.microsoft.com/office/powerpoint/2010/main" val="2973687456"/>
+      </p:ext>
+    </p:extLst>
+  </p:cSld>
+  <p:clrMapOvr>
+    <a:masterClrMapping/>
+  </p:clrMapOvr>
+</p:notes>
+</file>
+
+<file path=ppt/notesSlides/notesSlide9.xml><?xml version="1.0" encoding="utf-8"?>
+<p:notes xmlns:a="http://schemas.openxmlformats.org/drawingml/2006/main" xmlns:r="http://schemas.openxmlformats.org/officeDocument/2006/relationships" xmlns:p="http://schemas.openxmlformats.org/presentationml/2006/main">
+  <p:cSld>
+    <p:spTree>
+      <p:nvGrpSpPr>
+        <p:cNvPr id="1" name=""/>
+        <p:cNvGrpSpPr/>
+        <p:nvPr/>
+      </p:nvGrpSpPr>
+      <p:grpSpPr>
+        <a:xfrm>
+          <a:off x="0" y="0"/>
+          <a:ext cx="0" cy="0"/>
+          <a:chOff x="0" y="0"/>
+          <a:chExt cx="0" cy="0"/>
+        </a:xfrm>
+      </p:grpSpPr>
+      <p:sp>
+        <p:nvSpPr>
+          <p:cNvPr id="2" name="Slide Image Placeholder 1"/>
+          <p:cNvSpPr>
+            <a:spLocks noGrp="1" noRot="1" noChangeAspect="1"/>
+          </p:cNvSpPr>
+          <p:nvPr>
+            <p:ph type="sldImg"/>
+          </p:nvPr>
+        </p:nvSpPr>
+        <p:spPr/>
+      </p:sp>
+      <p:sp>
+        <p:nvSpPr>
+          <p:cNvPr id="3" name="Notes Placeholder 2"/>
+          <p:cNvSpPr>
+            <a:spLocks noGrp="1"/>
+          </p:cNvSpPr>
+          <p:nvPr>
+            <p:ph type="body" idx="1"/>
+          </p:nvPr>
+        </p:nvSpPr>
+        <p:spPr/>
+        <p:txBody>
+          <a:bodyPr/>
+          <a:lstStyle/>
+          <a:p>
+            <a:r>
+              <a:rPr lang="en-GB" dirty="0" smtClean="0"/>
+              <a:t>- Providing</a:t>
+            </a:r>
+            <a:r>
+              <a:rPr lang="en-GB" baseline="0" dirty="0" smtClean="0"/>
+              <a:t> the basic banking functionality </a:t>
+            </a:r>
+          </a:p>
+          <a:p>
+            <a:r>
+              <a:rPr lang="en-GB" baseline="0" dirty="0" smtClean="0"/>
+              <a:t>- We are going to gather information from the statement and use to tailor the rewards towards the users needs </a:t>
+            </a:r>
+            <a:endParaRPr lang="en-GB" dirty="0"/>
+          </a:p>
+        </p:txBody>
+      </p:sp>
+      <p:sp>
+        <p:nvSpPr>
+          <p:cNvPr id="4" name="Slide Number Placeholder 3"/>
+          <p:cNvSpPr>
+            <a:spLocks noGrp="1"/>
+          </p:cNvSpPr>
+          <p:nvPr>
+            <p:ph type="sldNum" sz="quarter" idx="10"/>
+          </p:nvPr>
+        </p:nvSpPr>
+        <p:spPr/>
+        <p:txBody>
+          <a:bodyPr/>
+          <a:lstStyle/>
+          <a:p>
+            <a:fld id="{54261E1A-D829-4B13-8E47-3FA50A360041}" type="slidenum">
+              <a:rPr lang="en-GB" smtClean="0"/>
+              <a:pPr/>
+              <a:t>9</a:t>
+            </a:fld>
+            <a:endParaRPr lang="en-GB"/>
+          </a:p>
+        </p:txBody>
+      </p:sp>
+    </p:spTree>
+    <p:extLst>
+      <p:ext uri="{BB962C8B-B14F-4D97-AF65-F5344CB8AC3E}">
+        <p14:creationId xmlns:p14="http://schemas.microsoft.com/office/powerpoint/2010/main" val="2299803699"/>
       </p:ext>
     </p:extLst>
   </p:cSld>
@@ -3608,7 +4752,8 @@
           <a:p>
             <a:fld id="{2C0CBD5E-86EE-4A89-9216-CA93929C6338}" type="datetimeFigureOut">
               <a:rPr lang="en-GB" smtClean="0"/>
-              <a:t>20/11/2014</a:t>
+              <a:pPr/>
+              <a:t>24/11/2014</a:t>
             </a:fld>
             <a:endParaRPr lang="en-GB"/>
           </a:p>
@@ -3724,6 +4869,7 @@
           <a:p>
             <a:fld id="{CD649B94-3BBA-4876-99B8-49C67E4767F5}" type="slidenum">
               <a:rPr lang="en-GB" smtClean="0"/>
+              <a:pPr/>
               <a:t>‹#›</a:t>
             </a:fld>
             <a:endParaRPr lang="en-GB"/>
@@ -3893,7 +5039,8 @@
           <a:p>
             <a:fld id="{2C0CBD5E-86EE-4A89-9216-CA93929C6338}" type="datetimeFigureOut">
               <a:rPr lang="en-GB" smtClean="0"/>
-              <a:t>20/11/2014</a:t>
+              <a:pPr/>
+              <a:t>24/11/2014</a:t>
             </a:fld>
             <a:endParaRPr lang="en-GB"/>
           </a:p>
@@ -3935,6 +5082,7 @@
           <a:p>
             <a:fld id="{CD649B94-3BBA-4876-99B8-49C67E4767F5}" type="slidenum">
               <a:rPr lang="en-GB" smtClean="0"/>
+              <a:pPr/>
               <a:t>‹#›</a:t>
             </a:fld>
             <a:endParaRPr lang="en-GB"/>
@@ -4068,7 +5216,8 @@
           <a:p>
             <a:fld id="{2C0CBD5E-86EE-4A89-9216-CA93929C6338}" type="datetimeFigureOut">
               <a:rPr lang="en-GB" smtClean="0"/>
-              <a:t>20/11/2014</a:t>
+              <a:pPr/>
+              <a:t>24/11/2014</a:t>
             </a:fld>
             <a:endParaRPr lang="en-GB"/>
           </a:p>
@@ -4110,6 +5259,7 @@
           <a:p>
             <a:fld id="{CD649B94-3BBA-4876-99B8-49C67E4767F5}" type="slidenum">
               <a:rPr lang="en-GB" smtClean="0"/>
+              <a:pPr/>
               <a:t>‹#›</a:t>
             </a:fld>
             <a:endParaRPr lang="en-GB"/>
@@ -4233,7 +5383,8 @@
           <a:p>
             <a:fld id="{2C0CBD5E-86EE-4A89-9216-CA93929C6338}" type="datetimeFigureOut">
               <a:rPr lang="en-GB" smtClean="0"/>
-              <a:t>20/11/2014</a:t>
+              <a:pPr/>
+              <a:t>24/11/2014</a:t>
             </a:fld>
             <a:endParaRPr lang="en-GB"/>
           </a:p>
@@ -4275,6 +5426,7 @@
           <a:p>
             <a:fld id="{CD649B94-3BBA-4876-99B8-49C67E4767F5}" type="slidenum">
               <a:rPr lang="en-GB" smtClean="0"/>
+              <a:pPr/>
               <a:t>‹#›</a:t>
             </a:fld>
             <a:endParaRPr lang="en-GB"/>
@@ -4474,7 +5626,8 @@
           <a:p>
             <a:fld id="{2C0CBD5E-86EE-4A89-9216-CA93929C6338}" type="datetimeFigureOut">
               <a:rPr lang="en-GB" smtClean="0"/>
-              <a:t>20/11/2014</a:t>
+              <a:pPr/>
+              <a:t>24/11/2014</a:t>
             </a:fld>
             <a:endParaRPr lang="en-GB"/>
           </a:p>
@@ -4516,6 +5669,7 @@
           <a:p>
             <a:fld id="{CD649B94-3BBA-4876-99B8-49C67E4767F5}" type="slidenum">
               <a:rPr lang="en-GB" smtClean="0"/>
+              <a:pPr/>
               <a:t>‹#›</a:t>
             </a:fld>
             <a:endParaRPr lang="en-GB"/>
@@ -4587,7 +5741,8 @@
           <a:p>
             <a:fld id="{2C0CBD5E-86EE-4A89-9216-CA93929C6338}" type="datetimeFigureOut">
               <a:rPr lang="en-GB" smtClean="0"/>
-              <a:t>20/11/2014</a:t>
+              <a:pPr/>
+              <a:t>24/11/2014</a:t>
             </a:fld>
             <a:endParaRPr lang="en-GB"/>
           </a:p>
@@ -4629,6 +5784,7 @@
           <a:p>
             <a:fld id="{CD649B94-3BBA-4876-99B8-49C67E4767F5}" type="slidenum">
               <a:rPr lang="en-GB" smtClean="0"/>
+              <a:pPr/>
               <a:t>‹#›</a:t>
             </a:fld>
             <a:endParaRPr lang="en-GB"/>
@@ -5126,7 +6282,8 @@
           <a:p>
             <a:fld id="{2C0CBD5E-86EE-4A89-9216-CA93929C6338}" type="datetimeFigureOut">
               <a:rPr lang="en-GB" smtClean="0"/>
-              <a:t>20/11/2014</a:t>
+              <a:pPr/>
+              <a:t>24/11/2014</a:t>
             </a:fld>
             <a:endParaRPr lang="en-GB"/>
           </a:p>
@@ -5168,6 +6325,7 @@
           <a:p>
             <a:fld id="{CD649B94-3BBA-4876-99B8-49C67E4767F5}" type="slidenum">
               <a:rPr lang="en-GB" smtClean="0"/>
+              <a:pPr/>
               <a:t>‹#›</a:t>
             </a:fld>
             <a:endParaRPr lang="en-GB"/>
@@ -5239,7 +6397,8 @@
           <a:p>
             <a:fld id="{2C0CBD5E-86EE-4A89-9216-CA93929C6338}" type="datetimeFigureOut">
               <a:rPr lang="en-GB" smtClean="0"/>
-              <a:t>20/11/2014</a:t>
+              <a:pPr/>
+              <a:t>24/11/2014</a:t>
             </a:fld>
             <a:endParaRPr lang="en-GB"/>
           </a:p>
@@ -5281,6 +6440,7 @@
           <a:p>
             <a:fld id="{CD649B94-3BBA-4876-99B8-49C67E4767F5}" type="slidenum">
               <a:rPr lang="en-GB" smtClean="0"/>
+              <a:pPr/>
               <a:t>‹#›</a:t>
             </a:fld>
             <a:endParaRPr lang="en-GB"/>
@@ -5329,7 +6489,8 @@
           <a:p>
             <a:fld id="{2C0CBD5E-86EE-4A89-9216-CA93929C6338}" type="datetimeFigureOut">
               <a:rPr lang="en-GB" smtClean="0"/>
-              <a:t>20/11/2014</a:t>
+              <a:pPr/>
+              <a:t>24/11/2014</a:t>
             </a:fld>
             <a:endParaRPr lang="en-GB"/>
           </a:p>
@@ -5371,6 +6532,7 @@
           <a:p>
             <a:fld id="{CD649B94-3BBA-4876-99B8-49C67E4767F5}" type="slidenum">
               <a:rPr lang="en-GB" smtClean="0"/>
+              <a:pPr/>
               <a:t>‹#›</a:t>
             </a:fld>
             <a:endParaRPr lang="en-GB"/>
@@ -7980,7 +9142,8 @@
           <a:p>
             <a:fld id="{2C0CBD5E-86EE-4A89-9216-CA93929C6338}" type="datetimeFigureOut">
               <a:rPr lang="en-GB" smtClean="0"/>
-              <a:t>20/11/2014</a:t>
+              <a:pPr/>
+              <a:t>24/11/2014</a:t>
             </a:fld>
             <a:endParaRPr lang="en-GB"/>
           </a:p>
@@ -8003,6 +9166,7 @@
           <a:p>
             <a:fld id="{CD649B94-3BBA-4876-99B8-49C67E4767F5}" type="slidenum">
               <a:rPr lang="en-GB" smtClean="0"/>
+              <a:pPr/>
               <a:t>‹#›</a:t>
             </a:fld>
             <a:endParaRPr lang="en-GB"/>
@@ -11192,7 +12356,8 @@
           <a:p>
             <a:fld id="{2C0CBD5E-86EE-4A89-9216-CA93929C6338}" type="datetimeFigureOut">
               <a:rPr lang="en-GB" smtClean="0"/>
-              <a:t>20/11/2014</a:t>
+              <a:pPr/>
+              <a:t>24/11/2014</a:t>
             </a:fld>
             <a:endParaRPr lang="en-GB"/>
           </a:p>
@@ -11241,6 +12406,7 @@
           <a:p>
             <a:fld id="{CD649B94-3BBA-4876-99B8-49C67E4767F5}" type="slidenum">
               <a:rPr lang="en-GB" smtClean="0"/>
+              <a:pPr/>
               <a:t>‹#›</a:t>
             </a:fld>
             <a:endParaRPr lang="en-GB"/>
@@ -14014,7 +15180,8 @@
           <a:p>
             <a:fld id="{2C0CBD5E-86EE-4A89-9216-CA93929C6338}" type="datetimeFigureOut">
               <a:rPr lang="en-GB" smtClean="0"/>
-              <a:t>20/11/2014</a:t>
+              <a:pPr/>
+              <a:t>24/11/2014</a:t>
             </a:fld>
             <a:endParaRPr lang="en-GB"/>
           </a:p>
@@ -14088,6 +15255,7 @@
           <a:p>
             <a:fld id="{CD649B94-3BBA-4876-99B8-49C67E4767F5}" type="slidenum">
               <a:rPr lang="en-GB" smtClean="0"/>
+              <a:pPr/>
               <a:t>‹#›</a:t>
             </a:fld>
             <a:endParaRPr lang="en-GB"/>
@@ -14538,6 +15706,827 @@
 </p:sld>
 </file>
 
+<file path=ppt/slides/slide10.xml><?xml version="1.0" encoding="utf-8"?>
+<p:sld xmlns:a="http://schemas.openxmlformats.org/drawingml/2006/main" xmlns:r="http://schemas.openxmlformats.org/officeDocument/2006/relationships" xmlns:p="http://schemas.openxmlformats.org/presentationml/2006/main">
+  <p:cSld>
+    <p:spTree>
+      <p:nvGrpSpPr>
+        <p:cNvPr id="1" name=""/>
+        <p:cNvGrpSpPr/>
+        <p:nvPr/>
+      </p:nvGrpSpPr>
+      <p:grpSpPr>
+        <a:xfrm>
+          <a:off x="0" y="0"/>
+          <a:ext cx="0" cy="0"/>
+          <a:chOff x="0" y="0"/>
+          <a:chExt cx="0" cy="0"/>
+        </a:xfrm>
+      </p:grpSpPr>
+      <p:sp>
+        <p:nvSpPr>
+          <p:cNvPr id="2" name="Title 1"/>
+          <p:cNvSpPr>
+            <a:spLocks noGrp="1"/>
+          </p:cNvSpPr>
+          <p:nvPr>
+            <p:ph type="title"/>
+          </p:nvPr>
+        </p:nvSpPr>
+        <p:spPr>
+          <a:xfrm>
+            <a:off x="1043490" y="2323652"/>
+            <a:ext cx="7024744" cy="1143000"/>
+          </a:xfrm>
+        </p:spPr>
+        <p:txBody>
+          <a:bodyPr>
+            <a:normAutofit fontScale="90000"/>
+          </a:bodyPr>
+          <a:lstStyle/>
+          <a:p>
+            <a:r>
+              <a:rPr lang="en-GB" dirty="0" smtClean="0"/>
+              <a:t>Achievements</a:t>
+            </a:r>
+            <a:br>
+              <a:rPr lang="en-GB" dirty="0" smtClean="0"/>
+            </a:br>
+            <a:r>
+              <a:rPr lang="en-GB" dirty="0" smtClean="0"/>
+              <a:t>&amp; Rewards</a:t>
+            </a:r>
+            <a:endParaRPr lang="en-GB" dirty="0"/>
+          </a:p>
+        </p:txBody>
+      </p:sp>
+      <p:pic>
+        <p:nvPicPr>
+          <p:cNvPr id="1026" name="Picture 2"/>
+          <p:cNvPicPr>
+            <a:picLocks noChangeAspect="1" noChangeArrowheads="1"/>
+          </p:cNvPicPr>
+          <p:nvPr/>
+        </p:nvPicPr>
+        <p:blipFill rotWithShape="1">
+          <a:blip r:embed="rId3">
+            <a:extLst>
+              <a:ext uri="{28A0092B-C50C-407E-A947-70E740481C1C}">
+                <a14:useLocalDpi xmlns:a14="http://schemas.microsoft.com/office/drawing/2010/main" val="0"/>
+              </a:ext>
+            </a:extLst>
+          </a:blip>
+          <a:srcRect l="25432" t="19925" r="49136" b="8584"/>
+          <a:stretch/>
+        </p:blipFill>
+        <p:spPr bwMode="auto">
+          <a:xfrm>
+            <a:off x="4644008" y="908720"/>
+            <a:ext cx="3308993" cy="5229726"/>
+          </a:xfrm>
+          <a:prstGeom prst="rect">
+            <a:avLst/>
+          </a:prstGeom>
+          <a:noFill/>
+          <a:ln>
+            <a:noFill/>
+          </a:ln>
+          <a:extLst>
+            <a:ext uri="{909E8E84-426E-40DD-AFC4-6F175D3DCCD1}">
+              <a14:hiddenFill xmlns:a14="http://schemas.microsoft.com/office/drawing/2010/main">
+                <a:solidFill>
+                  <a:schemeClr val="accent1"/>
+                </a:solidFill>
+              </a14:hiddenFill>
+            </a:ext>
+            <a:ext uri="{91240B29-F687-4F45-9708-019B960494DF}">
+              <a14:hiddenLine xmlns:a14="http://schemas.microsoft.com/office/drawing/2010/main" w="9525">
+                <a:solidFill>
+                  <a:schemeClr val="tx1"/>
+                </a:solidFill>
+                <a:miter lim="800000"/>
+                <a:headEnd/>
+                <a:tailEnd/>
+              </a14:hiddenLine>
+            </a:ext>
+          </a:extLst>
+        </p:spPr>
+      </p:pic>
+    </p:spTree>
+    <p:extLst>
+      <p:ext uri="{BB962C8B-B14F-4D97-AF65-F5344CB8AC3E}">
+        <p14:creationId xmlns:p14="http://schemas.microsoft.com/office/powerpoint/2010/main" val="451344986"/>
+      </p:ext>
+    </p:extLst>
+  </p:cSld>
+  <p:clrMapOvr>
+    <a:masterClrMapping/>
+  </p:clrMapOvr>
+  <p:timing>
+    <p:tnLst>
+      <p:par>
+        <p:cTn id="1" dur="indefinite" restart="never" nodeType="tmRoot"/>
+      </p:par>
+    </p:tnLst>
+  </p:timing>
+</p:sld>
+</file>
+
+<file path=ppt/slides/slide11.xml><?xml version="1.0" encoding="utf-8"?>
+<p:sld xmlns:a="http://schemas.openxmlformats.org/drawingml/2006/main" xmlns:r="http://schemas.openxmlformats.org/officeDocument/2006/relationships" xmlns:p="http://schemas.openxmlformats.org/presentationml/2006/main">
+  <p:cSld>
+    <p:spTree>
+      <p:nvGrpSpPr>
+        <p:cNvPr id="1" name=""/>
+        <p:cNvGrpSpPr/>
+        <p:nvPr/>
+      </p:nvGrpSpPr>
+      <p:grpSpPr>
+        <a:xfrm>
+          <a:off x="0" y="0"/>
+          <a:ext cx="0" cy="0"/>
+          <a:chOff x="0" y="0"/>
+          <a:chExt cx="0" cy="0"/>
+        </a:xfrm>
+      </p:grpSpPr>
+      <p:pic>
+        <p:nvPicPr>
+          <p:cNvPr id="4" name="Picture 3"/>
+          <p:cNvPicPr>
+            <a:picLocks noChangeAspect="1"/>
+          </p:cNvPicPr>
+          <p:nvPr/>
+        </p:nvPicPr>
+        <p:blipFill rotWithShape="1">
+          <a:blip r:embed="rId3"/>
+          <a:srcRect l="36164" t="20469" r="37271" b="5704"/>
+          <a:stretch/>
+        </p:blipFill>
+        <p:spPr>
+          <a:xfrm>
+            <a:off x="4716016" y="908720"/>
+            <a:ext cx="3456384" cy="5400600"/>
+          </a:xfrm>
+          <a:prstGeom prst="rect">
+            <a:avLst/>
+          </a:prstGeom>
+        </p:spPr>
+      </p:pic>
+      <p:sp>
+        <p:nvSpPr>
+          <p:cNvPr id="5" name="Title 1"/>
+          <p:cNvSpPr txBox="1">
+            <a:spLocks/>
+          </p:cNvSpPr>
+          <p:nvPr/>
+        </p:nvSpPr>
+        <p:spPr>
+          <a:xfrm>
+            <a:off x="899592" y="2323652"/>
+            <a:ext cx="7024744" cy="1143000"/>
+          </a:xfrm>
+          <a:prstGeom prst="rect">
+            <a:avLst/>
+          </a:prstGeom>
+        </p:spPr>
+        <p:txBody>
+          <a:bodyPr vert="horz" lIns="91440" tIns="45720" rIns="91440" bIns="45720" rtlCol="0" anchor="b">
+            <a:normAutofit fontScale="97500"/>
+          </a:bodyPr>
+          <a:lstStyle>
+            <a:lvl1pPr algn="l" defTabSz="914400" rtl="0" eaLnBrk="1" latinLnBrk="0" hangingPunct="1">
+              <a:spcBef>
+                <a:spcPct val="0"/>
+              </a:spcBef>
+              <a:buNone/>
+              <a:defRPr sz="4000" kern="1200">
+                <a:solidFill>
+                  <a:schemeClr val="accent1"/>
+                </a:solidFill>
+                <a:latin typeface="+mj-lt"/>
+                <a:ea typeface="+mj-ea"/>
+                <a:cs typeface="+mj-cs"/>
+              </a:defRPr>
+            </a:lvl1pPr>
+            <a:lvl2pPr eaLnBrk="1" hangingPunct="1">
+              <a:defRPr>
+                <a:solidFill>
+                  <a:schemeClr val="tx2"/>
+                </a:solidFill>
+              </a:defRPr>
+            </a:lvl2pPr>
+            <a:lvl3pPr eaLnBrk="1" hangingPunct="1">
+              <a:defRPr>
+                <a:solidFill>
+                  <a:schemeClr val="tx2"/>
+                </a:solidFill>
+              </a:defRPr>
+            </a:lvl3pPr>
+            <a:lvl4pPr eaLnBrk="1" hangingPunct="1">
+              <a:defRPr>
+                <a:solidFill>
+                  <a:schemeClr val="tx2"/>
+                </a:solidFill>
+              </a:defRPr>
+            </a:lvl4pPr>
+            <a:lvl5pPr eaLnBrk="1" hangingPunct="1">
+              <a:defRPr>
+                <a:solidFill>
+                  <a:schemeClr val="tx2"/>
+                </a:solidFill>
+              </a:defRPr>
+            </a:lvl5pPr>
+            <a:lvl6pPr eaLnBrk="1" hangingPunct="1">
+              <a:defRPr>
+                <a:solidFill>
+                  <a:schemeClr val="tx2"/>
+                </a:solidFill>
+              </a:defRPr>
+            </a:lvl6pPr>
+            <a:lvl7pPr eaLnBrk="1" hangingPunct="1">
+              <a:defRPr>
+                <a:solidFill>
+                  <a:schemeClr val="tx2"/>
+                </a:solidFill>
+              </a:defRPr>
+            </a:lvl7pPr>
+            <a:lvl8pPr eaLnBrk="1" hangingPunct="1">
+              <a:defRPr>
+                <a:solidFill>
+                  <a:schemeClr val="tx2"/>
+                </a:solidFill>
+              </a:defRPr>
+            </a:lvl8pPr>
+            <a:lvl9pPr eaLnBrk="1" hangingPunct="1">
+              <a:defRPr>
+                <a:solidFill>
+                  <a:schemeClr val="tx2"/>
+                </a:solidFill>
+              </a:defRPr>
+            </a:lvl9pPr>
+          </a:lstStyle>
+          <a:p>
+            <a:r>
+              <a:rPr lang="en-GB" dirty="0" smtClean="0"/>
+              <a:t>Offers and Deals</a:t>
+            </a:r>
+            <a:endParaRPr lang="en-GB" dirty="0"/>
+          </a:p>
+        </p:txBody>
+      </p:sp>
+    </p:spTree>
+    <p:extLst>
+      <p:ext uri="{BB962C8B-B14F-4D97-AF65-F5344CB8AC3E}">
+        <p14:creationId xmlns:p14="http://schemas.microsoft.com/office/powerpoint/2010/main" val="1725252336"/>
+      </p:ext>
+    </p:extLst>
+  </p:cSld>
+  <p:clrMapOvr>
+    <a:masterClrMapping/>
+  </p:clrMapOvr>
+  <p:timing>
+    <p:tnLst>
+      <p:par>
+        <p:cTn id="1" dur="indefinite" restart="never" nodeType="tmRoot"/>
+      </p:par>
+    </p:tnLst>
+  </p:timing>
+</p:sld>
+</file>
+
+<file path=ppt/slides/slide12.xml><?xml version="1.0" encoding="utf-8"?>
+<p:sld xmlns:a="http://schemas.openxmlformats.org/drawingml/2006/main" xmlns:r="http://schemas.openxmlformats.org/officeDocument/2006/relationships" xmlns:p="http://schemas.openxmlformats.org/presentationml/2006/main">
+  <p:cSld>
+    <p:spTree>
+      <p:nvGrpSpPr>
+        <p:cNvPr id="1" name=""/>
+        <p:cNvGrpSpPr/>
+        <p:nvPr/>
+      </p:nvGrpSpPr>
+      <p:grpSpPr>
+        <a:xfrm>
+          <a:off x="0" y="0"/>
+          <a:ext cx="0" cy="0"/>
+          <a:chOff x="0" y="0"/>
+          <a:chExt cx="0" cy="0"/>
+        </a:xfrm>
+      </p:grpSpPr>
+      <p:pic>
+        <p:nvPicPr>
+          <p:cNvPr id="4" name="Picture 3"/>
+          <p:cNvPicPr>
+            <a:picLocks noChangeAspect="1"/>
+          </p:cNvPicPr>
+          <p:nvPr/>
+        </p:nvPicPr>
+        <p:blipFill rotWithShape="1">
+          <a:blip r:embed="rId3"/>
+          <a:srcRect l="35611" t="19485" r="37271" b="6688"/>
+          <a:stretch/>
+        </p:blipFill>
+        <p:spPr>
+          <a:xfrm>
+            <a:off x="4716016" y="908720"/>
+            <a:ext cx="3528392" cy="5400600"/>
+          </a:xfrm>
+          <a:prstGeom prst="rect">
+            <a:avLst/>
+          </a:prstGeom>
+        </p:spPr>
+      </p:pic>
+      <p:sp>
+        <p:nvSpPr>
+          <p:cNvPr id="5" name="Title 1"/>
+          <p:cNvSpPr txBox="1">
+            <a:spLocks/>
+          </p:cNvSpPr>
+          <p:nvPr/>
+        </p:nvSpPr>
+        <p:spPr>
+          <a:xfrm>
+            <a:off x="1016487" y="2636912"/>
+            <a:ext cx="7024744" cy="1143000"/>
+          </a:xfrm>
+          <a:prstGeom prst="rect">
+            <a:avLst/>
+          </a:prstGeom>
+        </p:spPr>
+        <p:txBody>
+          <a:bodyPr vert="horz" lIns="91440" tIns="45720" rIns="91440" bIns="45720" rtlCol="0" anchor="b">
+            <a:normAutofit fontScale="97500"/>
+          </a:bodyPr>
+          <a:lstStyle>
+            <a:lvl1pPr algn="l" defTabSz="914400" rtl="0" eaLnBrk="1" latinLnBrk="0" hangingPunct="1">
+              <a:spcBef>
+                <a:spcPct val="0"/>
+              </a:spcBef>
+              <a:buNone/>
+              <a:defRPr sz="4000" kern="1200">
+                <a:solidFill>
+                  <a:schemeClr val="accent1"/>
+                </a:solidFill>
+                <a:latin typeface="+mj-lt"/>
+                <a:ea typeface="+mj-ea"/>
+                <a:cs typeface="+mj-cs"/>
+              </a:defRPr>
+            </a:lvl1pPr>
+            <a:lvl2pPr eaLnBrk="1" hangingPunct="1">
+              <a:defRPr>
+                <a:solidFill>
+                  <a:schemeClr val="tx2"/>
+                </a:solidFill>
+              </a:defRPr>
+            </a:lvl2pPr>
+            <a:lvl3pPr eaLnBrk="1" hangingPunct="1">
+              <a:defRPr>
+                <a:solidFill>
+                  <a:schemeClr val="tx2"/>
+                </a:solidFill>
+              </a:defRPr>
+            </a:lvl3pPr>
+            <a:lvl4pPr eaLnBrk="1" hangingPunct="1">
+              <a:defRPr>
+                <a:solidFill>
+                  <a:schemeClr val="tx2"/>
+                </a:solidFill>
+              </a:defRPr>
+            </a:lvl4pPr>
+            <a:lvl5pPr eaLnBrk="1" hangingPunct="1">
+              <a:defRPr>
+                <a:solidFill>
+                  <a:schemeClr val="tx2"/>
+                </a:solidFill>
+              </a:defRPr>
+            </a:lvl5pPr>
+            <a:lvl6pPr eaLnBrk="1" hangingPunct="1">
+              <a:defRPr>
+                <a:solidFill>
+                  <a:schemeClr val="tx2"/>
+                </a:solidFill>
+              </a:defRPr>
+            </a:lvl6pPr>
+            <a:lvl7pPr eaLnBrk="1" hangingPunct="1">
+              <a:defRPr>
+                <a:solidFill>
+                  <a:schemeClr val="tx2"/>
+                </a:solidFill>
+              </a:defRPr>
+            </a:lvl7pPr>
+            <a:lvl8pPr eaLnBrk="1" hangingPunct="1">
+              <a:defRPr>
+                <a:solidFill>
+                  <a:schemeClr val="tx2"/>
+                </a:solidFill>
+              </a:defRPr>
+            </a:lvl8pPr>
+            <a:lvl9pPr eaLnBrk="1" hangingPunct="1">
+              <a:defRPr>
+                <a:solidFill>
+                  <a:schemeClr val="tx2"/>
+                </a:solidFill>
+              </a:defRPr>
+            </a:lvl9pPr>
+          </a:lstStyle>
+          <a:p>
+            <a:r>
+              <a:rPr lang="en-GB" dirty="0" smtClean="0"/>
+              <a:t>Transfers</a:t>
+            </a:r>
+            <a:endParaRPr lang="en-GB" dirty="0"/>
+          </a:p>
+        </p:txBody>
+      </p:sp>
+    </p:spTree>
+    <p:extLst>
+      <p:ext uri="{BB962C8B-B14F-4D97-AF65-F5344CB8AC3E}">
+        <p14:creationId xmlns:p14="http://schemas.microsoft.com/office/powerpoint/2010/main" val="2602936513"/>
+      </p:ext>
+    </p:extLst>
+  </p:cSld>
+  <p:clrMapOvr>
+    <a:masterClrMapping/>
+  </p:clrMapOvr>
+  <p:timing>
+    <p:tnLst>
+      <p:par>
+        <p:cTn id="1" dur="indefinite" restart="never" nodeType="tmRoot"/>
+      </p:par>
+    </p:tnLst>
+  </p:timing>
+</p:sld>
+</file>
+
+<file path=ppt/slides/slide13.xml><?xml version="1.0" encoding="utf-8"?>
+<p:sld xmlns:a="http://schemas.openxmlformats.org/drawingml/2006/main" xmlns:r="http://schemas.openxmlformats.org/officeDocument/2006/relationships" xmlns:p="http://schemas.openxmlformats.org/presentationml/2006/main">
+  <p:cSld>
+    <p:spTree>
+      <p:nvGrpSpPr>
+        <p:cNvPr id="1" name=""/>
+        <p:cNvGrpSpPr/>
+        <p:nvPr/>
+      </p:nvGrpSpPr>
+      <p:grpSpPr>
+        <a:xfrm>
+          <a:off x="0" y="0"/>
+          <a:ext cx="0" cy="0"/>
+          <a:chOff x="0" y="0"/>
+          <a:chExt cx="0" cy="0"/>
+        </a:xfrm>
+      </p:grpSpPr>
+      <p:pic>
+        <p:nvPicPr>
+          <p:cNvPr id="4" name="Picture 3"/>
+          <p:cNvPicPr>
+            <a:picLocks noChangeAspect="1"/>
+          </p:cNvPicPr>
+          <p:nvPr/>
+        </p:nvPicPr>
+        <p:blipFill rotWithShape="1">
+          <a:blip r:embed="rId3"/>
+          <a:srcRect l="36718" t="18500" r="37824" b="8657"/>
+          <a:stretch/>
+        </p:blipFill>
+        <p:spPr>
+          <a:xfrm>
+            <a:off x="4644008" y="908720"/>
+            <a:ext cx="3312368" cy="5328592"/>
+          </a:xfrm>
+          <a:prstGeom prst="rect">
+            <a:avLst/>
+          </a:prstGeom>
+        </p:spPr>
+      </p:pic>
+      <p:sp>
+        <p:nvSpPr>
+          <p:cNvPr id="5" name="Title 1"/>
+          <p:cNvSpPr txBox="1">
+            <a:spLocks/>
+          </p:cNvSpPr>
+          <p:nvPr/>
+        </p:nvSpPr>
+        <p:spPr>
+          <a:xfrm>
+            <a:off x="1043490" y="2323652"/>
+            <a:ext cx="7024744" cy="1143000"/>
+          </a:xfrm>
+          <a:prstGeom prst="rect">
+            <a:avLst/>
+          </a:prstGeom>
+        </p:spPr>
+        <p:txBody>
+          <a:bodyPr vert="horz" lIns="91440" tIns="45720" rIns="91440" bIns="45720" rtlCol="0" anchor="b">
+            <a:normAutofit fontScale="97500"/>
+          </a:bodyPr>
+          <a:lstStyle>
+            <a:lvl1pPr algn="l" defTabSz="914400" rtl="0" eaLnBrk="1" latinLnBrk="0" hangingPunct="1">
+              <a:spcBef>
+                <a:spcPct val="0"/>
+              </a:spcBef>
+              <a:buNone/>
+              <a:defRPr sz="4000" kern="1200">
+                <a:solidFill>
+                  <a:schemeClr val="accent1"/>
+                </a:solidFill>
+                <a:latin typeface="+mj-lt"/>
+                <a:ea typeface="+mj-ea"/>
+                <a:cs typeface="+mj-cs"/>
+              </a:defRPr>
+            </a:lvl1pPr>
+            <a:lvl2pPr eaLnBrk="1" hangingPunct="1">
+              <a:defRPr>
+                <a:solidFill>
+                  <a:schemeClr val="tx2"/>
+                </a:solidFill>
+              </a:defRPr>
+            </a:lvl2pPr>
+            <a:lvl3pPr eaLnBrk="1" hangingPunct="1">
+              <a:defRPr>
+                <a:solidFill>
+                  <a:schemeClr val="tx2"/>
+                </a:solidFill>
+              </a:defRPr>
+            </a:lvl3pPr>
+            <a:lvl4pPr eaLnBrk="1" hangingPunct="1">
+              <a:defRPr>
+                <a:solidFill>
+                  <a:schemeClr val="tx2"/>
+                </a:solidFill>
+              </a:defRPr>
+            </a:lvl4pPr>
+            <a:lvl5pPr eaLnBrk="1" hangingPunct="1">
+              <a:defRPr>
+                <a:solidFill>
+                  <a:schemeClr val="tx2"/>
+                </a:solidFill>
+              </a:defRPr>
+            </a:lvl5pPr>
+            <a:lvl6pPr eaLnBrk="1" hangingPunct="1">
+              <a:defRPr>
+                <a:solidFill>
+                  <a:schemeClr val="tx2"/>
+                </a:solidFill>
+              </a:defRPr>
+            </a:lvl6pPr>
+            <a:lvl7pPr eaLnBrk="1" hangingPunct="1">
+              <a:defRPr>
+                <a:solidFill>
+                  <a:schemeClr val="tx2"/>
+                </a:solidFill>
+              </a:defRPr>
+            </a:lvl7pPr>
+            <a:lvl8pPr eaLnBrk="1" hangingPunct="1">
+              <a:defRPr>
+                <a:solidFill>
+                  <a:schemeClr val="tx2"/>
+                </a:solidFill>
+              </a:defRPr>
+            </a:lvl8pPr>
+            <a:lvl9pPr eaLnBrk="1" hangingPunct="1">
+              <a:defRPr>
+                <a:solidFill>
+                  <a:schemeClr val="tx2"/>
+                </a:solidFill>
+              </a:defRPr>
+            </a:lvl9pPr>
+          </a:lstStyle>
+          <a:p>
+            <a:r>
+              <a:rPr lang="en-GB" dirty="0" smtClean="0"/>
+              <a:t>Branch Finder</a:t>
+            </a:r>
+            <a:endParaRPr lang="en-GB" dirty="0"/>
+          </a:p>
+        </p:txBody>
+      </p:sp>
+    </p:spTree>
+    <p:extLst>
+      <p:ext uri="{BB962C8B-B14F-4D97-AF65-F5344CB8AC3E}">
+        <p14:creationId xmlns:p14="http://schemas.microsoft.com/office/powerpoint/2010/main" val="3873891691"/>
+      </p:ext>
+    </p:extLst>
+  </p:cSld>
+  <p:clrMapOvr>
+    <a:masterClrMapping/>
+  </p:clrMapOvr>
+  <p:timing>
+    <p:tnLst>
+      <p:par>
+        <p:cTn id="1" dur="indefinite" restart="never" nodeType="tmRoot"/>
+      </p:par>
+    </p:tnLst>
+  </p:timing>
+</p:sld>
+</file>
+
+<file path=ppt/slides/slide14.xml><?xml version="1.0" encoding="utf-8"?>
+<p:sld xmlns:a="http://schemas.openxmlformats.org/drawingml/2006/main" xmlns:r="http://schemas.openxmlformats.org/officeDocument/2006/relationships" xmlns:p="http://schemas.openxmlformats.org/presentationml/2006/main">
+  <p:cSld>
+    <p:spTree>
+      <p:nvGrpSpPr>
+        <p:cNvPr id="1" name=""/>
+        <p:cNvGrpSpPr/>
+        <p:nvPr/>
+      </p:nvGrpSpPr>
+      <p:grpSpPr>
+        <a:xfrm>
+          <a:off x="0" y="0"/>
+          <a:ext cx="0" cy="0"/>
+          <a:chOff x="0" y="0"/>
+          <a:chExt cx="0" cy="0"/>
+        </a:xfrm>
+      </p:grpSpPr>
+      <p:pic>
+        <p:nvPicPr>
+          <p:cNvPr id="4" name="Picture 3"/>
+          <p:cNvPicPr>
+            <a:picLocks noChangeAspect="1"/>
+          </p:cNvPicPr>
+          <p:nvPr/>
+        </p:nvPicPr>
+        <p:blipFill rotWithShape="1">
+          <a:blip r:embed="rId3"/>
+          <a:srcRect l="37825" t="16532" r="37824" b="12594"/>
+          <a:stretch/>
+        </p:blipFill>
+        <p:spPr>
+          <a:xfrm>
+            <a:off x="4899882" y="1027664"/>
+            <a:ext cx="3168352" cy="5184576"/>
+          </a:xfrm>
+          <a:prstGeom prst="rect">
+            <a:avLst/>
+          </a:prstGeom>
+        </p:spPr>
+      </p:pic>
+      <p:sp>
+        <p:nvSpPr>
+          <p:cNvPr id="5" name="Title 1"/>
+          <p:cNvSpPr>
+            <a:spLocks noGrp="1"/>
+          </p:cNvSpPr>
+          <p:nvPr>
+            <p:ph type="title"/>
+          </p:nvPr>
+        </p:nvSpPr>
+        <p:spPr>
+          <a:xfrm>
+            <a:off x="899592" y="2276872"/>
+            <a:ext cx="7024744" cy="1143000"/>
+          </a:xfrm>
+        </p:spPr>
+        <p:txBody>
+          <a:bodyPr>
+            <a:normAutofit/>
+          </a:bodyPr>
+          <a:lstStyle/>
+          <a:p>
+            <a:r>
+              <a:rPr lang="en-GB" dirty="0" smtClean="0"/>
+              <a:t>Student Planner</a:t>
+            </a:r>
+            <a:endParaRPr lang="en-GB" dirty="0"/>
+          </a:p>
+        </p:txBody>
+      </p:sp>
+    </p:spTree>
+    <p:extLst>
+      <p:ext uri="{BB962C8B-B14F-4D97-AF65-F5344CB8AC3E}">
+        <p14:creationId xmlns:p14="http://schemas.microsoft.com/office/powerpoint/2010/main" val="4032462348"/>
+      </p:ext>
+    </p:extLst>
+  </p:cSld>
+  <p:clrMapOvr>
+    <a:masterClrMapping/>
+  </p:clrMapOvr>
+  <p:timing>
+    <p:tnLst>
+      <p:par>
+        <p:cTn id="1" dur="indefinite" restart="never" nodeType="tmRoot"/>
+      </p:par>
+    </p:tnLst>
+  </p:timing>
+</p:sld>
+</file>
+
+<file path=ppt/slides/slide15.xml><?xml version="1.0" encoding="utf-8"?>
+<p:sld xmlns:a="http://schemas.openxmlformats.org/drawingml/2006/main" xmlns:r="http://schemas.openxmlformats.org/officeDocument/2006/relationships" xmlns:p="http://schemas.openxmlformats.org/presentationml/2006/main">
+  <p:cSld>
+    <p:spTree>
+      <p:nvGrpSpPr>
+        <p:cNvPr id="1" name=""/>
+        <p:cNvGrpSpPr/>
+        <p:nvPr/>
+      </p:nvGrpSpPr>
+      <p:grpSpPr>
+        <a:xfrm>
+          <a:off x="0" y="0"/>
+          <a:ext cx="0" cy="0"/>
+          <a:chOff x="0" y="0"/>
+          <a:chExt cx="0" cy="0"/>
+        </a:xfrm>
+      </p:grpSpPr>
+      <p:sp>
+        <p:nvSpPr>
+          <p:cNvPr id="5" name="Title 1"/>
+          <p:cNvSpPr>
+            <a:spLocks noGrp="1"/>
+          </p:cNvSpPr>
+          <p:nvPr>
+            <p:ph type="title"/>
+          </p:nvPr>
+        </p:nvSpPr>
+        <p:spPr>
+          <a:xfrm>
+            <a:off x="899592" y="2276872"/>
+            <a:ext cx="7024744" cy="1143000"/>
+          </a:xfrm>
+        </p:spPr>
+        <p:txBody>
+          <a:bodyPr>
+            <a:normAutofit/>
+          </a:bodyPr>
+          <a:lstStyle/>
+          <a:p>
+            <a:r>
+              <a:rPr lang="en-GB" dirty="0" smtClean="0"/>
+              <a:t>Options</a:t>
+            </a:r>
+            <a:endParaRPr lang="en-GB" dirty="0"/>
+          </a:p>
+        </p:txBody>
+      </p:sp>
+      <p:pic>
+        <p:nvPicPr>
+          <p:cNvPr id="2050" name="Picture 2"/>
+          <p:cNvPicPr>
+            <a:picLocks noChangeAspect="1" noChangeArrowheads="1"/>
+          </p:cNvPicPr>
+          <p:nvPr/>
+        </p:nvPicPr>
+        <p:blipFill rotWithShape="1">
+          <a:blip r:embed="rId3">
+            <a:extLst>
+              <a:ext uri="{28A0092B-C50C-407E-A947-70E740481C1C}">
+                <a14:useLocalDpi xmlns:a14="http://schemas.microsoft.com/office/drawing/2010/main" val="0"/>
+              </a:ext>
+            </a:extLst>
+          </a:blip>
+          <a:srcRect l="25522" t="19298" r="48956" b="8114"/>
+          <a:stretch/>
+        </p:blipFill>
+        <p:spPr bwMode="auto">
+          <a:xfrm>
+            <a:off x="4572000" y="836712"/>
+            <a:ext cx="3320716" cy="5309937"/>
+          </a:xfrm>
+          <a:prstGeom prst="rect">
+            <a:avLst/>
+          </a:prstGeom>
+          <a:noFill/>
+          <a:ln>
+            <a:noFill/>
+          </a:ln>
+          <a:extLst>
+            <a:ext uri="{909E8E84-426E-40DD-AFC4-6F175D3DCCD1}">
+              <a14:hiddenFill xmlns:a14="http://schemas.microsoft.com/office/drawing/2010/main">
+                <a:solidFill>
+                  <a:schemeClr val="accent1"/>
+                </a:solidFill>
+              </a14:hiddenFill>
+            </a:ext>
+            <a:ext uri="{91240B29-F687-4F45-9708-019B960494DF}">
+              <a14:hiddenLine xmlns:a14="http://schemas.microsoft.com/office/drawing/2010/main" w="9525">
+                <a:solidFill>
+                  <a:schemeClr val="tx1"/>
+                </a:solidFill>
+                <a:miter lim="800000"/>
+                <a:headEnd/>
+                <a:tailEnd/>
+              </a14:hiddenLine>
+            </a:ext>
+          </a:extLst>
+        </p:spPr>
+      </p:pic>
+    </p:spTree>
+    <p:extLst>
+      <p:ext uri="{BB962C8B-B14F-4D97-AF65-F5344CB8AC3E}">
+        <p14:creationId xmlns:p14="http://schemas.microsoft.com/office/powerpoint/2010/main" val="1711443757"/>
+      </p:ext>
+    </p:extLst>
+  </p:cSld>
+  <p:clrMapOvr>
+    <a:masterClrMapping/>
+  </p:clrMapOvr>
+  <p:timing>
+    <p:tnLst>
+      <p:par>
+        <p:cTn id="1" dur="indefinite" restart="never" nodeType="tmRoot"/>
+      </p:par>
+    </p:tnLst>
+  </p:timing>
+</p:sld>
+</file>
+
 <file path=ppt/slides/slide2.xml><?xml version="1.0" encoding="utf-8"?>
 <p:sld xmlns:a="http://schemas.openxmlformats.org/drawingml/2006/main" xmlns:r="http://schemas.openxmlformats.org/officeDocument/2006/relationships" xmlns:p="http://schemas.openxmlformats.org/presentationml/2006/main">
   <p:cSld>
@@ -14671,7 +16660,7 @@
     </p:spTree>
     <p:extLst>
       <p:ext uri="{BB962C8B-B14F-4D97-AF65-F5344CB8AC3E}">
-        <p14:creationId xmlns:p14="http://schemas.microsoft.com/office/powerpoint/2010/main" val="2514916662"/>
+        <p14:creationId xmlns:p14="http://schemas.microsoft.com/office/powerpoint/2010/main" val="540261890"/>
       </p:ext>
     </p:extLst>
   </p:cSld>
@@ -14851,79 +16840,198 @@
       </p:sp>
       <p:sp>
         <p:nvSpPr>
-          <p:cNvPr id="3" name="Content Placeholder 2"/>
-          <p:cNvSpPr>
-            <a:spLocks noGrp="1"/>
-          </p:cNvSpPr>
-          <p:nvPr>
-            <p:ph idx="1"/>
-          </p:nvPr>
+          <p:cNvPr id="5" name="Rectangle 4"/>
+          <p:cNvSpPr/>
+          <p:nvPr/>
         </p:nvSpPr>
         <p:spPr>
           <a:xfrm>
-            <a:off x="1043608" y="2204864"/>
-            <a:ext cx="6777317" cy="3508977"/>
+            <a:off x="5000628" y="3286124"/>
+            <a:ext cx="2143140" cy="571504"/>
           </a:xfrm>
+          <a:prstGeom prst="rect">
+            <a:avLst/>
+          </a:prstGeom>
         </p:spPr>
+        <p:style>
+          <a:lnRef idx="2">
+            <a:schemeClr val="accent1">
+              <a:shade val="50000"/>
+            </a:schemeClr>
+          </a:lnRef>
+          <a:fillRef idx="1">
+            <a:schemeClr val="accent1"/>
+          </a:fillRef>
+          <a:effectRef idx="0">
+            <a:schemeClr val="accent1"/>
+          </a:effectRef>
+          <a:fontRef idx="minor">
+            <a:schemeClr val="lt1"/>
+          </a:fontRef>
+        </p:style>
         <p:txBody>
-          <a:bodyPr/>
+          <a:bodyPr rtlCol="0" anchor="ctr"/>
           <a:lstStyle/>
           <a:p>
-            <a:pPr marL="0" indent="0">
-              <a:buNone/>
-            </a:pPr>
+            <a:pPr algn="ctr"/>
             <a:r>
               <a:rPr lang="en-GB" dirty="0" smtClean="0"/>
-              <a:t>If it hasn’t already been clarified you will find a prototype of our future app </a:t>
+              <a:t>Lloyds1</a:t>
             </a:r>
+            <a:endParaRPr lang="en-GB" dirty="0"/>
+          </a:p>
+        </p:txBody>
+      </p:sp>
+      <p:sp>
+        <p:nvSpPr>
+          <p:cNvPr id="7" name="Rectangle 6"/>
+          <p:cNvSpPr/>
+          <p:nvPr/>
+        </p:nvSpPr>
+        <p:spPr>
+          <a:xfrm>
+            <a:off x="5000628" y="4357694"/>
+            <a:ext cx="2143140" cy="571504"/>
+          </a:xfrm>
+          <a:prstGeom prst="rect">
+            <a:avLst/>
+          </a:prstGeom>
+        </p:spPr>
+        <p:style>
+          <a:lnRef idx="2">
+            <a:schemeClr val="accent1">
+              <a:shade val="50000"/>
+            </a:schemeClr>
+          </a:lnRef>
+          <a:fillRef idx="1">
+            <a:schemeClr val="accent1"/>
+          </a:fillRef>
+          <a:effectRef idx="0">
+            <a:schemeClr val="accent1"/>
+          </a:effectRef>
+          <a:fontRef idx="minor">
+            <a:schemeClr val="lt1"/>
+          </a:fontRef>
+        </p:style>
+        <p:txBody>
+          <a:bodyPr rtlCol="0" anchor="ctr"/>
+          <a:lstStyle/>
+          <a:p>
+            <a:pPr algn="ctr"/>
             <a:r>
               <a:rPr lang="en-GB" dirty="0" smtClean="0"/>
-              <a:t>in </a:t>
-            </a:r>
-            <a:r>
-              <a:rPr lang="en-GB" dirty="0" smtClean="0"/>
-              <a:t>front of you or currently passing </a:t>
-            </a:r>
-            <a:r>
-              <a:rPr lang="en-GB" dirty="0" smtClean="0"/>
-              <a:t>around</a:t>
-            </a:r>
-            <a:r>
-              <a:rPr lang="en-GB" dirty="0"/>
-              <a:t> </a:t>
-            </a:r>
-            <a:r>
-              <a:rPr lang="en-GB" dirty="0" smtClean="0"/>
-              <a:t>the audience. </a:t>
-            </a:r>
-            <a:endParaRPr lang="en-GB" dirty="0" smtClean="0"/>
-          </a:p>
-          <a:p>
-            <a:pPr marL="0" indent="0">
-              <a:buNone/>
-            </a:pPr>
-            <a:endParaRPr lang="en-GB" dirty="0" smtClean="0"/>
-          </a:p>
-          <a:p>
-            <a:pPr marL="0" indent="0">
-              <a:buNone/>
-            </a:pPr>
-            <a:r>
-              <a:rPr lang="en-GB" dirty="0" smtClean="0"/>
-              <a:t>Remember it’s early days, so there’s more great innovations </a:t>
-            </a:r>
-            <a:r>
-              <a:rPr lang="en-GB" dirty="0" smtClean="0"/>
-              <a:t>planned and still </a:t>
-            </a:r>
-            <a:r>
-              <a:rPr lang="en-GB" dirty="0" smtClean="0"/>
-              <a:t>to come (will touch upon later). </a:t>
+              <a:t>1234</a:t>
             </a:r>
             <a:endParaRPr lang="en-GB" dirty="0"/>
           </a:p>
         </p:txBody>
       </p:sp>
+      <p:pic>
+        <p:nvPicPr>
+          <p:cNvPr id="1027" name="Picture 3"/>
+          <p:cNvPicPr>
+            <a:picLocks noChangeAspect="1" noChangeArrowheads="1"/>
+          </p:cNvPicPr>
+          <p:nvPr/>
+        </p:nvPicPr>
+        <p:blipFill>
+          <a:blip r:embed="rId3"/>
+          <a:srcRect l="69610" t="16667" r="16327" b="16666"/>
+          <a:stretch>
+            <a:fillRect/>
+          </a:stretch>
+        </p:blipFill>
+        <p:spPr bwMode="auto">
+          <a:xfrm>
+            <a:off x="1357290" y="2204864"/>
+            <a:ext cx="2544981" cy="4071942"/>
+          </a:xfrm>
+          <a:prstGeom prst="rect">
+            <a:avLst/>
+          </a:prstGeom>
+          <a:noFill/>
+          <a:ln w="9525">
+            <a:noFill/>
+            <a:miter lim="800000"/>
+            <a:headEnd/>
+            <a:tailEnd/>
+          </a:ln>
+          <a:effectLst/>
+        </p:spPr>
+      </p:pic>
+      <p:cxnSp>
+        <p:nvCxnSpPr>
+          <p:cNvPr id="9" name="Straight Arrow Connector 8"/>
+          <p:cNvCxnSpPr>
+            <a:stCxn id="5" idx="1"/>
+          </p:cNvCxnSpPr>
+          <p:nvPr/>
+        </p:nvCxnSpPr>
+        <p:spPr>
+          <a:xfrm rot="10800000" flipV="1">
+            <a:off x="3571868" y="3571876"/>
+            <a:ext cx="1428760" cy="857256"/>
+          </a:xfrm>
+          <a:prstGeom prst="straightConnector1">
+            <a:avLst/>
+          </a:prstGeom>
+          <a:ln w="44450">
+            <a:solidFill>
+              <a:schemeClr val="bg2"/>
+            </a:solidFill>
+            <a:tailEnd type="arrow"/>
+          </a:ln>
+        </p:spPr>
+        <p:style>
+          <a:lnRef idx="1">
+            <a:schemeClr val="accent1"/>
+          </a:lnRef>
+          <a:fillRef idx="0">
+            <a:schemeClr val="accent1"/>
+          </a:fillRef>
+          <a:effectRef idx="0">
+            <a:schemeClr val="accent1"/>
+          </a:effectRef>
+          <a:fontRef idx="minor">
+            <a:schemeClr val="tx1"/>
+          </a:fontRef>
+        </p:style>
+      </p:cxnSp>
+      <p:cxnSp>
+        <p:nvCxnSpPr>
+          <p:cNvPr id="11" name="Straight Arrow Connector 10"/>
+          <p:cNvCxnSpPr>
+            <a:stCxn id="7" idx="1"/>
+          </p:cNvCxnSpPr>
+          <p:nvPr/>
+        </p:nvCxnSpPr>
+        <p:spPr>
+          <a:xfrm rot="10800000" flipV="1">
+            <a:off x="3571868" y="4643446"/>
+            <a:ext cx="1428760" cy="142876"/>
+          </a:xfrm>
+          <a:prstGeom prst="straightConnector1">
+            <a:avLst/>
+          </a:prstGeom>
+          <a:ln w="44450">
+            <a:tailEnd type="arrow"/>
+          </a:ln>
+        </p:spPr>
+        <p:style>
+          <a:lnRef idx="1">
+            <a:schemeClr val="accent1"/>
+          </a:lnRef>
+          <a:fillRef idx="0">
+            <a:schemeClr val="accent1"/>
+          </a:fillRef>
+          <a:effectRef idx="0">
+            <a:schemeClr val="accent1"/>
+          </a:effectRef>
+          <a:fontRef idx="minor">
+            <a:schemeClr val="tx1"/>
+          </a:fontRef>
+        </p:style>
+      </p:cxnSp>
     </p:spTree>
     <p:extLst>
       <p:ext uri="{BB962C8B-B14F-4D97-AF65-F5344CB8AC3E}">
@@ -14971,19 +17079,14 @@
             <p:ph type="title"/>
           </p:nvPr>
         </p:nvSpPr>
-        <p:spPr>
-          <a:xfrm>
-            <a:off x="1115616" y="620688"/>
-            <a:ext cx="8229600" cy="1143000"/>
-          </a:xfrm>
-        </p:spPr>
+        <p:spPr/>
         <p:txBody>
           <a:bodyPr/>
           <a:lstStyle/>
           <a:p>
             <a:r>
               <a:rPr lang="en-GB" dirty="0" smtClean="0"/>
-              <a:t>What was our project choice? </a:t>
+              <a:t>Age range</a:t>
             </a:r>
             <a:endParaRPr lang="en-GB" dirty="0"/>
           </a:p>
@@ -14991,64 +17094,56 @@
       </p:sp>
       <p:sp>
         <p:nvSpPr>
-          <p:cNvPr id="4" name="Title 1"/>
-          <p:cNvSpPr txBox="1">
-            <a:spLocks/>
+          <p:cNvPr id="3" name="Content Placeholder 2"/>
+          <p:cNvSpPr>
+            <a:spLocks noGrp="1"/>
           </p:cNvSpPr>
+          <p:nvPr>
+            <p:ph idx="1"/>
+          </p:nvPr>
+        </p:nvSpPr>
+        <p:spPr/>
+        <p:txBody>
+          <a:bodyPr>
+            <a:normAutofit/>
+          </a:bodyPr>
+          <a:lstStyle/>
+          <a:p>
+            <a:r>
+              <a:rPr lang="en-GB" sz="2800" dirty="0" smtClean="0"/>
+              <a:t>Students (18 – 25)</a:t>
+            </a:r>
+            <a:endParaRPr lang="en-GB" sz="2800" dirty="0"/>
+          </a:p>
+        </p:txBody>
+      </p:sp>
+      <p:pic>
+        <p:nvPicPr>
+          <p:cNvPr id="30722" name="Picture 2" descr="http://3.bp.blogspot.com/-6eSimv5Rlm8/TqK-MzqUT2I/AAAAAAAACSk/v7hm9udTuXg/s1600/top-imagery_students.jpg"/>
+          <p:cNvPicPr>
+            <a:picLocks noChangeAspect="1" noChangeArrowheads="1"/>
+          </p:cNvPicPr>
           <p:nvPr/>
-        </p:nvSpPr>
-        <p:spPr>
+        </p:nvPicPr>
+        <p:blipFill>
+          <a:blip r:embed="rId3"/>
+          <a:srcRect/>
+          <a:stretch>
+            <a:fillRect/>
+          </a:stretch>
+        </p:blipFill>
+        <p:spPr bwMode="auto">
           <a:xfrm>
-            <a:off x="395536" y="2348880"/>
-            <a:ext cx="8229600" cy="1143000"/>
+            <a:off x="1643042" y="3000372"/>
+            <a:ext cx="5905500" cy="3009901"/>
           </a:xfrm>
           <a:prstGeom prst="rect">
             <a:avLst/>
           </a:prstGeom>
+          <a:noFill/>
         </p:spPr>
-        <p:txBody>
-          <a:bodyPr vert="horz" lIns="91440" tIns="45720" rIns="91440" bIns="45720" rtlCol="0" anchor="ctr">
-            <a:normAutofit/>
-          </a:bodyPr>
-          <a:lstStyle>
-            <a:lvl1pPr algn="ctr" defTabSz="914400" rtl="0" eaLnBrk="1" latinLnBrk="0" hangingPunct="1">
-              <a:spcBef>
-                <a:spcPct val="0"/>
-              </a:spcBef>
-              <a:buNone/>
-              <a:defRPr sz="4400" kern="1200">
-                <a:solidFill>
-                  <a:schemeClr val="tx1"/>
-                </a:solidFill>
-                <a:latin typeface="+mj-lt"/>
-                <a:ea typeface="+mj-ea"/>
-                <a:cs typeface="+mj-cs"/>
-              </a:defRPr>
-            </a:lvl1pPr>
-          </a:lstStyle>
-          <a:p>
-            <a:r>
-              <a:rPr lang="en-GB" dirty="0" smtClean="0">
-                <a:solidFill>
-                  <a:srgbClr val="006A4C"/>
-                </a:solidFill>
-              </a:rPr>
-              <a:t>Why not web or both? </a:t>
-            </a:r>
-            <a:endParaRPr lang="en-GB" dirty="0">
-              <a:solidFill>
-                <a:srgbClr val="006A4C"/>
-              </a:solidFill>
-            </a:endParaRPr>
-          </a:p>
-        </p:txBody>
-      </p:sp>
+      </p:pic>
     </p:spTree>
-    <p:extLst>
-      <p:ext uri="{BB962C8B-B14F-4D97-AF65-F5344CB8AC3E}">
-        <p14:creationId xmlns:p14="http://schemas.microsoft.com/office/powerpoint/2010/main" val="617838036"/>
-      </p:ext>
-    </p:extLst>
   </p:cSld>
   <p:clrMapOvr>
     <a:masterClrMapping/>
@@ -15056,88 +17151,9 @@
   <p:timing>
     <p:tnLst>
       <p:par>
-        <p:cTn id="1" dur="indefinite" restart="never" nodeType="tmRoot">
-          <p:childTnLst>
-            <p:seq concurrent="1" nextAc="seek">
-              <p:cTn id="2" dur="indefinite" nodeType="mainSeq">
-                <p:childTnLst>
-                  <p:par>
-                    <p:cTn id="3" fill="hold">
-                      <p:stCondLst>
-                        <p:cond delay="indefinite"/>
-                      </p:stCondLst>
-                      <p:childTnLst>
-                        <p:par>
-                          <p:cTn id="4" fill="hold">
-                            <p:stCondLst>
-                              <p:cond delay="0"/>
-                            </p:stCondLst>
-                            <p:childTnLst>
-                              <p:par>
-                                <p:cTn id="5" presetID="10" presetClass="entr" presetSubtype="0" fill="hold" grpId="0" nodeType="clickEffect">
-                                  <p:stCondLst>
-                                    <p:cond delay="0"/>
-                                  </p:stCondLst>
-                                  <p:childTnLst>
-                                    <p:set>
-                                      <p:cBhvr>
-                                        <p:cTn id="6" dur="1" fill="hold">
-                                          <p:stCondLst>
-                                            <p:cond delay="0"/>
-                                          </p:stCondLst>
-                                        </p:cTn>
-                                        <p:tgtEl>
-                                          <p:spTgt spid="4"/>
-                                        </p:tgtEl>
-                                        <p:attrNameLst>
-                                          <p:attrName>style.visibility</p:attrName>
-                                        </p:attrNameLst>
-                                      </p:cBhvr>
-                                      <p:to>
-                                        <p:strVal val="visible"/>
-                                      </p:to>
-                                    </p:set>
-                                    <p:animEffect transition="in" filter="fade">
-                                      <p:cBhvr>
-                                        <p:cTn id="7" dur="500"/>
-                                        <p:tgtEl>
-                                          <p:spTgt spid="4"/>
-                                        </p:tgtEl>
-                                      </p:cBhvr>
-                                    </p:animEffect>
-                                  </p:childTnLst>
-                                </p:cTn>
-                              </p:par>
-                            </p:childTnLst>
-                          </p:cTn>
-                        </p:par>
-                      </p:childTnLst>
-                    </p:cTn>
-                  </p:par>
-                </p:childTnLst>
-              </p:cTn>
-              <p:prevCondLst>
-                <p:cond evt="onPrev" delay="0">
-                  <p:tgtEl>
-                    <p:sldTgt/>
-                  </p:tgtEl>
-                </p:cond>
-              </p:prevCondLst>
-              <p:nextCondLst>
-                <p:cond evt="onNext" delay="0">
-                  <p:tgtEl>
-                    <p:sldTgt/>
-                  </p:tgtEl>
-                </p:cond>
-              </p:nextCondLst>
-            </p:seq>
-          </p:childTnLst>
-        </p:cTn>
+        <p:cTn id="1" dur="indefinite" restart="never" nodeType="tmRoot"/>
       </p:par>
     </p:tnLst>
-    <p:bldLst>
-      <p:bldP spid="4" grpId="0"/>
-    </p:bldLst>
   </p:timing>
 </p:sld>
 </file>
@@ -15171,8 +17187,62 @@
         </p:nvSpPr>
         <p:spPr>
           <a:xfrm>
-            <a:off x="1259632" y="620688"/>
-            <a:ext cx="8229600" cy="1143000"/>
+            <a:off x="1131065" y="620688"/>
+            <a:ext cx="7024744" cy="1143000"/>
+          </a:xfrm>
+        </p:spPr>
+        <p:txBody>
+          <a:bodyPr/>
+          <a:lstStyle/>
+          <a:p>
+            <a:r>
+              <a:rPr lang="en-GB" dirty="0" smtClean="0"/>
+              <a:t>Project choice</a:t>
+            </a:r>
+            <a:endParaRPr lang="en-GB" dirty="0"/>
+          </a:p>
+        </p:txBody>
+      </p:sp>
+      <p:pic>
+        <p:nvPicPr>
+          <p:cNvPr id="3078" name="Picture 6" descr="http://i-cdn.phonearena.com/images/articles/132206-thumb/android-billion.png"/>
+          <p:cNvPicPr>
+            <a:picLocks noChangeAspect="1" noChangeArrowheads="1"/>
+          </p:cNvPicPr>
+          <p:nvPr/>
+        </p:nvPicPr>
+        <p:blipFill>
+          <a:blip r:embed="rId3"/>
+          <a:srcRect/>
+          <a:stretch>
+            <a:fillRect/>
+          </a:stretch>
+        </p:blipFill>
+        <p:spPr bwMode="auto">
+          <a:xfrm>
+            <a:off x="785785" y="2276872"/>
+            <a:ext cx="7715305" cy="4009626"/>
+          </a:xfrm>
+          <a:prstGeom prst="rect">
+            <a:avLst/>
+          </a:prstGeom>
+          <a:noFill/>
+        </p:spPr>
+      </p:pic>
+      <p:sp>
+        <p:nvSpPr>
+          <p:cNvPr id="6" name="Content Placeholder 2"/>
+          <p:cNvSpPr>
+            <a:spLocks noGrp="1"/>
+          </p:cNvSpPr>
+          <p:nvPr>
+            <p:ph idx="1"/>
+          </p:nvPr>
+        </p:nvSpPr>
+        <p:spPr>
+          <a:xfrm>
+            <a:off x="1115616" y="1772816"/>
+            <a:ext cx="6777317" cy="3508977"/>
           </a:xfrm>
         </p:spPr>
         <p:txBody>
@@ -15182,73 +17252,14 @@
           <a:lstStyle/>
           <a:p>
             <a:r>
-              <a:rPr lang="en-GB" dirty="0" smtClean="0"/>
-              <a:t>What age range did we decide? </a:t>
+              <a:rPr lang="en-GB" sz="2800" dirty="0" smtClean="0"/>
+              <a:t>Android App</a:t>
             </a:r>
-            <a:endParaRPr lang="en-GB" dirty="0"/>
-          </a:p>
-        </p:txBody>
-      </p:sp>
-      <p:sp>
-        <p:nvSpPr>
-          <p:cNvPr id="4" name="Title 1"/>
-          <p:cNvSpPr txBox="1">
-            <a:spLocks/>
-          </p:cNvSpPr>
-          <p:nvPr/>
-        </p:nvSpPr>
-        <p:spPr>
-          <a:xfrm>
-            <a:off x="395536" y="2373014"/>
-            <a:ext cx="8229600" cy="1143000"/>
-          </a:xfrm>
-          <a:prstGeom prst="rect">
-            <a:avLst/>
-          </a:prstGeom>
-        </p:spPr>
-        <p:txBody>
-          <a:bodyPr vert="horz" lIns="91440" tIns="45720" rIns="91440" bIns="45720" rtlCol="0" anchor="ctr">
-            <a:normAutofit/>
-          </a:bodyPr>
-          <a:lstStyle>
-            <a:lvl1pPr algn="ctr" defTabSz="914400" rtl="0" eaLnBrk="1" latinLnBrk="0" hangingPunct="1">
-              <a:spcBef>
-                <a:spcPct val="0"/>
-              </a:spcBef>
-              <a:buNone/>
-              <a:defRPr sz="4400" kern="1200">
-                <a:solidFill>
-                  <a:schemeClr val="tx1"/>
-                </a:solidFill>
-                <a:latin typeface="+mj-lt"/>
-                <a:ea typeface="+mj-ea"/>
-                <a:cs typeface="+mj-cs"/>
-              </a:defRPr>
-            </a:lvl1pPr>
-          </a:lstStyle>
-          <a:p>
-            <a:r>
-              <a:rPr lang="en-GB" dirty="0" smtClean="0">
-                <a:solidFill>
-                  <a:srgbClr val="006A4C"/>
-                </a:solidFill>
-              </a:rPr>
-              <a:t>Why not children? </a:t>
-            </a:r>
-            <a:endParaRPr lang="en-GB" dirty="0">
-              <a:solidFill>
-                <a:srgbClr val="006A4C"/>
-              </a:solidFill>
-            </a:endParaRPr>
+            <a:endParaRPr lang="en-GB" sz="2800" dirty="0"/>
           </a:p>
         </p:txBody>
       </p:sp>
     </p:spTree>
-    <p:extLst>
-      <p:ext uri="{BB962C8B-B14F-4D97-AF65-F5344CB8AC3E}">
-        <p14:creationId xmlns:p14="http://schemas.microsoft.com/office/powerpoint/2010/main" val="3861855043"/>
-      </p:ext>
-    </p:extLst>
   </p:cSld>
   <p:clrMapOvr>
     <a:masterClrMapping/>
@@ -15256,88 +17267,9 @@
   <p:timing>
     <p:tnLst>
       <p:par>
-        <p:cTn id="1" dur="indefinite" restart="never" nodeType="tmRoot">
-          <p:childTnLst>
-            <p:seq concurrent="1" nextAc="seek">
-              <p:cTn id="2" dur="indefinite" nodeType="mainSeq">
-                <p:childTnLst>
-                  <p:par>
-                    <p:cTn id="3" fill="hold">
-                      <p:stCondLst>
-                        <p:cond delay="indefinite"/>
-                      </p:stCondLst>
-                      <p:childTnLst>
-                        <p:par>
-                          <p:cTn id="4" fill="hold">
-                            <p:stCondLst>
-                              <p:cond delay="0"/>
-                            </p:stCondLst>
-                            <p:childTnLst>
-                              <p:par>
-                                <p:cTn id="5" presetID="10" presetClass="entr" presetSubtype="0" fill="hold" grpId="0" nodeType="clickEffect">
-                                  <p:stCondLst>
-                                    <p:cond delay="0"/>
-                                  </p:stCondLst>
-                                  <p:childTnLst>
-                                    <p:set>
-                                      <p:cBhvr>
-                                        <p:cTn id="6" dur="1" fill="hold">
-                                          <p:stCondLst>
-                                            <p:cond delay="0"/>
-                                          </p:stCondLst>
-                                        </p:cTn>
-                                        <p:tgtEl>
-                                          <p:spTgt spid="4"/>
-                                        </p:tgtEl>
-                                        <p:attrNameLst>
-                                          <p:attrName>style.visibility</p:attrName>
-                                        </p:attrNameLst>
-                                      </p:cBhvr>
-                                      <p:to>
-                                        <p:strVal val="visible"/>
-                                      </p:to>
-                                    </p:set>
-                                    <p:animEffect transition="in" filter="fade">
-                                      <p:cBhvr>
-                                        <p:cTn id="7" dur="500"/>
-                                        <p:tgtEl>
-                                          <p:spTgt spid="4"/>
-                                        </p:tgtEl>
-                                      </p:cBhvr>
-                                    </p:animEffect>
-                                  </p:childTnLst>
-                                </p:cTn>
-                              </p:par>
-                            </p:childTnLst>
-                          </p:cTn>
-                        </p:par>
-                      </p:childTnLst>
-                    </p:cTn>
-                  </p:par>
-                </p:childTnLst>
-              </p:cTn>
-              <p:prevCondLst>
-                <p:cond evt="onPrev" delay="0">
-                  <p:tgtEl>
-                    <p:sldTgt/>
-                  </p:tgtEl>
-                </p:cond>
-              </p:prevCondLst>
-              <p:nextCondLst>
-                <p:cond evt="onNext" delay="0">
-                  <p:tgtEl>
-                    <p:sldTgt/>
-                  </p:tgtEl>
-                </p:cond>
-              </p:nextCondLst>
-            </p:seq>
-          </p:childTnLst>
-        </p:cTn>
+        <p:cTn id="1" dur="indefinite" restart="never" nodeType="tmRoot"/>
       </p:par>
     </p:tnLst>
-    <p:bldLst>
-      <p:bldP spid="4" grpId="0"/>
-    </p:bldLst>
   </p:timing>
 </p:sld>
 </file>
@@ -15405,7 +17337,7 @@
         </p:spPr>
         <p:txBody>
           <a:bodyPr>
-            <a:normAutofit lnSpcReduction="10000"/>
+            <a:normAutofit/>
           </a:bodyPr>
           <a:lstStyle/>
           <a:p>
@@ -15420,14 +17352,20 @@
           <a:p>
             <a:r>
               <a:rPr lang="en-GB" sz="2400" dirty="0" smtClean="0"/>
-              <a:t>Displays Balance</a:t>
+              <a:t>Displays </a:t>
             </a:r>
-          </a:p>
-          <a:p>
             <a:r>
               <a:rPr lang="en-GB" sz="2400" dirty="0" smtClean="0"/>
-              <a:t>Transfers</a:t>
+              <a:t>Balance.</a:t>
             </a:r>
+            <a:endParaRPr lang="en-GB" sz="2400" dirty="0" smtClean="0"/>
+          </a:p>
+          <a:p>
+            <a:r>
+              <a:rPr lang="en-GB" sz="2400" dirty="0" smtClean="0"/>
+              <a:t>Transfers.</a:t>
+            </a:r>
+            <a:endParaRPr lang="en-GB" sz="2400" dirty="0" smtClean="0"/>
           </a:p>
           <a:p>
             <a:r>
@@ -15440,14 +17378,13 @@
             </a:r>
             <a:r>
               <a:rPr lang="en-GB" sz="2400" dirty="0" smtClean="0"/>
-              <a:t>loyds offers</a:t>
+              <a:t>loyds </a:t>
             </a:r>
-          </a:p>
-          <a:p>
             <a:r>
               <a:rPr lang="en-GB" sz="2400" dirty="0" smtClean="0"/>
-              <a:t>Locates Branches </a:t>
+              <a:t>offers.</a:t>
             </a:r>
+            <a:endParaRPr lang="en-GB" sz="2400" dirty="0" smtClean="0"/>
           </a:p>
         </p:txBody>
       </p:sp>
@@ -15461,7 +17398,7 @@
         </p:nvSpPr>
         <p:spPr>
           <a:xfrm>
-            <a:off x="4067944" y="3284984"/>
+            <a:off x="4139952" y="3356992"/>
             <a:ext cx="4402832" cy="2088233"/>
           </a:xfrm>
           <a:prstGeom prst="rect">
@@ -15665,23 +17602,28 @@
             <a:pPr indent="-342900"/>
             <a:r>
               <a:rPr lang="en-GB" dirty="0"/>
-              <a:t>A student focused finance planner (assistant) </a:t>
+              <a:t>A student focused finance planner (assistant</a:t>
+            </a:r>
+            <a:r>
+              <a:rPr lang="en-GB" dirty="0" smtClean="0"/>
+              <a:t>).</a:t>
             </a:r>
           </a:p>
           <a:p>
             <a:pPr indent="-342900"/>
             <a:r>
               <a:rPr lang="en-GB" dirty="0"/>
-              <a:t>&lt;insert future innovations in later version of </a:t>
+              <a:t>Locates b</a:t>
             </a:r>
             <a:r>
-              <a:rPr lang="en-GB" dirty="0" err="1"/>
-              <a:t>powerpoint</a:t>
+              <a:rPr lang="en-GB" dirty="0" smtClean="0"/>
+              <a:t>ranches, ATM’s and local places to use rewards.</a:t>
             </a:r>
             <a:r>
-              <a:rPr lang="en-GB" dirty="0"/>
-              <a:t>&gt; </a:t>
+              <a:rPr lang="en-GB" dirty="0" smtClean="0"/>
+              <a:t> </a:t>
             </a:r>
+            <a:endParaRPr lang="en-GB" dirty="0"/>
           </a:p>
         </p:txBody>
       </p:sp>
@@ -15887,49 +17829,6 @@
                                   </p:childTnLst>
                                 </p:cTn>
                               </p:par>
-                              <p:par>
-                                <p:cTn id="17" presetID="10" presetClass="entr" presetSubtype="0" fill="hold" grpId="0" nodeType="withEffect">
-                                  <p:stCondLst>
-                                    <p:cond delay="0"/>
-                                  </p:stCondLst>
-                                  <p:childTnLst>
-                                    <p:set>
-                                      <p:cBhvr>
-                                        <p:cTn id="18" dur="1" fill="hold">
-                                          <p:stCondLst>
-                                            <p:cond delay="0"/>
-                                          </p:stCondLst>
-                                        </p:cTn>
-                                        <p:tgtEl>
-                                          <p:spTgt spid="3">
-                                            <p:txEl>
-                                              <p:pRg st="4" end="4"/>
-                                            </p:txEl>
-                                          </p:spTgt>
-                                        </p:tgtEl>
-                                        <p:attrNameLst>
-                                          <p:attrName>style.visibility</p:attrName>
-                                        </p:attrNameLst>
-                                      </p:cBhvr>
-                                      <p:to>
-                                        <p:strVal val="visible"/>
-                                      </p:to>
-                                    </p:set>
-                                    <p:animEffect transition="in" filter="fade">
-                                      <p:cBhvr>
-                                        <p:cTn id="19" dur="500"/>
-                                        <p:tgtEl>
-                                          <p:spTgt spid="3">
-                                            <p:txEl>
-                                              <p:pRg st="4" end="4"/>
-                                            </p:txEl>
-                                          </p:spTgt>
-                                        </p:tgtEl>
-                                      </p:cBhvr>
-                                    </p:animEffect>
-                                  </p:childTnLst>
-                                </p:cTn>
-                              </p:par>
                             </p:childTnLst>
                           </p:cTn>
                         </p:par>
@@ -15937,26 +17836,26 @@
                     </p:cTn>
                   </p:par>
                   <p:par>
-                    <p:cTn id="20" fill="hold">
+                    <p:cTn id="17" fill="hold">
                       <p:stCondLst>
                         <p:cond delay="indefinite"/>
                       </p:stCondLst>
                       <p:childTnLst>
                         <p:par>
-                          <p:cTn id="21" fill="hold">
+                          <p:cTn id="18" fill="hold">
                             <p:stCondLst>
                               <p:cond delay="0"/>
                             </p:stCondLst>
                             <p:childTnLst>
                               <p:par>
-                                <p:cTn id="22" presetID="10" presetClass="entr" presetSubtype="0" fill="hold" grpId="0" nodeType="clickEffect">
+                                <p:cTn id="19" presetID="10" presetClass="entr" presetSubtype="0" fill="hold" grpId="0" nodeType="clickEffect">
                                   <p:stCondLst>
                                     <p:cond delay="0"/>
                                   </p:stCondLst>
                                   <p:childTnLst>
                                     <p:set>
                                       <p:cBhvr>
-                                        <p:cTn id="23" dur="1" fill="hold">
+                                        <p:cTn id="20" dur="1" fill="hold">
                                           <p:stCondLst>
                                             <p:cond delay="0"/>
                                           </p:stCondLst>
@@ -15978,11 +17877,54 @@
                                     </p:set>
                                     <p:animEffect transition="in" filter="fade">
                                       <p:cBhvr>
+                                        <p:cTn id="21" dur="500"/>
+                                        <p:tgtEl>
+                                          <p:spTgt spid="7">
+                                            <p:txEl>
+                                              <p:pRg st="0" end="0"/>
+                                            </p:txEl>
+                                          </p:spTgt>
+                                        </p:tgtEl>
+                                      </p:cBhvr>
+                                    </p:animEffect>
+                                  </p:childTnLst>
+                                </p:cTn>
+                              </p:par>
+                              <p:par>
+                                <p:cTn id="22" presetID="10" presetClass="entr" presetSubtype="0" fill="hold" grpId="0" nodeType="withEffect">
+                                  <p:stCondLst>
+                                    <p:cond delay="0"/>
+                                  </p:stCondLst>
+                                  <p:childTnLst>
+                                    <p:set>
+                                      <p:cBhvr>
+                                        <p:cTn id="23" dur="1" fill="hold">
+                                          <p:stCondLst>
+                                            <p:cond delay="0"/>
+                                          </p:stCondLst>
+                                        </p:cTn>
+                                        <p:tgtEl>
+                                          <p:spTgt spid="7">
+                                            <p:txEl>
+                                              <p:pRg st="1" end="1"/>
+                                            </p:txEl>
+                                          </p:spTgt>
+                                        </p:tgtEl>
+                                        <p:attrNameLst>
+                                          <p:attrName>style.visibility</p:attrName>
+                                        </p:attrNameLst>
+                                      </p:cBhvr>
+                                      <p:to>
+                                        <p:strVal val="visible"/>
+                                      </p:to>
+                                    </p:set>
+                                    <p:animEffect transition="in" filter="fade">
+                                      <p:cBhvr>
                                         <p:cTn id="24" dur="500"/>
                                         <p:tgtEl>
                                           <p:spTgt spid="7">
                                             <p:txEl>
-                                              <p:pRg st="0" end="0"/>
+                                              <p:pRg st="1" end="1"/>
                                             </p:txEl>
                                           </p:spTgt>
                                         </p:tgtEl>
@@ -16007,7 +17949,7 @@
                                         <p:tgtEl>
                                           <p:spTgt spid="7">
                                             <p:txEl>
-                                              <p:pRg st="1" end="1"/>
+                                              <p:pRg st="2" end="2"/>
                                             </p:txEl>
                                           </p:spTgt>
                                         </p:tgtEl>
@@ -16025,7 +17967,7 @@
                                         <p:tgtEl>
                                           <p:spTgt spid="7">
                                             <p:txEl>
-                                              <p:pRg st="1" end="1"/>
+                                              <p:pRg st="2" end="2"/>
                                             </p:txEl>
                                           </p:spTgt>
                                         </p:tgtEl>
@@ -16050,7 +17992,7 @@
                                         <p:tgtEl>
                                           <p:spTgt spid="7">
                                             <p:txEl>
-                                              <p:pRg st="2" end="2"/>
+                                              <p:pRg st="3" end="3"/>
                                             </p:txEl>
                                           </p:spTgt>
                                         </p:tgtEl>
@@ -16065,49 +18007,6 @@
                                     <p:animEffect transition="in" filter="fade">
                                       <p:cBhvr>
                                         <p:cTn id="30" dur="500"/>
-                                        <p:tgtEl>
-                                          <p:spTgt spid="7">
-                                            <p:txEl>
-                                              <p:pRg st="2" end="2"/>
-                                            </p:txEl>
-                                          </p:spTgt>
-                                        </p:tgtEl>
-                                      </p:cBhvr>
-                                    </p:animEffect>
-                                  </p:childTnLst>
-                                </p:cTn>
-                              </p:par>
-                              <p:par>
-                                <p:cTn id="31" presetID="10" presetClass="entr" presetSubtype="0" fill="hold" grpId="0" nodeType="withEffect">
-                                  <p:stCondLst>
-                                    <p:cond delay="0"/>
-                                  </p:stCondLst>
-                                  <p:childTnLst>
-                                    <p:set>
-                                      <p:cBhvr>
-                                        <p:cTn id="32" dur="1" fill="hold">
-                                          <p:stCondLst>
-                                            <p:cond delay="0"/>
-                                          </p:stCondLst>
-                                        </p:cTn>
-                                        <p:tgtEl>
-                                          <p:spTgt spid="7">
-                                            <p:txEl>
-                                              <p:pRg st="3" end="3"/>
-                                            </p:txEl>
-                                          </p:spTgt>
-                                        </p:tgtEl>
-                                        <p:attrNameLst>
-                                          <p:attrName>style.visibility</p:attrName>
-                                        </p:attrNameLst>
-                                      </p:cBhvr>
-                                      <p:to>
-                                        <p:strVal val="visible"/>
-                                      </p:to>
-                                    </p:set>
-                                    <p:animEffect transition="in" filter="fade">
-                                      <p:cBhvr>
-                                        <p:cTn id="33" dur="500"/>
                                         <p:tgtEl>
                                           <p:spTgt spid="7">
                                             <p:txEl>
@@ -16182,21 +18081,14 @@
             <p:ph type="title"/>
           </p:nvPr>
         </p:nvSpPr>
-        <p:spPr>
-          <a:xfrm>
-            <a:off x="1043490" y="1027664"/>
-            <a:ext cx="7024744" cy="745152"/>
-          </a:xfrm>
-        </p:spPr>
+        <p:spPr/>
         <p:txBody>
-          <a:bodyPr>
-            <a:normAutofit/>
-          </a:bodyPr>
+          <a:bodyPr/>
           <a:lstStyle/>
           <a:p>
             <a:r>
               <a:rPr lang="en-GB" dirty="0" smtClean="0"/>
-              <a:t>How we designed the prototype</a:t>
+              <a:t>Security</a:t>
             </a:r>
             <a:endParaRPr lang="en-GB" dirty="0"/>
           </a:p>
@@ -16212,44 +18104,40 @@
             <p:ph idx="1"/>
           </p:nvPr>
         </p:nvSpPr>
-        <p:spPr>
-          <a:xfrm>
-            <a:off x="1043492" y="1916833"/>
-            <a:ext cx="6777317" cy="1728192"/>
-          </a:xfrm>
-        </p:spPr>
+        <p:spPr/>
         <p:txBody>
           <a:bodyPr/>
           <a:lstStyle/>
           <a:p>
-            <a:pPr marL="0" indent="0">
-              <a:buNone/>
-            </a:pPr>
             <a:r>
               <a:rPr lang="en-GB" dirty="0" smtClean="0"/>
-              <a:t>We developed multiple prototypes based on what we thought a banking app should be like, we then took the pros from each and combined them into one master prototype. </a:t>
+              <a:t>Has login and 6-8 digit password they set up with the bank for entering first time. </a:t>
             </a:r>
-            <a:endParaRPr lang="en-GB" dirty="0"/>
+          </a:p>
+          <a:p>
+            <a:r>
+              <a:rPr lang="en-GB" dirty="0" smtClean="0"/>
+              <a:t>When screen times out, user has to re-enter password.</a:t>
+            </a:r>
+          </a:p>
+          <a:p>
+            <a:r>
+              <a:rPr lang="en-GB" dirty="0" smtClean="0"/>
+              <a:t>Streamlines speed with security. </a:t>
+            </a:r>
           </a:p>
         </p:txBody>
       </p:sp>
     </p:spTree>
     <p:extLst>
       <p:ext uri="{BB962C8B-B14F-4D97-AF65-F5344CB8AC3E}">
-        <p14:creationId xmlns:p14="http://schemas.microsoft.com/office/powerpoint/2010/main" val="2394123016"/>
+        <p14:creationId xmlns:p14="http://schemas.microsoft.com/office/powerpoint/2010/main" val="2141964072"/>
       </p:ext>
     </p:extLst>
   </p:cSld>
   <p:clrMapOvr>
     <a:masterClrMapping/>
   </p:clrMapOvr>
-  <p:timing>
-    <p:tnLst>
-      <p:par>
-        <p:cTn id="1" dur="indefinite" restart="never" nodeType="tmRoot"/>
-      </p:par>
-    </p:tnLst>
-  </p:timing>
 </p:sld>
 </file>
 
@@ -16270,303 +18158,9 @@
           <a:chExt cx="0" cy="0"/>
         </a:xfrm>
       </p:grpSpPr>
-      <p:cxnSp>
-        <p:nvCxnSpPr>
-          <p:cNvPr id="4" name="Straight Arrow Connector 3"/>
-          <p:cNvCxnSpPr/>
-          <p:nvPr/>
-        </p:nvCxnSpPr>
-        <p:spPr>
-          <a:xfrm flipV="1">
-            <a:off x="2555776" y="3949414"/>
-            <a:ext cx="674041" cy="271674"/>
-          </a:xfrm>
-          <a:prstGeom prst="straightConnector1">
-            <a:avLst/>
-          </a:prstGeom>
-          <a:ln>
-            <a:solidFill>
-              <a:schemeClr val="tx1"/>
-            </a:solidFill>
-            <a:tailEnd type="arrow"/>
-          </a:ln>
-        </p:spPr>
-        <p:style>
-          <a:lnRef idx="1">
-            <a:schemeClr val="accent1"/>
-          </a:lnRef>
-          <a:fillRef idx="0">
-            <a:schemeClr val="accent1"/>
-          </a:fillRef>
-          <a:effectRef idx="0">
-            <a:schemeClr val="accent1"/>
-          </a:effectRef>
-          <a:fontRef idx="minor">
-            <a:schemeClr val="tx1"/>
-          </a:fontRef>
-        </p:style>
-      </p:cxnSp>
-      <p:cxnSp>
-        <p:nvCxnSpPr>
-          <p:cNvPr id="5" name="Straight Arrow Connector 4"/>
-          <p:cNvCxnSpPr/>
-          <p:nvPr/>
-        </p:nvCxnSpPr>
-        <p:spPr>
-          <a:xfrm flipH="1">
-            <a:off x="5587724" y="2036706"/>
-            <a:ext cx="563099" cy="576064"/>
-          </a:xfrm>
-          <a:prstGeom prst="straightConnector1">
-            <a:avLst/>
-          </a:prstGeom>
-          <a:ln>
-            <a:solidFill>
-              <a:schemeClr val="tx1"/>
-            </a:solidFill>
-            <a:tailEnd type="arrow"/>
-          </a:ln>
-        </p:spPr>
-        <p:style>
-          <a:lnRef idx="1">
-            <a:schemeClr val="accent1"/>
-          </a:lnRef>
-          <a:fillRef idx="0">
-            <a:schemeClr val="accent1"/>
-          </a:fillRef>
-          <a:effectRef idx="0">
-            <a:schemeClr val="accent1"/>
-          </a:effectRef>
-          <a:fontRef idx="minor">
-            <a:schemeClr val="tx1"/>
-          </a:fontRef>
-        </p:style>
-      </p:cxnSp>
-      <p:cxnSp>
-        <p:nvCxnSpPr>
-          <p:cNvPr id="6" name="Straight Arrow Connector 5"/>
-          <p:cNvCxnSpPr/>
-          <p:nvPr/>
-        </p:nvCxnSpPr>
-        <p:spPr>
-          <a:xfrm flipH="1" flipV="1">
-            <a:off x="5652120" y="3790980"/>
-            <a:ext cx="864096" cy="862156"/>
-          </a:xfrm>
-          <a:prstGeom prst="straightConnector1">
-            <a:avLst/>
-          </a:prstGeom>
-          <a:ln>
-            <a:solidFill>
-              <a:schemeClr val="tx1"/>
-            </a:solidFill>
-            <a:tailEnd type="arrow"/>
-          </a:ln>
-        </p:spPr>
-        <p:style>
-          <a:lnRef idx="1">
-            <a:schemeClr val="accent1"/>
-          </a:lnRef>
-          <a:fillRef idx="0">
-            <a:schemeClr val="accent1"/>
-          </a:fillRef>
-          <a:effectRef idx="0">
-            <a:schemeClr val="accent1"/>
-          </a:effectRef>
-          <a:fontRef idx="minor">
-            <a:schemeClr val="tx1"/>
-          </a:fontRef>
-        </p:style>
-      </p:cxnSp>
-      <p:cxnSp>
-        <p:nvCxnSpPr>
-          <p:cNvPr id="7" name="Straight Arrow Connector 6"/>
-          <p:cNvCxnSpPr/>
-          <p:nvPr/>
-        </p:nvCxnSpPr>
-        <p:spPr>
-          <a:xfrm>
-            <a:off x="2555776" y="2167681"/>
-            <a:ext cx="674041" cy="592749"/>
-          </a:xfrm>
-          <a:prstGeom prst="straightConnector1">
-            <a:avLst/>
-          </a:prstGeom>
-          <a:ln>
-            <a:solidFill>
-              <a:schemeClr val="tx1"/>
-            </a:solidFill>
-            <a:tailEnd type="arrow"/>
-          </a:ln>
-        </p:spPr>
-        <p:style>
-          <a:lnRef idx="1">
-            <a:schemeClr val="accent1"/>
-          </a:lnRef>
-          <a:fillRef idx="0">
-            <a:schemeClr val="accent1"/>
-          </a:fillRef>
-          <a:effectRef idx="0">
-            <a:schemeClr val="accent1"/>
-          </a:effectRef>
-          <a:fontRef idx="minor">
-            <a:schemeClr val="tx1"/>
-          </a:fontRef>
-        </p:style>
-      </p:cxnSp>
-      <p:pic>
-        <p:nvPicPr>
-          <p:cNvPr id="15" name="Picture 14"/>
-          <p:cNvPicPr>
-            <a:picLocks noChangeAspect="1"/>
-          </p:cNvPicPr>
-          <p:nvPr/>
-        </p:nvPicPr>
-        <p:blipFill>
-          <a:blip r:embed="rId2">
-            <a:extLst>
-              <a:ext uri="{28A0092B-C50C-407E-A947-70E740481C1C}">
-                <a14:useLocalDpi xmlns:a14="http://schemas.microsoft.com/office/drawing/2010/main" val="0"/>
-              </a:ext>
-            </a:extLst>
-          </a:blip>
-          <a:stretch>
-            <a:fillRect/>
-          </a:stretch>
-        </p:blipFill>
-        <p:spPr>
-          <a:xfrm>
-            <a:off x="3229817" y="1434560"/>
-            <a:ext cx="2357907" cy="3808398"/>
-          </a:xfrm>
-          <a:prstGeom prst="rect">
-            <a:avLst/>
-          </a:prstGeom>
-        </p:spPr>
-      </p:pic>
-      <p:pic>
-        <p:nvPicPr>
-          <p:cNvPr id="2" name="Picture 1"/>
-          <p:cNvPicPr>
-            <a:picLocks noChangeAspect="1"/>
-          </p:cNvPicPr>
-          <p:nvPr/>
-        </p:nvPicPr>
-        <p:blipFill>
-          <a:blip r:embed="rId3">
-            <a:extLst>
-              <a:ext uri="{28A0092B-C50C-407E-A947-70E740481C1C}">
-                <a14:useLocalDpi xmlns:a14="http://schemas.microsoft.com/office/drawing/2010/main" val="0"/>
-              </a:ext>
-            </a:extLst>
-          </a:blip>
-          <a:stretch>
-            <a:fillRect/>
-          </a:stretch>
-        </p:blipFill>
-        <p:spPr>
-          <a:xfrm>
-            <a:off x="6516216" y="3432611"/>
-            <a:ext cx="1864931" cy="2981721"/>
-          </a:xfrm>
-          <a:prstGeom prst="rect">
-            <a:avLst/>
-          </a:prstGeom>
-        </p:spPr>
-      </p:pic>
-      <p:pic>
-        <p:nvPicPr>
-          <p:cNvPr id="3" name="Picture 2"/>
-          <p:cNvPicPr>
-            <a:picLocks noChangeAspect="1"/>
-          </p:cNvPicPr>
-          <p:nvPr/>
-        </p:nvPicPr>
-        <p:blipFill>
-          <a:blip r:embed="rId4">
-            <a:extLst>
-              <a:ext uri="{28A0092B-C50C-407E-A947-70E740481C1C}">
-                <a14:useLocalDpi xmlns:a14="http://schemas.microsoft.com/office/drawing/2010/main" val="0"/>
-              </a:ext>
-            </a:extLst>
-          </a:blip>
-          <a:stretch>
-            <a:fillRect/>
-          </a:stretch>
-        </p:blipFill>
-        <p:spPr>
-          <a:xfrm>
-            <a:off x="654658" y="3432611"/>
-            <a:ext cx="1901118" cy="2746579"/>
-          </a:xfrm>
-          <a:prstGeom prst="rect">
-            <a:avLst/>
-          </a:prstGeom>
-        </p:spPr>
-      </p:pic>
-      <p:pic>
-        <p:nvPicPr>
-          <p:cNvPr id="8" name="Picture 7"/>
-          <p:cNvPicPr>
-            <a:picLocks noChangeAspect="1"/>
-          </p:cNvPicPr>
-          <p:nvPr/>
-        </p:nvPicPr>
-        <p:blipFill>
-          <a:blip r:embed="rId5">
-            <a:extLst>
-              <a:ext uri="{28A0092B-C50C-407E-A947-70E740481C1C}">
-                <a14:useLocalDpi xmlns:a14="http://schemas.microsoft.com/office/drawing/2010/main" val="0"/>
-              </a:ext>
-            </a:extLst>
-          </a:blip>
-          <a:stretch>
-            <a:fillRect/>
-          </a:stretch>
-        </p:blipFill>
-        <p:spPr>
-          <a:xfrm>
-            <a:off x="792690" y="405233"/>
-            <a:ext cx="1763086" cy="2840528"/>
-          </a:xfrm>
-          <a:prstGeom prst="rect">
-            <a:avLst/>
-          </a:prstGeom>
-        </p:spPr>
-      </p:pic>
-      <p:pic>
-        <p:nvPicPr>
-          <p:cNvPr id="17" name="Picture 16"/>
-          <p:cNvPicPr>
-            <a:picLocks noChangeAspect="1"/>
-          </p:cNvPicPr>
-          <p:nvPr/>
-        </p:nvPicPr>
-        <p:blipFill>
-          <a:blip r:embed="rId6">
-            <a:extLst>
-              <a:ext uri="{28A0092B-C50C-407E-A947-70E740481C1C}">
-                <a14:useLocalDpi xmlns:a14="http://schemas.microsoft.com/office/drawing/2010/main" val="0"/>
-              </a:ext>
-            </a:extLst>
-          </a:blip>
-          <a:stretch>
-            <a:fillRect/>
-          </a:stretch>
-        </p:blipFill>
-        <p:spPr>
-          <a:xfrm>
-            <a:off x="6168226" y="789959"/>
-            <a:ext cx="1631285" cy="2580483"/>
-          </a:xfrm>
-          <a:prstGeom prst="rect">
-            <a:avLst/>
-          </a:prstGeom>
-        </p:spPr>
-      </p:pic>
       <p:sp>
         <p:nvSpPr>
-          <p:cNvPr id="18" name="Title 1"/>
+          <p:cNvPr id="2" name="Title 1"/>
           <p:cNvSpPr>
             <a:spLocks noGrp="1"/>
           </p:cNvSpPr>
@@ -16576,28 +18170,78 @@
         </p:nvSpPr>
         <p:spPr>
           <a:xfrm>
-            <a:off x="2705072" y="789959"/>
-            <a:ext cx="3407396" cy="601136"/>
+            <a:off x="1043608" y="2276872"/>
+            <a:ext cx="7024744" cy="1143000"/>
           </a:xfrm>
         </p:spPr>
         <p:txBody>
-          <a:bodyPr>
-            <a:normAutofit/>
-          </a:bodyPr>
+          <a:bodyPr/>
           <a:lstStyle/>
           <a:p>
             <a:r>
-              <a:rPr lang="en-GB" sz="2800" dirty="0" smtClean="0"/>
-              <a:t>Example: Main Menu</a:t>
+              <a:rPr lang="en-GB" dirty="0" smtClean="0"/>
+              <a:t>Main Screen</a:t>
             </a:r>
-            <a:endParaRPr lang="en-GB" sz="2800" dirty="0"/>
+            <a:endParaRPr lang="en-GB" dirty="0"/>
           </a:p>
         </p:txBody>
       </p:sp>
+      <p:pic>
+        <p:nvPicPr>
+          <p:cNvPr id="1026" name="Picture 2"/>
+          <p:cNvPicPr>
+            <a:picLocks noChangeAspect="1" noChangeArrowheads="1"/>
+          </p:cNvPicPr>
+          <p:nvPr/>
+        </p:nvPicPr>
+        <p:blipFill rotWithShape="1">
+          <a:blip r:embed="rId3">
+            <a:extLst>
+              <a:ext uri="{28A0092B-C50C-407E-A947-70E740481C1C}">
+                <a14:useLocalDpi xmlns:a14="http://schemas.microsoft.com/office/drawing/2010/main" val="0"/>
+              </a:ext>
+            </a:extLst>
+          </a:blip>
+          <a:srcRect l="25645" t="20175" r="48710" b="8335"/>
+          <a:stretch/>
+        </p:blipFill>
+        <p:spPr bwMode="auto">
+          <a:xfrm>
+            <a:off x="4427984" y="908720"/>
+            <a:ext cx="3336758" cy="5229726"/>
+          </a:xfrm>
+          <a:prstGeom prst="rect">
+            <a:avLst/>
+          </a:prstGeom>
+          <a:noFill/>
+          <a:ln>
+            <a:noFill/>
+          </a:ln>
+          <a:extLst>
+            <a:ext uri="{909E8E84-426E-40DD-AFC4-6F175D3DCCD1}">
+              <a14:hiddenFill xmlns:a14="http://schemas.microsoft.com/office/drawing/2010/main">
+                <a:solidFill>
+                  <a:schemeClr val="accent1"/>
+                </a:solidFill>
+              </a14:hiddenFill>
+            </a:ext>
+            <a:ext uri="{91240B29-F687-4F45-9708-019B960494DF}">
+              <a14:hiddenLine xmlns:a14="http://schemas.microsoft.com/office/drawing/2010/main" w="9525">
+                <a:solidFill>
+                  <a:schemeClr val="tx1"/>
+                </a:solidFill>
+                <a:miter lim="800000"/>
+                <a:headEnd/>
+                <a:tailEnd/>
+              </a14:hiddenLine>
+            </a:ext>
+          </a:extLst>
+        </p:spPr>
+      </p:pic>
     </p:spTree>
     <p:extLst>
       <p:ext uri="{BB962C8B-B14F-4D97-AF65-F5344CB8AC3E}">
-        <p14:creationId xmlns:p14="http://schemas.microsoft.com/office/powerpoint/2010/main" val="3890832401"/>
+        <p14:creationId xmlns:p14="http://schemas.microsoft.com/office/powerpoint/2010/main" val="1865593250"/>
       </p:ext>
     </p:extLst>
   </p:cSld>
@@ -16607,399 +18251,95 @@
   <p:timing>
     <p:tnLst>
       <p:par>
-        <p:cTn id="1" dur="indefinite" restart="never" nodeType="tmRoot">
-          <p:childTnLst>
-            <p:seq concurrent="1" nextAc="seek">
-              <p:cTn id="2" dur="indefinite" nodeType="mainSeq">
-                <p:childTnLst>
-                  <p:par>
-                    <p:cTn id="3" fill="hold">
-                      <p:stCondLst>
-                        <p:cond delay="indefinite"/>
-                      </p:stCondLst>
-                      <p:childTnLst>
-                        <p:par>
-                          <p:cTn id="4" fill="hold">
-                            <p:stCondLst>
-                              <p:cond delay="0"/>
-                            </p:stCondLst>
-                            <p:childTnLst>
-                              <p:par>
-                                <p:cTn id="5" presetID="10" presetClass="entr" presetSubtype="0" fill="hold" nodeType="clickEffect">
-                                  <p:stCondLst>
-                                    <p:cond delay="0"/>
-                                  </p:stCondLst>
-                                  <p:childTnLst>
-                                    <p:set>
-                                      <p:cBhvr>
-                                        <p:cTn id="6" dur="1" fill="hold">
-                                          <p:stCondLst>
-                                            <p:cond delay="0"/>
-                                          </p:stCondLst>
-                                        </p:cTn>
-                                        <p:tgtEl>
-                                          <p:spTgt spid="8"/>
-                                        </p:tgtEl>
-                                        <p:attrNameLst>
-                                          <p:attrName>style.visibility</p:attrName>
-                                        </p:attrNameLst>
-                                      </p:cBhvr>
-                                      <p:to>
-                                        <p:strVal val="visible"/>
-                                      </p:to>
-                                    </p:set>
-                                    <p:animEffect transition="in" filter="fade">
-                                      <p:cBhvr>
-                                        <p:cTn id="7" dur="1000"/>
-                                        <p:tgtEl>
-                                          <p:spTgt spid="8"/>
-                                        </p:tgtEl>
-                                      </p:cBhvr>
-                                    </p:animEffect>
-                                  </p:childTnLst>
-                                </p:cTn>
-                              </p:par>
-                              <p:par>
-                                <p:cTn id="8" presetID="10" presetClass="entr" presetSubtype="0" fill="hold" nodeType="withEffect">
-                                  <p:stCondLst>
-                                    <p:cond delay="0"/>
-                                  </p:stCondLst>
-                                  <p:childTnLst>
-                                    <p:set>
-                                      <p:cBhvr>
-                                        <p:cTn id="9" dur="1" fill="hold">
-                                          <p:stCondLst>
-                                            <p:cond delay="0"/>
-                                          </p:stCondLst>
-                                        </p:cTn>
-                                        <p:tgtEl>
-                                          <p:spTgt spid="7"/>
-                                        </p:tgtEl>
-                                        <p:attrNameLst>
-                                          <p:attrName>style.visibility</p:attrName>
-                                        </p:attrNameLst>
-                                      </p:cBhvr>
-                                      <p:to>
-                                        <p:strVal val="visible"/>
-                                      </p:to>
-                                    </p:set>
-                                    <p:animEffect transition="in" filter="fade">
-                                      <p:cBhvr>
-                                        <p:cTn id="10" dur="1000"/>
-                                        <p:tgtEl>
-                                          <p:spTgt spid="7"/>
-                                        </p:tgtEl>
-                                      </p:cBhvr>
-                                    </p:animEffect>
-                                  </p:childTnLst>
-                                </p:cTn>
-                              </p:par>
-                            </p:childTnLst>
-                          </p:cTn>
-                        </p:par>
-                        <p:par>
-                          <p:cTn id="11" fill="hold">
-                            <p:stCondLst>
-                              <p:cond delay="1000"/>
-                            </p:stCondLst>
-                            <p:childTnLst>
-                              <p:par>
-                                <p:cTn id="12" presetID="10" presetClass="entr" presetSubtype="0" fill="hold" nodeType="afterEffect">
-                                  <p:stCondLst>
-                                    <p:cond delay="0"/>
-                                  </p:stCondLst>
-                                  <p:childTnLst>
-                                    <p:set>
-                                      <p:cBhvr>
-                                        <p:cTn id="13" dur="1" fill="hold">
-                                          <p:stCondLst>
-                                            <p:cond delay="0"/>
-                                          </p:stCondLst>
-                                        </p:cTn>
-                                        <p:tgtEl>
-                                          <p:spTgt spid="3"/>
-                                        </p:tgtEl>
-                                        <p:attrNameLst>
-                                          <p:attrName>style.visibility</p:attrName>
-                                        </p:attrNameLst>
-                                      </p:cBhvr>
-                                      <p:to>
-                                        <p:strVal val="visible"/>
-                                      </p:to>
-                                    </p:set>
-                                    <p:animEffect transition="in" filter="fade">
-                                      <p:cBhvr>
-                                        <p:cTn id="14" dur="1000"/>
-                                        <p:tgtEl>
-                                          <p:spTgt spid="3"/>
-                                        </p:tgtEl>
-                                      </p:cBhvr>
-                                    </p:animEffect>
-                                  </p:childTnLst>
-                                </p:cTn>
-                              </p:par>
-                              <p:par>
-                                <p:cTn id="15" presetID="10" presetClass="entr" presetSubtype="0" fill="hold" nodeType="withEffect">
-                                  <p:stCondLst>
-                                    <p:cond delay="0"/>
-                                  </p:stCondLst>
-                                  <p:childTnLst>
-                                    <p:set>
-                                      <p:cBhvr>
-                                        <p:cTn id="16" dur="1" fill="hold">
-                                          <p:stCondLst>
-                                            <p:cond delay="0"/>
-                                          </p:stCondLst>
-                                        </p:cTn>
-                                        <p:tgtEl>
-                                          <p:spTgt spid="4"/>
-                                        </p:tgtEl>
-                                        <p:attrNameLst>
-                                          <p:attrName>style.visibility</p:attrName>
-                                        </p:attrNameLst>
-                                      </p:cBhvr>
-                                      <p:to>
-                                        <p:strVal val="visible"/>
-                                      </p:to>
-                                    </p:set>
-                                    <p:animEffect transition="in" filter="fade">
-                                      <p:cBhvr>
-                                        <p:cTn id="17" dur="1000"/>
-                                        <p:tgtEl>
-                                          <p:spTgt spid="4"/>
-                                        </p:tgtEl>
-                                      </p:cBhvr>
-                                    </p:animEffect>
-                                  </p:childTnLst>
-                                </p:cTn>
-                              </p:par>
-                            </p:childTnLst>
-                          </p:cTn>
-                        </p:par>
-                        <p:par>
-                          <p:cTn id="18" fill="hold">
-                            <p:stCondLst>
-                              <p:cond delay="2000"/>
-                            </p:stCondLst>
-                            <p:childTnLst>
-                              <p:par>
-                                <p:cTn id="19" presetID="10" presetClass="entr" presetSubtype="0" fill="hold" nodeType="afterEffect">
-                                  <p:stCondLst>
-                                    <p:cond delay="0"/>
-                                  </p:stCondLst>
-                                  <p:childTnLst>
-                                    <p:set>
-                                      <p:cBhvr>
-                                        <p:cTn id="20" dur="1" fill="hold">
-                                          <p:stCondLst>
-                                            <p:cond delay="0"/>
-                                          </p:stCondLst>
-                                        </p:cTn>
-                                        <p:tgtEl>
-                                          <p:spTgt spid="2"/>
-                                        </p:tgtEl>
-                                        <p:attrNameLst>
-                                          <p:attrName>style.visibility</p:attrName>
-                                        </p:attrNameLst>
-                                      </p:cBhvr>
-                                      <p:to>
-                                        <p:strVal val="visible"/>
-                                      </p:to>
-                                    </p:set>
-                                    <p:animEffect transition="in" filter="fade">
-                                      <p:cBhvr>
-                                        <p:cTn id="21" dur="1000"/>
-                                        <p:tgtEl>
-                                          <p:spTgt spid="2"/>
-                                        </p:tgtEl>
-                                      </p:cBhvr>
-                                    </p:animEffect>
-                                  </p:childTnLst>
-                                </p:cTn>
-                              </p:par>
-                              <p:par>
-                                <p:cTn id="22" presetID="10" presetClass="entr" presetSubtype="0" fill="hold" nodeType="withEffect">
-                                  <p:stCondLst>
-                                    <p:cond delay="0"/>
-                                  </p:stCondLst>
-                                  <p:childTnLst>
-                                    <p:set>
-                                      <p:cBhvr>
-                                        <p:cTn id="23" dur="1" fill="hold">
-                                          <p:stCondLst>
-                                            <p:cond delay="0"/>
-                                          </p:stCondLst>
-                                        </p:cTn>
-                                        <p:tgtEl>
-                                          <p:spTgt spid="6"/>
-                                        </p:tgtEl>
-                                        <p:attrNameLst>
-                                          <p:attrName>style.visibility</p:attrName>
-                                        </p:attrNameLst>
-                                      </p:cBhvr>
-                                      <p:to>
-                                        <p:strVal val="visible"/>
-                                      </p:to>
-                                    </p:set>
-                                    <p:animEffect transition="in" filter="fade">
-                                      <p:cBhvr>
-                                        <p:cTn id="24" dur="1000"/>
-                                        <p:tgtEl>
-                                          <p:spTgt spid="6"/>
-                                        </p:tgtEl>
-                                      </p:cBhvr>
-                                    </p:animEffect>
-                                  </p:childTnLst>
-                                </p:cTn>
-                              </p:par>
-                            </p:childTnLst>
-                          </p:cTn>
-                        </p:par>
-                        <p:par>
-                          <p:cTn id="25" fill="hold">
-                            <p:stCondLst>
-                              <p:cond delay="3000"/>
-                            </p:stCondLst>
-                            <p:childTnLst>
-                              <p:par>
-                                <p:cTn id="26" presetID="10" presetClass="entr" presetSubtype="0" fill="hold" nodeType="afterEffect">
-                                  <p:stCondLst>
-                                    <p:cond delay="0"/>
-                                  </p:stCondLst>
-                                  <p:childTnLst>
-                                    <p:set>
-                                      <p:cBhvr>
-                                        <p:cTn id="27" dur="1" fill="hold">
-                                          <p:stCondLst>
-                                            <p:cond delay="0"/>
-                                          </p:stCondLst>
-                                        </p:cTn>
-                                        <p:tgtEl>
-                                          <p:spTgt spid="17"/>
-                                        </p:tgtEl>
-                                        <p:attrNameLst>
-                                          <p:attrName>style.visibility</p:attrName>
-                                        </p:attrNameLst>
-                                      </p:cBhvr>
-                                      <p:to>
-                                        <p:strVal val="visible"/>
-                                      </p:to>
-                                    </p:set>
-                                    <p:animEffect transition="in" filter="fade">
-                                      <p:cBhvr>
-                                        <p:cTn id="28" dur="1000"/>
-                                        <p:tgtEl>
-                                          <p:spTgt spid="17"/>
-                                        </p:tgtEl>
-                                      </p:cBhvr>
-                                    </p:animEffect>
-                                  </p:childTnLst>
-                                </p:cTn>
-                              </p:par>
-                              <p:par>
-                                <p:cTn id="29" presetID="10" presetClass="entr" presetSubtype="0" fill="hold" nodeType="withEffect">
-                                  <p:stCondLst>
-                                    <p:cond delay="0"/>
-                                  </p:stCondLst>
-                                  <p:childTnLst>
-                                    <p:set>
-                                      <p:cBhvr>
-                                        <p:cTn id="30" dur="1" fill="hold">
-                                          <p:stCondLst>
-                                            <p:cond delay="0"/>
-                                          </p:stCondLst>
-                                        </p:cTn>
-                                        <p:tgtEl>
-                                          <p:spTgt spid="5"/>
-                                        </p:tgtEl>
-                                        <p:attrNameLst>
-                                          <p:attrName>style.visibility</p:attrName>
-                                        </p:attrNameLst>
-                                      </p:cBhvr>
-                                      <p:to>
-                                        <p:strVal val="visible"/>
-                                      </p:to>
-                                    </p:set>
-                                    <p:animEffect transition="in" filter="fade">
-                                      <p:cBhvr>
-                                        <p:cTn id="31" dur="1000"/>
-                                        <p:tgtEl>
-                                          <p:spTgt spid="5"/>
-                                        </p:tgtEl>
-                                      </p:cBhvr>
-                                    </p:animEffect>
-                                  </p:childTnLst>
-                                </p:cTn>
-                              </p:par>
-                            </p:childTnLst>
-                          </p:cTn>
-                        </p:par>
-                        <p:par>
-                          <p:cTn id="32" fill="hold">
-                            <p:stCondLst>
-                              <p:cond delay="4000"/>
-                            </p:stCondLst>
-                            <p:childTnLst>
-                              <p:par>
-                                <p:cTn id="33" presetID="10" presetClass="entr" presetSubtype="0" fill="hold" nodeType="afterEffect">
-                                  <p:stCondLst>
-                                    <p:cond delay="0"/>
-                                  </p:stCondLst>
-                                  <p:childTnLst>
-                                    <p:set>
-                                      <p:cBhvr>
-                                        <p:cTn id="34" dur="1" fill="hold">
-                                          <p:stCondLst>
-                                            <p:cond delay="0"/>
-                                          </p:stCondLst>
-                                        </p:cTn>
-                                        <p:tgtEl>
-                                          <p:spTgt spid="15"/>
-                                        </p:tgtEl>
-                                        <p:attrNameLst>
-                                          <p:attrName>style.visibility</p:attrName>
-                                        </p:attrNameLst>
-                                      </p:cBhvr>
-                                      <p:to>
-                                        <p:strVal val="visible"/>
-                                      </p:to>
-                                    </p:set>
-                                    <p:animEffect transition="in" filter="fade">
-                                      <p:cBhvr>
-                                        <p:cTn id="35" dur="1500"/>
-                                        <p:tgtEl>
-                                          <p:spTgt spid="15"/>
-                                        </p:tgtEl>
-                                      </p:cBhvr>
-                                    </p:animEffect>
-                                  </p:childTnLst>
-                                </p:cTn>
-                              </p:par>
-                            </p:childTnLst>
-                          </p:cTn>
-                        </p:par>
-                      </p:childTnLst>
-                    </p:cTn>
-                  </p:par>
-                </p:childTnLst>
-              </p:cTn>
-              <p:prevCondLst>
-                <p:cond evt="onPrev" delay="0">
-                  <p:tgtEl>
-                    <p:sldTgt/>
-                  </p:tgtEl>
-                </p:cond>
-              </p:prevCondLst>
-              <p:nextCondLst>
-                <p:cond evt="onNext" delay="0">
-                  <p:tgtEl>
-                    <p:sldTgt/>
-                  </p:tgtEl>
-                </p:cond>
-              </p:nextCondLst>
-            </p:seq>
-          </p:childTnLst>
-        </p:cTn>
+        <p:cTn id="1" dur="indefinite" restart="never" nodeType="tmRoot"/>
+      </p:par>
+    </p:tnLst>
+  </p:timing>
+</p:sld>
+</file>
+
+<file path=ppt/slides/slide9.xml><?xml version="1.0" encoding="utf-8"?>
+<p:sld xmlns:a="http://schemas.openxmlformats.org/drawingml/2006/main" xmlns:r="http://schemas.openxmlformats.org/officeDocument/2006/relationships" xmlns:p="http://schemas.openxmlformats.org/presentationml/2006/main">
+  <p:cSld>
+    <p:spTree>
+      <p:nvGrpSpPr>
+        <p:cNvPr id="1" name=""/>
+        <p:cNvGrpSpPr/>
+        <p:nvPr/>
+      </p:nvGrpSpPr>
+      <p:grpSpPr>
+        <a:xfrm>
+          <a:off x="0" y="0"/>
+          <a:ext cx="0" cy="0"/>
+          <a:chOff x="0" y="0"/>
+          <a:chExt cx="0" cy="0"/>
+        </a:xfrm>
+      </p:grpSpPr>
+      <p:sp>
+        <p:nvSpPr>
+          <p:cNvPr id="2" name="Title 1"/>
+          <p:cNvSpPr>
+            <a:spLocks noGrp="1"/>
+          </p:cNvSpPr>
+          <p:nvPr>
+            <p:ph type="title"/>
+          </p:nvPr>
+        </p:nvSpPr>
+        <p:spPr>
+          <a:xfrm>
+            <a:off x="1043608" y="2666144"/>
+            <a:ext cx="7024744" cy="1143000"/>
+          </a:xfrm>
+        </p:spPr>
+        <p:txBody>
+          <a:bodyPr/>
+          <a:lstStyle/>
+          <a:p>
+            <a:r>
+              <a:rPr lang="en-GB" dirty="0" smtClean="0"/>
+              <a:t>Statement</a:t>
+            </a:r>
+            <a:endParaRPr lang="en-GB" dirty="0"/>
+          </a:p>
+        </p:txBody>
+      </p:sp>
+      <p:pic>
+        <p:nvPicPr>
+          <p:cNvPr id="5" name="Picture 4"/>
+          <p:cNvPicPr>
+            <a:picLocks noChangeAspect="1"/>
+          </p:cNvPicPr>
+          <p:nvPr/>
+        </p:nvPicPr>
+        <p:blipFill rotWithShape="1">
+          <a:blip r:embed="rId3"/>
+          <a:srcRect l="36164" t="19485" r="37271" b="6688"/>
+          <a:stretch/>
+        </p:blipFill>
+        <p:spPr>
+          <a:xfrm>
+            <a:off x="4432150" y="1027664"/>
+            <a:ext cx="3456384" cy="5400600"/>
+          </a:xfrm>
+          <a:prstGeom prst="rect">
+            <a:avLst/>
+          </a:prstGeom>
+        </p:spPr>
+      </p:pic>
+    </p:spTree>
+    <p:extLst>
+      <p:ext uri="{BB962C8B-B14F-4D97-AF65-F5344CB8AC3E}">
+        <p14:creationId xmlns:p14="http://schemas.microsoft.com/office/powerpoint/2010/main" val="3682407370"/>
+      </p:ext>
+    </p:extLst>
+  </p:cSld>
+  <p:clrMapOvr>
+    <a:masterClrMapping/>
+  </p:clrMapOvr>
+  <p:timing>
+    <p:tnLst>
+      <p:par>
+        <p:cTn id="1" dur="indefinite" restart="never" nodeType="tmRoot"/>
       </p:par>
     </p:tnLst>
   </p:timing>

</xml_diff>